<commit_message>
He añadido el Documento_Final con lo que estuvimos haciendo el otro dia y en la presentacion he cambiado sólo los números de las diapos
</commit_message>
<xml_diff>
--- a/Documentos_generados/6. Entrega Final/Presentación_FINAL_v2.pptx
+++ b/Documentos_generados/6. Entrega Final/Presentación_FINAL_v2.pptx
@@ -132,7 +132,7 @@
   </p:defaultTextStyle>
   <p:extLst>
     <p:ext uri="{EFAFB233-063F-42B5-8137-9DF3F51BA10A}">
-      <p15:sldGuideLst xmlns:p15="http://schemas.microsoft.com/office/powerpoint/2012/main" xmlns="">
+      <p15:sldGuideLst xmlns:p15="http://schemas.microsoft.com/office/powerpoint/2012/main">
         <p15:guide id="1" orient="horz" pos="2160">
           <p15:clr>
             <a:srgbClr val="A4A3A4"/>
@@ -150,7 +150,7 @@
 </file>
 
 <file path=ppt/charts/chart1.xml><?xml version="1.0" encoding="utf-8"?>
-<c:chartSpace xmlns:c="http://schemas.openxmlformats.org/drawingml/2006/chart" xmlns:a="http://schemas.openxmlformats.org/drawingml/2006/main" xmlns:r="http://schemas.openxmlformats.org/officeDocument/2006/relationships">
+<c:chartSpace xmlns:c="http://schemas.openxmlformats.org/drawingml/2006/chart" xmlns:a="http://schemas.openxmlformats.org/drawingml/2006/main" xmlns:r="http://schemas.openxmlformats.org/officeDocument/2006/relationships" xmlns:c16r2="http://schemas.microsoft.com/office/drawing/2015/06/chart">
   <c:date1904 val="0"/>
   <c:lang val="es-ES"/>
   <c:roundedCorners val="0"/>
@@ -301,7 +301,7 @@
             </c:numRef>
           </c:val>
           <c:smooth val="0"/>
-          <c:extLst xmlns:c16r2="http://schemas.microsoft.com/office/drawing/2015/06/chart">
+          <c:extLst>
             <c:ext xmlns:c16="http://schemas.microsoft.com/office/drawing/2014/chart" uri="{C3380CC4-5D6E-409C-BE32-E72D297353CC}">
               <c16:uniqueId val="{00000000-3362-4932-B8E3-0694E3D08436}"/>
             </c:ext>
@@ -315,7 +315,6 @@
           <c:showPercent val="0"/>
           <c:showBubbleSize val="0"/>
         </c:dLbls>
-        <c:marker val="1"/>
         <c:smooth val="0"/>
         <c:axId val="227472384"/>
         <c:axId val="168608320"/>
@@ -3138,13 +3137,6 @@
         </dgm:presLayoutVars>
       </dgm:prSet>
       <dgm:spPr/>
-      <dgm:t>
-        <a:bodyPr/>
-        <a:lstStyle/>
-        <a:p>
-          <a:endParaRPr lang="es-ES"/>
-        </a:p>
-      </dgm:t>
     </dgm:pt>
     <dgm:pt modelId="{4324E71C-51E4-4FFA-9638-472734009553}" type="pres">
       <dgm:prSet presAssocID="{D1D10F65-8C36-4800-AD9D-4A75930380A4}" presName="thickLine" presStyleLbl="alignNode1" presStyleIdx="0" presStyleCnt="3" custLinFactNeighborY="-59234"/>
@@ -3157,13 +3149,6 @@
     <dgm:pt modelId="{792A15AE-68CB-4B5E-A488-D8B2430819E0}" type="pres">
       <dgm:prSet presAssocID="{D1D10F65-8C36-4800-AD9D-4A75930380A4}" presName="tx1" presStyleLbl="revTx" presStyleIdx="0" presStyleCnt="10" custScaleY="81135"/>
       <dgm:spPr/>
-      <dgm:t>
-        <a:bodyPr/>
-        <a:lstStyle/>
-        <a:p>
-          <a:endParaRPr lang="es-ES"/>
-        </a:p>
-      </dgm:t>
     </dgm:pt>
     <dgm:pt modelId="{162AB6D4-F395-4B55-9519-21B610CC0382}" type="pres">
       <dgm:prSet presAssocID="{D1D10F65-8C36-4800-AD9D-4A75930380A4}" presName="vert1" presStyleCnt="0"/>
@@ -3184,13 +3169,6 @@
     <dgm:pt modelId="{520D1D2C-1114-41BF-8F7E-61F71B01A781}" type="pres">
       <dgm:prSet presAssocID="{9C0C5B6B-88B0-0644-95CC-DA013289C236}" presName="tx2" presStyleLbl="revTx" presStyleIdx="1" presStyleCnt="10"/>
       <dgm:spPr/>
-      <dgm:t>
-        <a:bodyPr/>
-        <a:lstStyle/>
-        <a:p>
-          <a:endParaRPr lang="es-ES"/>
-        </a:p>
-      </dgm:t>
     </dgm:pt>
     <dgm:pt modelId="{D6DDDC7E-F1A5-4153-9143-0972F5C1698F}" type="pres">
       <dgm:prSet presAssocID="{9C0C5B6B-88B0-0644-95CC-DA013289C236}" presName="vert2" presStyleCnt="0"/>
@@ -3215,13 +3193,6 @@
     <dgm:pt modelId="{F1E3A902-B27E-4D1E-9D62-838DBF77570E}" type="pres">
       <dgm:prSet presAssocID="{4D7DCE72-F1C7-3648-B096-B3BF2FA1BA56}" presName="tx2" presStyleLbl="revTx" presStyleIdx="2" presStyleCnt="10"/>
       <dgm:spPr/>
-      <dgm:t>
-        <a:bodyPr/>
-        <a:lstStyle/>
-        <a:p>
-          <a:endParaRPr lang="es-ES"/>
-        </a:p>
-      </dgm:t>
     </dgm:pt>
     <dgm:pt modelId="{4F138E20-5633-4DCC-BBC2-20DFBFC7868F}" type="pres">
       <dgm:prSet presAssocID="{4D7DCE72-F1C7-3648-B096-B3BF2FA1BA56}" presName="vert2" presStyleCnt="0"/>
@@ -3253,13 +3224,6 @@
     <dgm:pt modelId="{821592CB-BF1E-40A4-88FF-532C668728A8}" type="pres">
       <dgm:prSet presAssocID="{EA05A323-1CD6-E844-BD1C-19A2225C0340}" presName="tx2" presStyleLbl="revTx" presStyleIdx="3" presStyleCnt="10"/>
       <dgm:spPr/>
-      <dgm:t>
-        <a:bodyPr/>
-        <a:lstStyle/>
-        <a:p>
-          <a:endParaRPr lang="es-ES"/>
-        </a:p>
-      </dgm:t>
     </dgm:pt>
     <dgm:pt modelId="{4A2BC687-FFD6-4EBF-9A58-5F5A5936D128}" type="pres">
       <dgm:prSet presAssocID="{EA05A323-1CD6-E844-BD1C-19A2225C0340}" presName="vert2" presStyleCnt="0"/>
@@ -3284,13 +3248,6 @@
     <dgm:pt modelId="{9891002C-403A-A043-B663-E6FEB51C2557}" type="pres">
       <dgm:prSet presAssocID="{A00DC1EC-B999-A640-8654-4E50ABDDE020}" presName="tx1" presStyleLbl="revTx" presStyleIdx="4" presStyleCnt="10"/>
       <dgm:spPr/>
-      <dgm:t>
-        <a:bodyPr/>
-        <a:lstStyle/>
-        <a:p>
-          <a:endParaRPr lang="es-ES"/>
-        </a:p>
-      </dgm:t>
     </dgm:pt>
     <dgm:pt modelId="{84783DB1-8E64-8549-92F0-B23833CEE8B0}" type="pres">
       <dgm:prSet presAssocID="{A00DC1EC-B999-A640-8654-4E50ABDDE020}" presName="vert1" presStyleCnt="0"/>
@@ -3311,13 +3268,6 @@
     <dgm:pt modelId="{CECABC1D-D0D2-4346-AB17-5BDF3AE0B320}" type="pres">
       <dgm:prSet presAssocID="{C067AB59-C7C5-C74B-8B60-2FA743781E39}" presName="tx2" presStyleLbl="revTx" presStyleIdx="5" presStyleCnt="10"/>
       <dgm:spPr/>
-      <dgm:t>
-        <a:bodyPr/>
-        <a:lstStyle/>
-        <a:p>
-          <a:endParaRPr lang="es-ES"/>
-        </a:p>
-      </dgm:t>
     </dgm:pt>
     <dgm:pt modelId="{C56FE37B-F98C-4D15-95CF-6DC56554B5B4}" type="pres">
       <dgm:prSet presAssocID="{C067AB59-C7C5-C74B-8B60-2FA743781E39}" presName="vert2" presStyleCnt="0"/>
@@ -3342,13 +3292,6 @@
     <dgm:pt modelId="{70B24025-E2C6-417F-99E1-3AE2064C772D}" type="pres">
       <dgm:prSet presAssocID="{D206AD7D-6FCF-BA4A-A881-D49C0A782FC3}" presName="tx2" presStyleLbl="revTx" presStyleIdx="6" presStyleCnt="10"/>
       <dgm:spPr/>
-      <dgm:t>
-        <a:bodyPr/>
-        <a:lstStyle/>
-        <a:p>
-          <a:endParaRPr lang="es-ES"/>
-        </a:p>
-      </dgm:t>
     </dgm:pt>
     <dgm:pt modelId="{7CEB9B09-60D8-4882-A2D8-38EF68D5C19F}" type="pres">
       <dgm:prSet presAssocID="{D206AD7D-6FCF-BA4A-A881-D49C0A782FC3}" presName="vert2" presStyleCnt="0"/>
@@ -3373,13 +3316,6 @@
     <dgm:pt modelId="{1AB85A7C-0FFD-4546-B83C-987E91EDF1C9}" type="pres">
       <dgm:prSet presAssocID="{3440283F-7B94-41E1-A678-109BA5967928}" presName="tx2" presStyleLbl="revTx" presStyleIdx="7" presStyleCnt="10"/>
       <dgm:spPr/>
-      <dgm:t>
-        <a:bodyPr/>
-        <a:lstStyle/>
-        <a:p>
-          <a:endParaRPr lang="es-ES"/>
-        </a:p>
-      </dgm:t>
     </dgm:pt>
     <dgm:pt modelId="{6F7BAE7F-F22E-4343-8455-8D1D04AE6291}" type="pres">
       <dgm:prSet presAssocID="{3440283F-7B94-41E1-A678-109BA5967928}" presName="vert2" presStyleCnt="0"/>
@@ -3404,13 +3340,6 @@
     <dgm:pt modelId="{EDBBCE88-88E0-4C06-BA01-B4EFB6C685E1}" type="pres">
       <dgm:prSet presAssocID="{5B536FDF-F2F3-4D05-AF9A-89E79C92380B}" presName="tx2" presStyleLbl="revTx" presStyleIdx="8" presStyleCnt="10"/>
       <dgm:spPr/>
-      <dgm:t>
-        <a:bodyPr/>
-        <a:lstStyle/>
-        <a:p>
-          <a:endParaRPr lang="es-ES"/>
-        </a:p>
-      </dgm:t>
     </dgm:pt>
     <dgm:pt modelId="{5EA7847F-7A65-4DE6-AFB0-0784772E4EA1}" type="pres">
       <dgm:prSet presAssocID="{5B536FDF-F2F3-4D05-AF9A-89E79C92380B}" presName="vert2" presStyleCnt="0"/>
@@ -3435,13 +3364,6 @@
     <dgm:pt modelId="{DB02E969-16E1-B544-B84F-34044CEA806B}" type="pres">
       <dgm:prSet presAssocID="{9C72B4A7-9E41-F145-8AD3-8256C9A803CC}" presName="tx1" presStyleLbl="revTx" presStyleIdx="9" presStyleCnt="10"/>
       <dgm:spPr/>
-      <dgm:t>
-        <a:bodyPr/>
-        <a:lstStyle/>
-        <a:p>
-          <a:endParaRPr lang="es-ES"/>
-        </a:p>
-      </dgm:t>
     </dgm:pt>
     <dgm:pt modelId="{198006FC-E4EB-0749-8807-9F4FBE5C6BCC}" type="pres">
       <dgm:prSet presAssocID="{9C72B4A7-9E41-F145-8AD3-8256C9A803CC}" presName="vert1" presStyleCnt="0"/>
@@ -3449,27 +3371,27 @@
     </dgm:pt>
   </dgm:ptLst>
   <dgm:cxnLst>
+    <dgm:cxn modelId="{2FE6312A-8E9C-42E4-A35F-065C47954353}" type="presOf" srcId="{D1D10F65-8C36-4800-AD9D-4A75930380A4}" destId="{792A15AE-68CB-4B5E-A488-D8B2430819E0}" srcOrd="0" destOrd="0" presId="urn:microsoft.com/office/officeart/2008/layout/LinedList"/>
+    <dgm:cxn modelId="{B913582A-C51A-7948-8CD7-0EAADAC6E1E7}" srcId="{D1D10F65-8C36-4800-AD9D-4A75930380A4}" destId="{9C0C5B6B-88B0-0644-95CC-DA013289C236}" srcOrd="0" destOrd="0" parTransId="{B8FBE750-BA08-3745-BDB2-8DE244854305}" sibTransId="{7720ED4A-2659-4441-8B8A-B12AAECACA03}"/>
+    <dgm:cxn modelId="{366F432C-1A26-4011-8836-F1CB5F23632D}" srcId="{A00DC1EC-B999-A640-8654-4E50ABDDE020}" destId="{5B536FDF-F2F3-4D05-AF9A-89E79C92380B}" srcOrd="3" destOrd="0" parTransId="{56E7C592-F553-41EA-A0F8-EBF440BF702D}" sibTransId="{3DAEA229-1474-4E45-A55F-BA78088D2142}"/>
+    <dgm:cxn modelId="{CEF75630-A106-2C4A-813E-06273EBC269D}" srcId="{D1D10F65-8C36-4800-AD9D-4A75930380A4}" destId="{4D7DCE72-F1C7-3648-B096-B3BF2FA1BA56}" srcOrd="1" destOrd="0" parTransId="{4130B51B-54F0-CE46-A291-A4358F1F6F5A}" sibTransId="{44AA0FEF-23B0-9044-91B0-9D01CCB0457B}"/>
     <dgm:cxn modelId="{2B3AB939-F741-4B55-BCEC-AC60F4C0DC14}" srcId="{A00DC1EC-B999-A640-8654-4E50ABDDE020}" destId="{3440283F-7B94-41E1-A678-109BA5967928}" srcOrd="2" destOrd="0" parTransId="{620191C0-423A-4FE9-A4F1-5C5D36C0C76E}" sibTransId="{23C99D01-59D4-4C59-997C-A7CC57B9FF58}"/>
+    <dgm:cxn modelId="{88CAD25B-4863-724E-A8BB-5EA65B911430}" type="presOf" srcId="{C3CE8D9A-2F5F-E04C-AF81-B61DA3187B58}" destId="{A4615577-DB07-0E46-BAD9-752076C1E8EB}" srcOrd="0" destOrd="0" presId="urn:microsoft.com/office/officeart/2008/layout/LinedList"/>
     <dgm:cxn modelId="{9B92625F-F6BB-B542-BFDD-1C913DC7F688}" type="presOf" srcId="{9C72B4A7-9E41-F145-8AD3-8256C9A803CC}" destId="{DB02E969-16E1-B544-B84F-34044CEA806B}" srcOrd="0" destOrd="0" presId="urn:microsoft.com/office/officeart/2008/layout/LinedList"/>
-    <dgm:cxn modelId="{DBA51B96-2BDF-C04D-8EE9-74101BC05F2E}" srcId="{A00DC1EC-B999-A640-8654-4E50ABDDE020}" destId="{D206AD7D-6FCF-BA4A-A881-D49C0A782FC3}" srcOrd="1" destOrd="0" parTransId="{2FAF4929-896A-4142-A9D4-FCF51F2A7AA6}" sibTransId="{948F4234-2DCD-C24A-ABA8-79BDA4601848}"/>
-    <dgm:cxn modelId="{B913582A-C51A-7948-8CD7-0EAADAC6E1E7}" srcId="{D1D10F65-8C36-4800-AD9D-4A75930380A4}" destId="{9C0C5B6B-88B0-0644-95CC-DA013289C236}" srcOrd="0" destOrd="0" parTransId="{B8FBE750-BA08-3745-BDB2-8DE244854305}" sibTransId="{7720ED4A-2659-4441-8B8A-B12AAECACA03}"/>
     <dgm:cxn modelId="{9F261941-24ED-402A-AAD4-7E453770E726}" type="presOf" srcId="{EA05A323-1CD6-E844-BD1C-19A2225C0340}" destId="{821592CB-BF1E-40A4-88FF-532C668728A8}" srcOrd="0" destOrd="0" presId="urn:microsoft.com/office/officeart/2008/layout/LinedList"/>
+    <dgm:cxn modelId="{85AEC94C-8398-42E2-BCFF-BE328E528E4F}" type="presOf" srcId="{9C0C5B6B-88B0-0644-95CC-DA013289C236}" destId="{520D1D2C-1114-41BF-8F7E-61F71B01A781}" srcOrd="0" destOrd="0" presId="urn:microsoft.com/office/officeart/2008/layout/LinedList"/>
+    <dgm:cxn modelId="{A916F14C-FD8F-1041-9237-07A7F4B0E424}" srcId="{C3CE8D9A-2F5F-E04C-AF81-B61DA3187B58}" destId="{9C72B4A7-9E41-F145-8AD3-8256C9A803CC}" srcOrd="2" destOrd="0" parTransId="{039D7ABA-FFC7-B445-A429-CFC439A2367F}" sibTransId="{05E1DC99-928D-904E-97A5-EF73BF8DD59B}"/>
+    <dgm:cxn modelId="{57DCF56E-A877-4D98-80BC-07F249D9A3FF}" type="presOf" srcId="{3440283F-7B94-41E1-A678-109BA5967928}" destId="{1AB85A7C-0FFD-4546-B83C-987E91EDF1C9}" srcOrd="0" destOrd="0" presId="urn:microsoft.com/office/officeart/2008/layout/LinedList"/>
     <dgm:cxn modelId="{BE140C54-7845-4FA6-BD16-779C89E4A191}" type="presOf" srcId="{C067AB59-C7C5-C74B-8B60-2FA743781E39}" destId="{CECABC1D-D0D2-4346-AB17-5BDF3AE0B320}" srcOrd="0" destOrd="0" presId="urn:microsoft.com/office/officeart/2008/layout/LinedList"/>
-    <dgm:cxn modelId="{88CAD25B-4863-724E-A8BB-5EA65B911430}" type="presOf" srcId="{C3CE8D9A-2F5F-E04C-AF81-B61DA3187B58}" destId="{A4615577-DB07-0E46-BAD9-752076C1E8EB}" srcOrd="0" destOrd="0" presId="urn:microsoft.com/office/officeart/2008/layout/LinedList"/>
+    <dgm:cxn modelId="{6FCFE956-A4B8-4040-A710-4C204E8AB087}" type="presOf" srcId="{5B536FDF-F2F3-4D05-AF9A-89E79C92380B}" destId="{EDBBCE88-88E0-4C06-BA01-B4EFB6C685E1}" srcOrd="0" destOrd="0" presId="urn:microsoft.com/office/officeart/2008/layout/LinedList"/>
     <dgm:cxn modelId="{170E0A80-D936-D547-94C5-570AC1082D21}" srcId="{D1D10F65-8C36-4800-AD9D-4A75930380A4}" destId="{EA05A323-1CD6-E844-BD1C-19A2225C0340}" srcOrd="2" destOrd="0" parTransId="{30E5782B-3D30-E84E-8B09-5F18CE4DBC15}" sibTransId="{A735D71C-2096-F344-B726-857D36F14FEB}"/>
-    <dgm:cxn modelId="{A916F14C-FD8F-1041-9237-07A7F4B0E424}" srcId="{C3CE8D9A-2F5F-E04C-AF81-B61DA3187B58}" destId="{9C72B4A7-9E41-F145-8AD3-8256C9A803CC}" srcOrd="2" destOrd="0" parTransId="{039D7ABA-FFC7-B445-A429-CFC439A2367F}" sibTransId="{05E1DC99-928D-904E-97A5-EF73BF8DD59B}"/>
-    <dgm:cxn modelId="{6FCFE956-A4B8-4040-A710-4C204E8AB087}" type="presOf" srcId="{5B536FDF-F2F3-4D05-AF9A-89E79C92380B}" destId="{EDBBCE88-88E0-4C06-BA01-B4EFB6C685E1}" srcOrd="0" destOrd="0" presId="urn:microsoft.com/office/officeart/2008/layout/LinedList"/>
     <dgm:cxn modelId="{7D1D3080-7900-4CC4-B4C0-BD39D5B7C3EE}" srcId="{C3CE8D9A-2F5F-E04C-AF81-B61DA3187B58}" destId="{D1D10F65-8C36-4800-AD9D-4A75930380A4}" srcOrd="0" destOrd="0" parTransId="{90F18EEC-639F-4363-B4CF-89223F0F6C38}" sibTransId="{99324C82-0C51-4B8E-B7FB-AB0EDB6CDB40}"/>
-    <dgm:cxn modelId="{AFE1BFFD-BCE2-4B07-8778-349DF1D2A1BC}" type="presOf" srcId="{D206AD7D-6FCF-BA4A-A881-D49C0A782FC3}" destId="{70B24025-E2C6-417F-99E1-3AE2064C772D}" srcOrd="0" destOrd="0" presId="urn:microsoft.com/office/officeart/2008/layout/LinedList"/>
-    <dgm:cxn modelId="{2FE6312A-8E9C-42E4-A35F-065C47954353}" type="presOf" srcId="{D1D10F65-8C36-4800-AD9D-4A75930380A4}" destId="{792A15AE-68CB-4B5E-A488-D8B2430819E0}" srcOrd="0" destOrd="0" presId="urn:microsoft.com/office/officeart/2008/layout/LinedList"/>
     <dgm:cxn modelId="{FA015F84-3A27-6341-B5E5-5AAABF15FCA7}" srcId="{A00DC1EC-B999-A640-8654-4E50ABDDE020}" destId="{C067AB59-C7C5-C74B-8B60-2FA743781E39}" srcOrd="0" destOrd="0" parTransId="{E4F708B6-A4DC-E54B-965A-6A91932F4F21}" sibTransId="{07AED4AD-A571-FA4C-8F60-2811AAEB8399}"/>
     <dgm:cxn modelId="{3E29948C-DFFC-AB42-9C68-F162D26487F0}" type="presOf" srcId="{A00DC1EC-B999-A640-8654-4E50ABDDE020}" destId="{9891002C-403A-A043-B663-E6FEB51C2557}" srcOrd="0" destOrd="0" presId="urn:microsoft.com/office/officeart/2008/layout/LinedList"/>
+    <dgm:cxn modelId="{C36FE991-C046-254D-B645-ED7CD9E49D91}" srcId="{C3CE8D9A-2F5F-E04C-AF81-B61DA3187B58}" destId="{A00DC1EC-B999-A640-8654-4E50ABDDE020}" srcOrd="1" destOrd="0" parTransId="{C1FC985A-8FE8-944A-89F3-975B9C62D138}" sibTransId="{48BA50DD-A1B0-B142-8134-1733EC7E096A}"/>
+    <dgm:cxn modelId="{DBA51B96-2BDF-C04D-8EE9-74101BC05F2E}" srcId="{A00DC1EC-B999-A640-8654-4E50ABDDE020}" destId="{D206AD7D-6FCF-BA4A-A881-D49C0A782FC3}" srcOrd="1" destOrd="0" parTransId="{2FAF4929-896A-4142-A9D4-FCF51F2A7AA6}" sibTransId="{948F4234-2DCD-C24A-ABA8-79BDA4601848}"/>
     <dgm:cxn modelId="{3BDFFADE-29A9-481E-B58F-434B0C851ADE}" type="presOf" srcId="{4D7DCE72-F1C7-3648-B096-B3BF2FA1BA56}" destId="{F1E3A902-B27E-4D1E-9D62-838DBF77570E}" srcOrd="0" destOrd="0" presId="urn:microsoft.com/office/officeart/2008/layout/LinedList"/>
-    <dgm:cxn modelId="{366F432C-1A26-4011-8836-F1CB5F23632D}" srcId="{A00DC1EC-B999-A640-8654-4E50ABDDE020}" destId="{5B536FDF-F2F3-4D05-AF9A-89E79C92380B}" srcOrd="3" destOrd="0" parTransId="{56E7C592-F553-41EA-A0F8-EBF440BF702D}" sibTransId="{3DAEA229-1474-4E45-A55F-BA78088D2142}"/>
-    <dgm:cxn modelId="{85AEC94C-8398-42E2-BCFF-BE328E528E4F}" type="presOf" srcId="{9C0C5B6B-88B0-0644-95CC-DA013289C236}" destId="{520D1D2C-1114-41BF-8F7E-61F71B01A781}" srcOrd="0" destOrd="0" presId="urn:microsoft.com/office/officeart/2008/layout/LinedList"/>
-    <dgm:cxn modelId="{57DCF56E-A877-4D98-80BC-07F249D9A3FF}" type="presOf" srcId="{3440283F-7B94-41E1-A678-109BA5967928}" destId="{1AB85A7C-0FFD-4546-B83C-987E91EDF1C9}" srcOrd="0" destOrd="0" presId="urn:microsoft.com/office/officeart/2008/layout/LinedList"/>
-    <dgm:cxn modelId="{C36FE991-C046-254D-B645-ED7CD9E49D91}" srcId="{C3CE8D9A-2F5F-E04C-AF81-B61DA3187B58}" destId="{A00DC1EC-B999-A640-8654-4E50ABDDE020}" srcOrd="1" destOrd="0" parTransId="{C1FC985A-8FE8-944A-89F3-975B9C62D138}" sibTransId="{48BA50DD-A1B0-B142-8134-1733EC7E096A}"/>
-    <dgm:cxn modelId="{CEF75630-A106-2C4A-813E-06273EBC269D}" srcId="{D1D10F65-8C36-4800-AD9D-4A75930380A4}" destId="{4D7DCE72-F1C7-3648-B096-B3BF2FA1BA56}" srcOrd="1" destOrd="0" parTransId="{4130B51B-54F0-CE46-A291-A4358F1F6F5A}" sibTransId="{44AA0FEF-23B0-9044-91B0-9D01CCB0457B}"/>
+    <dgm:cxn modelId="{AFE1BFFD-BCE2-4B07-8778-349DF1D2A1BC}" type="presOf" srcId="{D206AD7D-6FCF-BA4A-A881-D49C0A782FC3}" destId="{70B24025-E2C6-417F-99E1-3AE2064C772D}" srcOrd="0" destOrd="0" presId="urn:microsoft.com/office/officeart/2008/layout/LinedList"/>
     <dgm:cxn modelId="{4DB7B23E-B30F-4C81-8ACC-F20339733989}" type="presParOf" srcId="{A4615577-DB07-0E46-BAD9-752076C1E8EB}" destId="{4324E71C-51E4-4FFA-9638-472734009553}" srcOrd="0" destOrd="0" presId="urn:microsoft.com/office/officeart/2008/layout/LinedList"/>
     <dgm:cxn modelId="{5F89DA01-B92A-4DC0-9CEE-1F6FA1D40ECE}" type="presParOf" srcId="{A4615577-DB07-0E46-BAD9-752076C1E8EB}" destId="{35D4AF3C-4879-491B-8004-F3B88F6D9FB5}" srcOrd="1" destOrd="0" presId="urn:microsoft.com/office/officeart/2008/layout/LinedList"/>
     <dgm:cxn modelId="{F3D6BEA2-B2D9-4B81-A154-A2B392387994}" type="presParOf" srcId="{35D4AF3C-4879-491B-8004-F3B88F6D9FB5}" destId="{792A15AE-68CB-4B5E-A488-D8B2430819E0}" srcOrd="0" destOrd="0" presId="urn:microsoft.com/office/officeart/2008/layout/LinedList"/>
@@ -3920,13 +3842,6 @@
         </dgm:presLayoutVars>
       </dgm:prSet>
       <dgm:spPr/>
-      <dgm:t>
-        <a:bodyPr/>
-        <a:lstStyle/>
-        <a:p>
-          <a:endParaRPr lang="es-ES"/>
-        </a:p>
-      </dgm:t>
     </dgm:pt>
     <dgm:pt modelId="{4324E71C-51E4-4FFA-9638-472734009553}" type="pres">
       <dgm:prSet presAssocID="{D1D10F65-8C36-4800-AD9D-4A75930380A4}" presName="thickLine" presStyleLbl="alignNode1" presStyleIdx="0" presStyleCnt="3" custLinFactNeighborY="-59234"/>
@@ -3939,13 +3854,6 @@
     <dgm:pt modelId="{792A15AE-68CB-4B5E-A488-D8B2430819E0}" type="pres">
       <dgm:prSet presAssocID="{D1D10F65-8C36-4800-AD9D-4A75930380A4}" presName="tx1" presStyleLbl="revTx" presStyleIdx="0" presStyleCnt="10" custScaleY="81135"/>
       <dgm:spPr/>
-      <dgm:t>
-        <a:bodyPr/>
-        <a:lstStyle/>
-        <a:p>
-          <a:endParaRPr lang="es-ES"/>
-        </a:p>
-      </dgm:t>
     </dgm:pt>
     <dgm:pt modelId="{162AB6D4-F395-4B55-9519-21B610CC0382}" type="pres">
       <dgm:prSet presAssocID="{D1D10F65-8C36-4800-AD9D-4A75930380A4}" presName="vert1" presStyleCnt="0"/>
@@ -3966,13 +3874,6 @@
     <dgm:pt modelId="{520D1D2C-1114-41BF-8F7E-61F71B01A781}" type="pres">
       <dgm:prSet presAssocID="{9C0C5B6B-88B0-0644-95CC-DA013289C236}" presName="tx2" presStyleLbl="revTx" presStyleIdx="1" presStyleCnt="10"/>
       <dgm:spPr/>
-      <dgm:t>
-        <a:bodyPr/>
-        <a:lstStyle/>
-        <a:p>
-          <a:endParaRPr lang="es-ES"/>
-        </a:p>
-      </dgm:t>
     </dgm:pt>
     <dgm:pt modelId="{D6DDDC7E-F1A5-4153-9143-0972F5C1698F}" type="pres">
       <dgm:prSet presAssocID="{9C0C5B6B-88B0-0644-95CC-DA013289C236}" presName="vert2" presStyleCnt="0"/>
@@ -3997,13 +3898,6 @@
     <dgm:pt modelId="{F1E3A902-B27E-4D1E-9D62-838DBF77570E}" type="pres">
       <dgm:prSet presAssocID="{4D7DCE72-F1C7-3648-B096-B3BF2FA1BA56}" presName="tx2" presStyleLbl="revTx" presStyleIdx="2" presStyleCnt="10"/>
       <dgm:spPr/>
-      <dgm:t>
-        <a:bodyPr/>
-        <a:lstStyle/>
-        <a:p>
-          <a:endParaRPr lang="es-ES"/>
-        </a:p>
-      </dgm:t>
     </dgm:pt>
     <dgm:pt modelId="{4F138E20-5633-4DCC-BBC2-20DFBFC7868F}" type="pres">
       <dgm:prSet presAssocID="{4D7DCE72-F1C7-3648-B096-B3BF2FA1BA56}" presName="vert2" presStyleCnt="0"/>
@@ -4035,13 +3929,6 @@
     <dgm:pt modelId="{821592CB-BF1E-40A4-88FF-532C668728A8}" type="pres">
       <dgm:prSet presAssocID="{EA05A323-1CD6-E844-BD1C-19A2225C0340}" presName="tx2" presStyleLbl="revTx" presStyleIdx="3" presStyleCnt="10"/>
       <dgm:spPr/>
-      <dgm:t>
-        <a:bodyPr/>
-        <a:lstStyle/>
-        <a:p>
-          <a:endParaRPr lang="es-ES"/>
-        </a:p>
-      </dgm:t>
     </dgm:pt>
     <dgm:pt modelId="{4A2BC687-FFD6-4EBF-9A58-5F5A5936D128}" type="pres">
       <dgm:prSet presAssocID="{EA05A323-1CD6-E844-BD1C-19A2225C0340}" presName="vert2" presStyleCnt="0"/>
@@ -4066,13 +3953,6 @@
     <dgm:pt modelId="{9891002C-403A-A043-B663-E6FEB51C2557}" type="pres">
       <dgm:prSet presAssocID="{A00DC1EC-B999-A640-8654-4E50ABDDE020}" presName="tx1" presStyleLbl="revTx" presStyleIdx="4" presStyleCnt="10"/>
       <dgm:spPr/>
-      <dgm:t>
-        <a:bodyPr/>
-        <a:lstStyle/>
-        <a:p>
-          <a:endParaRPr lang="es-ES"/>
-        </a:p>
-      </dgm:t>
     </dgm:pt>
     <dgm:pt modelId="{84783DB1-8E64-8549-92F0-B23833CEE8B0}" type="pres">
       <dgm:prSet presAssocID="{A00DC1EC-B999-A640-8654-4E50ABDDE020}" presName="vert1" presStyleCnt="0"/>
@@ -4093,13 +3973,6 @@
     <dgm:pt modelId="{CECABC1D-D0D2-4346-AB17-5BDF3AE0B320}" type="pres">
       <dgm:prSet presAssocID="{C067AB59-C7C5-C74B-8B60-2FA743781E39}" presName="tx2" presStyleLbl="revTx" presStyleIdx="5" presStyleCnt="10"/>
       <dgm:spPr/>
-      <dgm:t>
-        <a:bodyPr/>
-        <a:lstStyle/>
-        <a:p>
-          <a:endParaRPr lang="es-ES"/>
-        </a:p>
-      </dgm:t>
     </dgm:pt>
     <dgm:pt modelId="{C56FE37B-F98C-4D15-95CF-6DC56554B5B4}" type="pres">
       <dgm:prSet presAssocID="{C067AB59-C7C5-C74B-8B60-2FA743781E39}" presName="vert2" presStyleCnt="0"/>
@@ -4124,13 +3997,6 @@
     <dgm:pt modelId="{70B24025-E2C6-417F-99E1-3AE2064C772D}" type="pres">
       <dgm:prSet presAssocID="{D206AD7D-6FCF-BA4A-A881-D49C0A782FC3}" presName="tx2" presStyleLbl="revTx" presStyleIdx="6" presStyleCnt="10"/>
       <dgm:spPr/>
-      <dgm:t>
-        <a:bodyPr/>
-        <a:lstStyle/>
-        <a:p>
-          <a:endParaRPr lang="es-ES"/>
-        </a:p>
-      </dgm:t>
     </dgm:pt>
     <dgm:pt modelId="{7CEB9B09-60D8-4882-A2D8-38EF68D5C19F}" type="pres">
       <dgm:prSet presAssocID="{D206AD7D-6FCF-BA4A-A881-D49C0A782FC3}" presName="vert2" presStyleCnt="0"/>
@@ -4155,13 +4021,6 @@
     <dgm:pt modelId="{1AB85A7C-0FFD-4546-B83C-987E91EDF1C9}" type="pres">
       <dgm:prSet presAssocID="{3440283F-7B94-41E1-A678-109BA5967928}" presName="tx2" presStyleLbl="revTx" presStyleIdx="7" presStyleCnt="10"/>
       <dgm:spPr/>
-      <dgm:t>
-        <a:bodyPr/>
-        <a:lstStyle/>
-        <a:p>
-          <a:endParaRPr lang="es-ES"/>
-        </a:p>
-      </dgm:t>
     </dgm:pt>
     <dgm:pt modelId="{6F7BAE7F-F22E-4343-8455-8D1D04AE6291}" type="pres">
       <dgm:prSet presAssocID="{3440283F-7B94-41E1-A678-109BA5967928}" presName="vert2" presStyleCnt="0"/>
@@ -4186,13 +4045,6 @@
     <dgm:pt modelId="{EDBBCE88-88E0-4C06-BA01-B4EFB6C685E1}" type="pres">
       <dgm:prSet presAssocID="{5B536FDF-F2F3-4D05-AF9A-89E79C92380B}" presName="tx2" presStyleLbl="revTx" presStyleIdx="8" presStyleCnt="10"/>
       <dgm:spPr/>
-      <dgm:t>
-        <a:bodyPr/>
-        <a:lstStyle/>
-        <a:p>
-          <a:endParaRPr lang="es-ES"/>
-        </a:p>
-      </dgm:t>
     </dgm:pt>
     <dgm:pt modelId="{5EA7847F-7A65-4DE6-AFB0-0784772E4EA1}" type="pres">
       <dgm:prSet presAssocID="{5B536FDF-F2F3-4D05-AF9A-89E79C92380B}" presName="vert2" presStyleCnt="0"/>
@@ -4217,13 +4069,6 @@
     <dgm:pt modelId="{DB02E969-16E1-B544-B84F-34044CEA806B}" type="pres">
       <dgm:prSet presAssocID="{9C72B4A7-9E41-F145-8AD3-8256C9A803CC}" presName="tx1" presStyleLbl="revTx" presStyleIdx="9" presStyleCnt="10"/>
       <dgm:spPr/>
-      <dgm:t>
-        <a:bodyPr/>
-        <a:lstStyle/>
-        <a:p>
-          <a:endParaRPr lang="es-ES"/>
-        </a:p>
-      </dgm:t>
     </dgm:pt>
     <dgm:pt modelId="{198006FC-E4EB-0749-8807-9F4FBE5C6BCC}" type="pres">
       <dgm:prSet presAssocID="{9C72B4A7-9E41-F145-8AD3-8256C9A803CC}" presName="vert1" presStyleCnt="0"/>
@@ -4231,27 +4076,27 @@
     </dgm:pt>
   </dgm:ptLst>
   <dgm:cxnLst>
+    <dgm:cxn modelId="{2FE6312A-8E9C-42E4-A35F-065C47954353}" type="presOf" srcId="{D1D10F65-8C36-4800-AD9D-4A75930380A4}" destId="{792A15AE-68CB-4B5E-A488-D8B2430819E0}" srcOrd="0" destOrd="0" presId="urn:microsoft.com/office/officeart/2008/layout/LinedList"/>
+    <dgm:cxn modelId="{B913582A-C51A-7948-8CD7-0EAADAC6E1E7}" srcId="{D1D10F65-8C36-4800-AD9D-4A75930380A4}" destId="{9C0C5B6B-88B0-0644-95CC-DA013289C236}" srcOrd="0" destOrd="0" parTransId="{B8FBE750-BA08-3745-BDB2-8DE244854305}" sibTransId="{7720ED4A-2659-4441-8B8A-B12AAECACA03}"/>
+    <dgm:cxn modelId="{366F432C-1A26-4011-8836-F1CB5F23632D}" srcId="{A00DC1EC-B999-A640-8654-4E50ABDDE020}" destId="{5B536FDF-F2F3-4D05-AF9A-89E79C92380B}" srcOrd="3" destOrd="0" parTransId="{56E7C592-F553-41EA-A0F8-EBF440BF702D}" sibTransId="{3DAEA229-1474-4E45-A55F-BA78088D2142}"/>
+    <dgm:cxn modelId="{CEF75630-A106-2C4A-813E-06273EBC269D}" srcId="{D1D10F65-8C36-4800-AD9D-4A75930380A4}" destId="{4D7DCE72-F1C7-3648-B096-B3BF2FA1BA56}" srcOrd="1" destOrd="0" parTransId="{4130B51B-54F0-CE46-A291-A4358F1F6F5A}" sibTransId="{44AA0FEF-23B0-9044-91B0-9D01CCB0457B}"/>
     <dgm:cxn modelId="{2B3AB939-F741-4B55-BCEC-AC60F4C0DC14}" srcId="{A00DC1EC-B999-A640-8654-4E50ABDDE020}" destId="{3440283F-7B94-41E1-A678-109BA5967928}" srcOrd="2" destOrd="0" parTransId="{620191C0-423A-4FE9-A4F1-5C5D36C0C76E}" sibTransId="{23C99D01-59D4-4C59-997C-A7CC57B9FF58}"/>
+    <dgm:cxn modelId="{88CAD25B-4863-724E-A8BB-5EA65B911430}" type="presOf" srcId="{C3CE8D9A-2F5F-E04C-AF81-B61DA3187B58}" destId="{A4615577-DB07-0E46-BAD9-752076C1E8EB}" srcOrd="0" destOrd="0" presId="urn:microsoft.com/office/officeart/2008/layout/LinedList"/>
     <dgm:cxn modelId="{9B92625F-F6BB-B542-BFDD-1C913DC7F688}" type="presOf" srcId="{9C72B4A7-9E41-F145-8AD3-8256C9A803CC}" destId="{DB02E969-16E1-B544-B84F-34044CEA806B}" srcOrd="0" destOrd="0" presId="urn:microsoft.com/office/officeart/2008/layout/LinedList"/>
-    <dgm:cxn modelId="{DBA51B96-2BDF-C04D-8EE9-74101BC05F2E}" srcId="{A00DC1EC-B999-A640-8654-4E50ABDDE020}" destId="{D206AD7D-6FCF-BA4A-A881-D49C0A782FC3}" srcOrd="1" destOrd="0" parTransId="{2FAF4929-896A-4142-A9D4-FCF51F2A7AA6}" sibTransId="{948F4234-2DCD-C24A-ABA8-79BDA4601848}"/>
-    <dgm:cxn modelId="{B913582A-C51A-7948-8CD7-0EAADAC6E1E7}" srcId="{D1D10F65-8C36-4800-AD9D-4A75930380A4}" destId="{9C0C5B6B-88B0-0644-95CC-DA013289C236}" srcOrd="0" destOrd="0" parTransId="{B8FBE750-BA08-3745-BDB2-8DE244854305}" sibTransId="{7720ED4A-2659-4441-8B8A-B12AAECACA03}"/>
     <dgm:cxn modelId="{9F261941-24ED-402A-AAD4-7E453770E726}" type="presOf" srcId="{EA05A323-1CD6-E844-BD1C-19A2225C0340}" destId="{821592CB-BF1E-40A4-88FF-532C668728A8}" srcOrd="0" destOrd="0" presId="urn:microsoft.com/office/officeart/2008/layout/LinedList"/>
+    <dgm:cxn modelId="{85AEC94C-8398-42E2-BCFF-BE328E528E4F}" type="presOf" srcId="{9C0C5B6B-88B0-0644-95CC-DA013289C236}" destId="{520D1D2C-1114-41BF-8F7E-61F71B01A781}" srcOrd="0" destOrd="0" presId="urn:microsoft.com/office/officeart/2008/layout/LinedList"/>
+    <dgm:cxn modelId="{A916F14C-FD8F-1041-9237-07A7F4B0E424}" srcId="{C3CE8D9A-2F5F-E04C-AF81-B61DA3187B58}" destId="{9C72B4A7-9E41-F145-8AD3-8256C9A803CC}" srcOrd="2" destOrd="0" parTransId="{039D7ABA-FFC7-B445-A429-CFC439A2367F}" sibTransId="{05E1DC99-928D-904E-97A5-EF73BF8DD59B}"/>
+    <dgm:cxn modelId="{57DCF56E-A877-4D98-80BC-07F249D9A3FF}" type="presOf" srcId="{3440283F-7B94-41E1-A678-109BA5967928}" destId="{1AB85A7C-0FFD-4546-B83C-987E91EDF1C9}" srcOrd="0" destOrd="0" presId="urn:microsoft.com/office/officeart/2008/layout/LinedList"/>
     <dgm:cxn modelId="{BE140C54-7845-4FA6-BD16-779C89E4A191}" type="presOf" srcId="{C067AB59-C7C5-C74B-8B60-2FA743781E39}" destId="{CECABC1D-D0D2-4346-AB17-5BDF3AE0B320}" srcOrd="0" destOrd="0" presId="urn:microsoft.com/office/officeart/2008/layout/LinedList"/>
-    <dgm:cxn modelId="{88CAD25B-4863-724E-A8BB-5EA65B911430}" type="presOf" srcId="{C3CE8D9A-2F5F-E04C-AF81-B61DA3187B58}" destId="{A4615577-DB07-0E46-BAD9-752076C1E8EB}" srcOrd="0" destOrd="0" presId="urn:microsoft.com/office/officeart/2008/layout/LinedList"/>
+    <dgm:cxn modelId="{6FCFE956-A4B8-4040-A710-4C204E8AB087}" type="presOf" srcId="{5B536FDF-F2F3-4D05-AF9A-89E79C92380B}" destId="{EDBBCE88-88E0-4C06-BA01-B4EFB6C685E1}" srcOrd="0" destOrd="0" presId="urn:microsoft.com/office/officeart/2008/layout/LinedList"/>
     <dgm:cxn modelId="{170E0A80-D936-D547-94C5-570AC1082D21}" srcId="{D1D10F65-8C36-4800-AD9D-4A75930380A4}" destId="{EA05A323-1CD6-E844-BD1C-19A2225C0340}" srcOrd="2" destOrd="0" parTransId="{30E5782B-3D30-E84E-8B09-5F18CE4DBC15}" sibTransId="{A735D71C-2096-F344-B726-857D36F14FEB}"/>
-    <dgm:cxn modelId="{A916F14C-FD8F-1041-9237-07A7F4B0E424}" srcId="{C3CE8D9A-2F5F-E04C-AF81-B61DA3187B58}" destId="{9C72B4A7-9E41-F145-8AD3-8256C9A803CC}" srcOrd="2" destOrd="0" parTransId="{039D7ABA-FFC7-B445-A429-CFC439A2367F}" sibTransId="{05E1DC99-928D-904E-97A5-EF73BF8DD59B}"/>
-    <dgm:cxn modelId="{6FCFE956-A4B8-4040-A710-4C204E8AB087}" type="presOf" srcId="{5B536FDF-F2F3-4D05-AF9A-89E79C92380B}" destId="{EDBBCE88-88E0-4C06-BA01-B4EFB6C685E1}" srcOrd="0" destOrd="0" presId="urn:microsoft.com/office/officeart/2008/layout/LinedList"/>
     <dgm:cxn modelId="{7D1D3080-7900-4CC4-B4C0-BD39D5B7C3EE}" srcId="{C3CE8D9A-2F5F-E04C-AF81-B61DA3187B58}" destId="{D1D10F65-8C36-4800-AD9D-4A75930380A4}" srcOrd="0" destOrd="0" parTransId="{90F18EEC-639F-4363-B4CF-89223F0F6C38}" sibTransId="{99324C82-0C51-4B8E-B7FB-AB0EDB6CDB40}"/>
-    <dgm:cxn modelId="{AFE1BFFD-BCE2-4B07-8778-349DF1D2A1BC}" type="presOf" srcId="{D206AD7D-6FCF-BA4A-A881-D49C0A782FC3}" destId="{70B24025-E2C6-417F-99E1-3AE2064C772D}" srcOrd="0" destOrd="0" presId="urn:microsoft.com/office/officeart/2008/layout/LinedList"/>
-    <dgm:cxn modelId="{2FE6312A-8E9C-42E4-A35F-065C47954353}" type="presOf" srcId="{D1D10F65-8C36-4800-AD9D-4A75930380A4}" destId="{792A15AE-68CB-4B5E-A488-D8B2430819E0}" srcOrd="0" destOrd="0" presId="urn:microsoft.com/office/officeart/2008/layout/LinedList"/>
     <dgm:cxn modelId="{FA015F84-3A27-6341-B5E5-5AAABF15FCA7}" srcId="{A00DC1EC-B999-A640-8654-4E50ABDDE020}" destId="{C067AB59-C7C5-C74B-8B60-2FA743781E39}" srcOrd="0" destOrd="0" parTransId="{E4F708B6-A4DC-E54B-965A-6A91932F4F21}" sibTransId="{07AED4AD-A571-FA4C-8F60-2811AAEB8399}"/>
     <dgm:cxn modelId="{3E29948C-DFFC-AB42-9C68-F162D26487F0}" type="presOf" srcId="{A00DC1EC-B999-A640-8654-4E50ABDDE020}" destId="{9891002C-403A-A043-B663-E6FEB51C2557}" srcOrd="0" destOrd="0" presId="urn:microsoft.com/office/officeart/2008/layout/LinedList"/>
+    <dgm:cxn modelId="{C36FE991-C046-254D-B645-ED7CD9E49D91}" srcId="{C3CE8D9A-2F5F-E04C-AF81-B61DA3187B58}" destId="{A00DC1EC-B999-A640-8654-4E50ABDDE020}" srcOrd="1" destOrd="0" parTransId="{C1FC985A-8FE8-944A-89F3-975B9C62D138}" sibTransId="{48BA50DD-A1B0-B142-8134-1733EC7E096A}"/>
+    <dgm:cxn modelId="{DBA51B96-2BDF-C04D-8EE9-74101BC05F2E}" srcId="{A00DC1EC-B999-A640-8654-4E50ABDDE020}" destId="{D206AD7D-6FCF-BA4A-A881-D49C0A782FC3}" srcOrd="1" destOrd="0" parTransId="{2FAF4929-896A-4142-A9D4-FCF51F2A7AA6}" sibTransId="{948F4234-2DCD-C24A-ABA8-79BDA4601848}"/>
     <dgm:cxn modelId="{3BDFFADE-29A9-481E-B58F-434B0C851ADE}" type="presOf" srcId="{4D7DCE72-F1C7-3648-B096-B3BF2FA1BA56}" destId="{F1E3A902-B27E-4D1E-9D62-838DBF77570E}" srcOrd="0" destOrd="0" presId="urn:microsoft.com/office/officeart/2008/layout/LinedList"/>
-    <dgm:cxn modelId="{366F432C-1A26-4011-8836-F1CB5F23632D}" srcId="{A00DC1EC-B999-A640-8654-4E50ABDDE020}" destId="{5B536FDF-F2F3-4D05-AF9A-89E79C92380B}" srcOrd="3" destOrd="0" parTransId="{56E7C592-F553-41EA-A0F8-EBF440BF702D}" sibTransId="{3DAEA229-1474-4E45-A55F-BA78088D2142}"/>
-    <dgm:cxn modelId="{85AEC94C-8398-42E2-BCFF-BE328E528E4F}" type="presOf" srcId="{9C0C5B6B-88B0-0644-95CC-DA013289C236}" destId="{520D1D2C-1114-41BF-8F7E-61F71B01A781}" srcOrd="0" destOrd="0" presId="urn:microsoft.com/office/officeart/2008/layout/LinedList"/>
-    <dgm:cxn modelId="{57DCF56E-A877-4D98-80BC-07F249D9A3FF}" type="presOf" srcId="{3440283F-7B94-41E1-A678-109BA5967928}" destId="{1AB85A7C-0FFD-4546-B83C-987E91EDF1C9}" srcOrd="0" destOrd="0" presId="urn:microsoft.com/office/officeart/2008/layout/LinedList"/>
-    <dgm:cxn modelId="{C36FE991-C046-254D-B645-ED7CD9E49D91}" srcId="{C3CE8D9A-2F5F-E04C-AF81-B61DA3187B58}" destId="{A00DC1EC-B999-A640-8654-4E50ABDDE020}" srcOrd="1" destOrd="0" parTransId="{C1FC985A-8FE8-944A-89F3-975B9C62D138}" sibTransId="{48BA50DD-A1B0-B142-8134-1733EC7E096A}"/>
-    <dgm:cxn modelId="{CEF75630-A106-2C4A-813E-06273EBC269D}" srcId="{D1D10F65-8C36-4800-AD9D-4A75930380A4}" destId="{4D7DCE72-F1C7-3648-B096-B3BF2FA1BA56}" srcOrd="1" destOrd="0" parTransId="{4130B51B-54F0-CE46-A291-A4358F1F6F5A}" sibTransId="{44AA0FEF-23B0-9044-91B0-9D01CCB0457B}"/>
+    <dgm:cxn modelId="{AFE1BFFD-BCE2-4B07-8778-349DF1D2A1BC}" type="presOf" srcId="{D206AD7D-6FCF-BA4A-A881-D49C0A782FC3}" destId="{70B24025-E2C6-417F-99E1-3AE2064C772D}" srcOrd="0" destOrd="0" presId="urn:microsoft.com/office/officeart/2008/layout/LinedList"/>
     <dgm:cxn modelId="{4DB7B23E-B30F-4C81-8ACC-F20339733989}" type="presParOf" srcId="{A4615577-DB07-0E46-BAD9-752076C1E8EB}" destId="{4324E71C-51E4-4FFA-9638-472734009553}" srcOrd="0" destOrd="0" presId="urn:microsoft.com/office/officeart/2008/layout/LinedList"/>
     <dgm:cxn modelId="{5F89DA01-B92A-4DC0-9CEE-1F6FA1D40ECE}" type="presParOf" srcId="{A4615577-DB07-0E46-BAD9-752076C1E8EB}" destId="{35D4AF3C-4879-491B-8004-F3B88F6D9FB5}" srcOrd="1" destOrd="0" presId="urn:microsoft.com/office/officeart/2008/layout/LinedList"/>
     <dgm:cxn modelId="{F3D6BEA2-B2D9-4B81-A154-A2B392387994}" type="presParOf" srcId="{35D4AF3C-4879-491B-8004-F3B88F6D9FB5}" destId="{792A15AE-68CB-4B5E-A488-D8B2430819E0}" srcOrd="0" destOrd="0" presId="urn:microsoft.com/office/officeart/2008/layout/LinedList"/>
@@ -4702,13 +4547,6 @@
         </dgm:presLayoutVars>
       </dgm:prSet>
       <dgm:spPr/>
-      <dgm:t>
-        <a:bodyPr/>
-        <a:lstStyle/>
-        <a:p>
-          <a:endParaRPr lang="es-ES"/>
-        </a:p>
-      </dgm:t>
     </dgm:pt>
     <dgm:pt modelId="{4324E71C-51E4-4FFA-9638-472734009553}" type="pres">
       <dgm:prSet presAssocID="{D1D10F65-8C36-4800-AD9D-4A75930380A4}" presName="thickLine" presStyleLbl="alignNode1" presStyleIdx="0" presStyleCnt="3" custLinFactNeighborY="-59234"/>
@@ -4721,13 +4559,6 @@
     <dgm:pt modelId="{792A15AE-68CB-4B5E-A488-D8B2430819E0}" type="pres">
       <dgm:prSet presAssocID="{D1D10F65-8C36-4800-AD9D-4A75930380A4}" presName="tx1" presStyleLbl="revTx" presStyleIdx="0" presStyleCnt="10" custScaleY="81135"/>
       <dgm:spPr/>
-      <dgm:t>
-        <a:bodyPr/>
-        <a:lstStyle/>
-        <a:p>
-          <a:endParaRPr lang="es-ES"/>
-        </a:p>
-      </dgm:t>
     </dgm:pt>
     <dgm:pt modelId="{162AB6D4-F395-4B55-9519-21B610CC0382}" type="pres">
       <dgm:prSet presAssocID="{D1D10F65-8C36-4800-AD9D-4A75930380A4}" presName="vert1" presStyleCnt="0"/>
@@ -4748,13 +4579,6 @@
     <dgm:pt modelId="{520D1D2C-1114-41BF-8F7E-61F71B01A781}" type="pres">
       <dgm:prSet presAssocID="{9C0C5B6B-88B0-0644-95CC-DA013289C236}" presName="tx2" presStyleLbl="revTx" presStyleIdx="1" presStyleCnt="10"/>
       <dgm:spPr/>
-      <dgm:t>
-        <a:bodyPr/>
-        <a:lstStyle/>
-        <a:p>
-          <a:endParaRPr lang="es-ES"/>
-        </a:p>
-      </dgm:t>
     </dgm:pt>
     <dgm:pt modelId="{D6DDDC7E-F1A5-4153-9143-0972F5C1698F}" type="pres">
       <dgm:prSet presAssocID="{9C0C5B6B-88B0-0644-95CC-DA013289C236}" presName="vert2" presStyleCnt="0"/>
@@ -4779,13 +4603,6 @@
     <dgm:pt modelId="{F1E3A902-B27E-4D1E-9D62-838DBF77570E}" type="pres">
       <dgm:prSet presAssocID="{4D7DCE72-F1C7-3648-B096-B3BF2FA1BA56}" presName="tx2" presStyleLbl="revTx" presStyleIdx="2" presStyleCnt="10"/>
       <dgm:spPr/>
-      <dgm:t>
-        <a:bodyPr/>
-        <a:lstStyle/>
-        <a:p>
-          <a:endParaRPr lang="es-ES"/>
-        </a:p>
-      </dgm:t>
     </dgm:pt>
     <dgm:pt modelId="{4F138E20-5633-4DCC-BBC2-20DFBFC7868F}" type="pres">
       <dgm:prSet presAssocID="{4D7DCE72-F1C7-3648-B096-B3BF2FA1BA56}" presName="vert2" presStyleCnt="0"/>
@@ -4817,13 +4634,6 @@
     <dgm:pt modelId="{821592CB-BF1E-40A4-88FF-532C668728A8}" type="pres">
       <dgm:prSet presAssocID="{EA05A323-1CD6-E844-BD1C-19A2225C0340}" presName="tx2" presStyleLbl="revTx" presStyleIdx="3" presStyleCnt="10"/>
       <dgm:spPr/>
-      <dgm:t>
-        <a:bodyPr/>
-        <a:lstStyle/>
-        <a:p>
-          <a:endParaRPr lang="es-ES"/>
-        </a:p>
-      </dgm:t>
     </dgm:pt>
     <dgm:pt modelId="{4A2BC687-FFD6-4EBF-9A58-5F5A5936D128}" type="pres">
       <dgm:prSet presAssocID="{EA05A323-1CD6-E844-BD1C-19A2225C0340}" presName="vert2" presStyleCnt="0"/>
@@ -4848,13 +4658,6 @@
     <dgm:pt modelId="{9891002C-403A-A043-B663-E6FEB51C2557}" type="pres">
       <dgm:prSet presAssocID="{A00DC1EC-B999-A640-8654-4E50ABDDE020}" presName="tx1" presStyleLbl="revTx" presStyleIdx="4" presStyleCnt="10"/>
       <dgm:spPr/>
-      <dgm:t>
-        <a:bodyPr/>
-        <a:lstStyle/>
-        <a:p>
-          <a:endParaRPr lang="es-ES"/>
-        </a:p>
-      </dgm:t>
     </dgm:pt>
     <dgm:pt modelId="{84783DB1-8E64-8549-92F0-B23833CEE8B0}" type="pres">
       <dgm:prSet presAssocID="{A00DC1EC-B999-A640-8654-4E50ABDDE020}" presName="vert1" presStyleCnt="0"/>
@@ -4875,13 +4678,6 @@
     <dgm:pt modelId="{CECABC1D-D0D2-4346-AB17-5BDF3AE0B320}" type="pres">
       <dgm:prSet presAssocID="{C067AB59-C7C5-C74B-8B60-2FA743781E39}" presName="tx2" presStyleLbl="revTx" presStyleIdx="5" presStyleCnt="10"/>
       <dgm:spPr/>
-      <dgm:t>
-        <a:bodyPr/>
-        <a:lstStyle/>
-        <a:p>
-          <a:endParaRPr lang="es-ES"/>
-        </a:p>
-      </dgm:t>
     </dgm:pt>
     <dgm:pt modelId="{C56FE37B-F98C-4D15-95CF-6DC56554B5B4}" type="pres">
       <dgm:prSet presAssocID="{C067AB59-C7C5-C74B-8B60-2FA743781E39}" presName="vert2" presStyleCnt="0"/>
@@ -4906,13 +4702,6 @@
     <dgm:pt modelId="{70B24025-E2C6-417F-99E1-3AE2064C772D}" type="pres">
       <dgm:prSet presAssocID="{D206AD7D-6FCF-BA4A-A881-D49C0A782FC3}" presName="tx2" presStyleLbl="revTx" presStyleIdx="6" presStyleCnt="10"/>
       <dgm:spPr/>
-      <dgm:t>
-        <a:bodyPr/>
-        <a:lstStyle/>
-        <a:p>
-          <a:endParaRPr lang="es-ES"/>
-        </a:p>
-      </dgm:t>
     </dgm:pt>
     <dgm:pt modelId="{7CEB9B09-60D8-4882-A2D8-38EF68D5C19F}" type="pres">
       <dgm:prSet presAssocID="{D206AD7D-6FCF-BA4A-A881-D49C0A782FC3}" presName="vert2" presStyleCnt="0"/>
@@ -4937,13 +4726,6 @@
     <dgm:pt modelId="{1AB85A7C-0FFD-4546-B83C-987E91EDF1C9}" type="pres">
       <dgm:prSet presAssocID="{3440283F-7B94-41E1-A678-109BA5967928}" presName="tx2" presStyleLbl="revTx" presStyleIdx="7" presStyleCnt="10"/>
       <dgm:spPr/>
-      <dgm:t>
-        <a:bodyPr/>
-        <a:lstStyle/>
-        <a:p>
-          <a:endParaRPr lang="es-ES"/>
-        </a:p>
-      </dgm:t>
     </dgm:pt>
     <dgm:pt modelId="{6F7BAE7F-F22E-4343-8455-8D1D04AE6291}" type="pres">
       <dgm:prSet presAssocID="{3440283F-7B94-41E1-A678-109BA5967928}" presName="vert2" presStyleCnt="0"/>
@@ -4968,13 +4750,6 @@
     <dgm:pt modelId="{EDBBCE88-88E0-4C06-BA01-B4EFB6C685E1}" type="pres">
       <dgm:prSet presAssocID="{5B536FDF-F2F3-4D05-AF9A-89E79C92380B}" presName="tx2" presStyleLbl="revTx" presStyleIdx="8" presStyleCnt="10"/>
       <dgm:spPr/>
-      <dgm:t>
-        <a:bodyPr/>
-        <a:lstStyle/>
-        <a:p>
-          <a:endParaRPr lang="es-ES"/>
-        </a:p>
-      </dgm:t>
     </dgm:pt>
     <dgm:pt modelId="{5EA7847F-7A65-4DE6-AFB0-0784772E4EA1}" type="pres">
       <dgm:prSet presAssocID="{5B536FDF-F2F3-4D05-AF9A-89E79C92380B}" presName="vert2" presStyleCnt="0"/>
@@ -4999,13 +4774,6 @@
     <dgm:pt modelId="{DB02E969-16E1-B544-B84F-34044CEA806B}" type="pres">
       <dgm:prSet presAssocID="{9C72B4A7-9E41-F145-8AD3-8256C9A803CC}" presName="tx1" presStyleLbl="revTx" presStyleIdx="9" presStyleCnt="10"/>
       <dgm:spPr/>
-      <dgm:t>
-        <a:bodyPr/>
-        <a:lstStyle/>
-        <a:p>
-          <a:endParaRPr lang="es-ES"/>
-        </a:p>
-      </dgm:t>
     </dgm:pt>
     <dgm:pt modelId="{198006FC-E4EB-0749-8807-9F4FBE5C6BCC}" type="pres">
       <dgm:prSet presAssocID="{9C72B4A7-9E41-F145-8AD3-8256C9A803CC}" presName="vert1" presStyleCnt="0"/>
@@ -5013,27 +4781,27 @@
     </dgm:pt>
   </dgm:ptLst>
   <dgm:cxnLst>
+    <dgm:cxn modelId="{2FE6312A-8E9C-42E4-A35F-065C47954353}" type="presOf" srcId="{D1D10F65-8C36-4800-AD9D-4A75930380A4}" destId="{792A15AE-68CB-4B5E-A488-D8B2430819E0}" srcOrd="0" destOrd="0" presId="urn:microsoft.com/office/officeart/2008/layout/LinedList"/>
+    <dgm:cxn modelId="{B913582A-C51A-7948-8CD7-0EAADAC6E1E7}" srcId="{D1D10F65-8C36-4800-AD9D-4A75930380A4}" destId="{9C0C5B6B-88B0-0644-95CC-DA013289C236}" srcOrd="0" destOrd="0" parTransId="{B8FBE750-BA08-3745-BDB2-8DE244854305}" sibTransId="{7720ED4A-2659-4441-8B8A-B12AAECACA03}"/>
+    <dgm:cxn modelId="{366F432C-1A26-4011-8836-F1CB5F23632D}" srcId="{A00DC1EC-B999-A640-8654-4E50ABDDE020}" destId="{5B536FDF-F2F3-4D05-AF9A-89E79C92380B}" srcOrd="3" destOrd="0" parTransId="{56E7C592-F553-41EA-A0F8-EBF440BF702D}" sibTransId="{3DAEA229-1474-4E45-A55F-BA78088D2142}"/>
+    <dgm:cxn modelId="{CEF75630-A106-2C4A-813E-06273EBC269D}" srcId="{D1D10F65-8C36-4800-AD9D-4A75930380A4}" destId="{4D7DCE72-F1C7-3648-B096-B3BF2FA1BA56}" srcOrd="1" destOrd="0" parTransId="{4130B51B-54F0-CE46-A291-A4358F1F6F5A}" sibTransId="{44AA0FEF-23B0-9044-91B0-9D01CCB0457B}"/>
     <dgm:cxn modelId="{2B3AB939-F741-4B55-BCEC-AC60F4C0DC14}" srcId="{A00DC1EC-B999-A640-8654-4E50ABDDE020}" destId="{3440283F-7B94-41E1-A678-109BA5967928}" srcOrd="2" destOrd="0" parTransId="{620191C0-423A-4FE9-A4F1-5C5D36C0C76E}" sibTransId="{23C99D01-59D4-4C59-997C-A7CC57B9FF58}"/>
+    <dgm:cxn modelId="{88CAD25B-4863-724E-A8BB-5EA65B911430}" type="presOf" srcId="{C3CE8D9A-2F5F-E04C-AF81-B61DA3187B58}" destId="{A4615577-DB07-0E46-BAD9-752076C1E8EB}" srcOrd="0" destOrd="0" presId="urn:microsoft.com/office/officeart/2008/layout/LinedList"/>
     <dgm:cxn modelId="{9B92625F-F6BB-B542-BFDD-1C913DC7F688}" type="presOf" srcId="{9C72B4A7-9E41-F145-8AD3-8256C9A803CC}" destId="{DB02E969-16E1-B544-B84F-34044CEA806B}" srcOrd="0" destOrd="0" presId="urn:microsoft.com/office/officeart/2008/layout/LinedList"/>
-    <dgm:cxn modelId="{DBA51B96-2BDF-C04D-8EE9-74101BC05F2E}" srcId="{A00DC1EC-B999-A640-8654-4E50ABDDE020}" destId="{D206AD7D-6FCF-BA4A-A881-D49C0A782FC3}" srcOrd="1" destOrd="0" parTransId="{2FAF4929-896A-4142-A9D4-FCF51F2A7AA6}" sibTransId="{948F4234-2DCD-C24A-ABA8-79BDA4601848}"/>
-    <dgm:cxn modelId="{B913582A-C51A-7948-8CD7-0EAADAC6E1E7}" srcId="{D1D10F65-8C36-4800-AD9D-4A75930380A4}" destId="{9C0C5B6B-88B0-0644-95CC-DA013289C236}" srcOrd="0" destOrd="0" parTransId="{B8FBE750-BA08-3745-BDB2-8DE244854305}" sibTransId="{7720ED4A-2659-4441-8B8A-B12AAECACA03}"/>
     <dgm:cxn modelId="{9F261941-24ED-402A-AAD4-7E453770E726}" type="presOf" srcId="{EA05A323-1CD6-E844-BD1C-19A2225C0340}" destId="{821592CB-BF1E-40A4-88FF-532C668728A8}" srcOrd="0" destOrd="0" presId="urn:microsoft.com/office/officeart/2008/layout/LinedList"/>
+    <dgm:cxn modelId="{85AEC94C-8398-42E2-BCFF-BE328E528E4F}" type="presOf" srcId="{9C0C5B6B-88B0-0644-95CC-DA013289C236}" destId="{520D1D2C-1114-41BF-8F7E-61F71B01A781}" srcOrd="0" destOrd="0" presId="urn:microsoft.com/office/officeart/2008/layout/LinedList"/>
+    <dgm:cxn modelId="{A916F14C-FD8F-1041-9237-07A7F4B0E424}" srcId="{C3CE8D9A-2F5F-E04C-AF81-B61DA3187B58}" destId="{9C72B4A7-9E41-F145-8AD3-8256C9A803CC}" srcOrd="2" destOrd="0" parTransId="{039D7ABA-FFC7-B445-A429-CFC439A2367F}" sibTransId="{05E1DC99-928D-904E-97A5-EF73BF8DD59B}"/>
+    <dgm:cxn modelId="{57DCF56E-A877-4D98-80BC-07F249D9A3FF}" type="presOf" srcId="{3440283F-7B94-41E1-A678-109BA5967928}" destId="{1AB85A7C-0FFD-4546-B83C-987E91EDF1C9}" srcOrd="0" destOrd="0" presId="urn:microsoft.com/office/officeart/2008/layout/LinedList"/>
     <dgm:cxn modelId="{BE140C54-7845-4FA6-BD16-779C89E4A191}" type="presOf" srcId="{C067AB59-C7C5-C74B-8B60-2FA743781E39}" destId="{CECABC1D-D0D2-4346-AB17-5BDF3AE0B320}" srcOrd="0" destOrd="0" presId="urn:microsoft.com/office/officeart/2008/layout/LinedList"/>
-    <dgm:cxn modelId="{88CAD25B-4863-724E-A8BB-5EA65B911430}" type="presOf" srcId="{C3CE8D9A-2F5F-E04C-AF81-B61DA3187B58}" destId="{A4615577-DB07-0E46-BAD9-752076C1E8EB}" srcOrd="0" destOrd="0" presId="urn:microsoft.com/office/officeart/2008/layout/LinedList"/>
+    <dgm:cxn modelId="{6FCFE956-A4B8-4040-A710-4C204E8AB087}" type="presOf" srcId="{5B536FDF-F2F3-4D05-AF9A-89E79C92380B}" destId="{EDBBCE88-88E0-4C06-BA01-B4EFB6C685E1}" srcOrd="0" destOrd="0" presId="urn:microsoft.com/office/officeart/2008/layout/LinedList"/>
     <dgm:cxn modelId="{170E0A80-D936-D547-94C5-570AC1082D21}" srcId="{D1D10F65-8C36-4800-AD9D-4A75930380A4}" destId="{EA05A323-1CD6-E844-BD1C-19A2225C0340}" srcOrd="2" destOrd="0" parTransId="{30E5782B-3D30-E84E-8B09-5F18CE4DBC15}" sibTransId="{A735D71C-2096-F344-B726-857D36F14FEB}"/>
-    <dgm:cxn modelId="{A916F14C-FD8F-1041-9237-07A7F4B0E424}" srcId="{C3CE8D9A-2F5F-E04C-AF81-B61DA3187B58}" destId="{9C72B4A7-9E41-F145-8AD3-8256C9A803CC}" srcOrd="2" destOrd="0" parTransId="{039D7ABA-FFC7-B445-A429-CFC439A2367F}" sibTransId="{05E1DC99-928D-904E-97A5-EF73BF8DD59B}"/>
-    <dgm:cxn modelId="{6FCFE956-A4B8-4040-A710-4C204E8AB087}" type="presOf" srcId="{5B536FDF-F2F3-4D05-AF9A-89E79C92380B}" destId="{EDBBCE88-88E0-4C06-BA01-B4EFB6C685E1}" srcOrd="0" destOrd="0" presId="urn:microsoft.com/office/officeart/2008/layout/LinedList"/>
     <dgm:cxn modelId="{7D1D3080-7900-4CC4-B4C0-BD39D5B7C3EE}" srcId="{C3CE8D9A-2F5F-E04C-AF81-B61DA3187B58}" destId="{D1D10F65-8C36-4800-AD9D-4A75930380A4}" srcOrd="0" destOrd="0" parTransId="{90F18EEC-639F-4363-B4CF-89223F0F6C38}" sibTransId="{99324C82-0C51-4B8E-B7FB-AB0EDB6CDB40}"/>
-    <dgm:cxn modelId="{AFE1BFFD-BCE2-4B07-8778-349DF1D2A1BC}" type="presOf" srcId="{D206AD7D-6FCF-BA4A-A881-D49C0A782FC3}" destId="{70B24025-E2C6-417F-99E1-3AE2064C772D}" srcOrd="0" destOrd="0" presId="urn:microsoft.com/office/officeart/2008/layout/LinedList"/>
-    <dgm:cxn modelId="{2FE6312A-8E9C-42E4-A35F-065C47954353}" type="presOf" srcId="{D1D10F65-8C36-4800-AD9D-4A75930380A4}" destId="{792A15AE-68CB-4B5E-A488-D8B2430819E0}" srcOrd="0" destOrd="0" presId="urn:microsoft.com/office/officeart/2008/layout/LinedList"/>
     <dgm:cxn modelId="{FA015F84-3A27-6341-B5E5-5AAABF15FCA7}" srcId="{A00DC1EC-B999-A640-8654-4E50ABDDE020}" destId="{C067AB59-C7C5-C74B-8B60-2FA743781E39}" srcOrd="0" destOrd="0" parTransId="{E4F708B6-A4DC-E54B-965A-6A91932F4F21}" sibTransId="{07AED4AD-A571-FA4C-8F60-2811AAEB8399}"/>
     <dgm:cxn modelId="{3E29948C-DFFC-AB42-9C68-F162D26487F0}" type="presOf" srcId="{A00DC1EC-B999-A640-8654-4E50ABDDE020}" destId="{9891002C-403A-A043-B663-E6FEB51C2557}" srcOrd="0" destOrd="0" presId="urn:microsoft.com/office/officeart/2008/layout/LinedList"/>
+    <dgm:cxn modelId="{C36FE991-C046-254D-B645-ED7CD9E49D91}" srcId="{C3CE8D9A-2F5F-E04C-AF81-B61DA3187B58}" destId="{A00DC1EC-B999-A640-8654-4E50ABDDE020}" srcOrd="1" destOrd="0" parTransId="{C1FC985A-8FE8-944A-89F3-975B9C62D138}" sibTransId="{48BA50DD-A1B0-B142-8134-1733EC7E096A}"/>
+    <dgm:cxn modelId="{DBA51B96-2BDF-C04D-8EE9-74101BC05F2E}" srcId="{A00DC1EC-B999-A640-8654-4E50ABDDE020}" destId="{D206AD7D-6FCF-BA4A-A881-D49C0A782FC3}" srcOrd="1" destOrd="0" parTransId="{2FAF4929-896A-4142-A9D4-FCF51F2A7AA6}" sibTransId="{948F4234-2DCD-C24A-ABA8-79BDA4601848}"/>
     <dgm:cxn modelId="{3BDFFADE-29A9-481E-B58F-434B0C851ADE}" type="presOf" srcId="{4D7DCE72-F1C7-3648-B096-B3BF2FA1BA56}" destId="{F1E3A902-B27E-4D1E-9D62-838DBF77570E}" srcOrd="0" destOrd="0" presId="urn:microsoft.com/office/officeart/2008/layout/LinedList"/>
-    <dgm:cxn modelId="{366F432C-1A26-4011-8836-F1CB5F23632D}" srcId="{A00DC1EC-B999-A640-8654-4E50ABDDE020}" destId="{5B536FDF-F2F3-4D05-AF9A-89E79C92380B}" srcOrd="3" destOrd="0" parTransId="{56E7C592-F553-41EA-A0F8-EBF440BF702D}" sibTransId="{3DAEA229-1474-4E45-A55F-BA78088D2142}"/>
-    <dgm:cxn modelId="{85AEC94C-8398-42E2-BCFF-BE328E528E4F}" type="presOf" srcId="{9C0C5B6B-88B0-0644-95CC-DA013289C236}" destId="{520D1D2C-1114-41BF-8F7E-61F71B01A781}" srcOrd="0" destOrd="0" presId="urn:microsoft.com/office/officeart/2008/layout/LinedList"/>
-    <dgm:cxn modelId="{57DCF56E-A877-4D98-80BC-07F249D9A3FF}" type="presOf" srcId="{3440283F-7B94-41E1-A678-109BA5967928}" destId="{1AB85A7C-0FFD-4546-B83C-987E91EDF1C9}" srcOrd="0" destOrd="0" presId="urn:microsoft.com/office/officeart/2008/layout/LinedList"/>
-    <dgm:cxn modelId="{C36FE991-C046-254D-B645-ED7CD9E49D91}" srcId="{C3CE8D9A-2F5F-E04C-AF81-B61DA3187B58}" destId="{A00DC1EC-B999-A640-8654-4E50ABDDE020}" srcOrd="1" destOrd="0" parTransId="{C1FC985A-8FE8-944A-89F3-975B9C62D138}" sibTransId="{48BA50DD-A1B0-B142-8134-1733EC7E096A}"/>
-    <dgm:cxn modelId="{CEF75630-A106-2C4A-813E-06273EBC269D}" srcId="{D1D10F65-8C36-4800-AD9D-4A75930380A4}" destId="{4D7DCE72-F1C7-3648-B096-B3BF2FA1BA56}" srcOrd="1" destOrd="0" parTransId="{4130B51B-54F0-CE46-A291-A4358F1F6F5A}" sibTransId="{44AA0FEF-23B0-9044-91B0-9D01CCB0457B}"/>
+    <dgm:cxn modelId="{AFE1BFFD-BCE2-4B07-8778-349DF1D2A1BC}" type="presOf" srcId="{D206AD7D-6FCF-BA4A-A881-D49C0A782FC3}" destId="{70B24025-E2C6-417F-99E1-3AE2064C772D}" srcOrd="0" destOrd="0" presId="urn:microsoft.com/office/officeart/2008/layout/LinedList"/>
     <dgm:cxn modelId="{4DB7B23E-B30F-4C81-8ACC-F20339733989}" type="presParOf" srcId="{A4615577-DB07-0E46-BAD9-752076C1E8EB}" destId="{4324E71C-51E4-4FFA-9638-472734009553}" srcOrd="0" destOrd="0" presId="urn:microsoft.com/office/officeart/2008/layout/LinedList"/>
     <dgm:cxn modelId="{5F89DA01-B92A-4DC0-9CEE-1F6FA1D40ECE}" type="presParOf" srcId="{A4615577-DB07-0E46-BAD9-752076C1E8EB}" destId="{35D4AF3C-4879-491B-8004-F3B88F6D9FB5}" srcOrd="1" destOrd="0" presId="urn:microsoft.com/office/officeart/2008/layout/LinedList"/>
     <dgm:cxn modelId="{F3D6BEA2-B2D9-4B81-A154-A2B392387994}" type="presParOf" srcId="{35D4AF3C-4879-491B-8004-F3B88F6D9FB5}" destId="{792A15AE-68CB-4B5E-A488-D8B2430819E0}" srcOrd="0" destOrd="0" presId="urn:microsoft.com/office/officeart/2008/layout/LinedList"/>
@@ -5226,7 +4994,7 @@
         </a:bodyPr>
         <a:lstStyle/>
         <a:p>
-          <a:pPr lvl="0" algn="l" defTabSz="1022350">
+          <a:pPr marL="0" lvl="0" indent="0" algn="l" defTabSz="1022350">
             <a:lnSpc>
               <a:spcPct val="90000"/>
             </a:lnSpc>
@@ -5236,6 +5004,7 @@
             <a:spcAft>
               <a:spcPct val="35000"/>
             </a:spcAft>
+            <a:buNone/>
           </a:pPr>
           <a:r>
             <a:rPr lang="es-ES" sz="2300" kern="1200" dirty="0"/>
@@ -5285,7 +5054,7 @@
         </a:bodyPr>
         <a:lstStyle/>
         <a:p>
-          <a:pPr lvl="0" algn="l" defTabSz="711200">
+          <a:pPr marL="0" lvl="0" indent="0" algn="l" defTabSz="711200">
             <a:lnSpc>
               <a:spcPct val="90000"/>
             </a:lnSpc>
@@ -5295,6 +5064,7 @@
             <a:spcAft>
               <a:spcPct val="35000"/>
             </a:spcAft>
+            <a:buNone/>
           </a:pPr>
           <a:r>
             <a:rPr lang="es-ES" sz="1600" kern="1200" dirty="0"/>
@@ -5423,7 +5193,7 @@
         </a:bodyPr>
         <a:lstStyle/>
         <a:p>
-          <a:pPr lvl="0" algn="l" defTabSz="711200">
+          <a:pPr marL="0" lvl="0" indent="0" algn="l" defTabSz="711200">
             <a:lnSpc>
               <a:spcPct val="90000"/>
             </a:lnSpc>
@@ -5433,6 +5203,7 @@
             <a:spcAft>
               <a:spcPct val="35000"/>
             </a:spcAft>
+            <a:buNone/>
           </a:pPr>
           <a:r>
             <a:rPr lang="es-ES" sz="1600" kern="1200" dirty="0"/>
@@ -5528,7 +5299,7 @@
         </a:bodyPr>
         <a:lstStyle/>
         <a:p>
-          <a:pPr lvl="0" algn="l" defTabSz="711200">
+          <a:pPr marL="0" lvl="0" indent="0" algn="l" defTabSz="711200">
             <a:lnSpc>
               <a:spcPct val="90000"/>
             </a:lnSpc>
@@ -5538,6 +5309,7 @@
             <a:spcAft>
               <a:spcPct val="35000"/>
             </a:spcAft>
+            <a:buNone/>
           </a:pPr>
           <a:r>
             <a:rPr lang="es-ES" sz="1600" kern="1200" dirty="0"/>
@@ -5746,7 +5518,7 @@
         </a:bodyPr>
         <a:lstStyle/>
         <a:p>
-          <a:pPr lvl="0" algn="l" defTabSz="1022350">
+          <a:pPr marL="0" lvl="0" indent="0" algn="l" defTabSz="1022350">
             <a:lnSpc>
               <a:spcPct val="90000"/>
             </a:lnSpc>
@@ -5756,6 +5528,7 @@
             <a:spcAft>
               <a:spcPct val="35000"/>
             </a:spcAft>
+            <a:buNone/>
           </a:pPr>
           <a:r>
             <a:rPr lang="es-ES" sz="2300" kern="1200" dirty="0"/>
@@ -5805,7 +5578,7 @@
         </a:bodyPr>
         <a:lstStyle/>
         <a:p>
-          <a:pPr lvl="0" algn="l" defTabSz="711200">
+          <a:pPr marL="0" lvl="0" indent="0" algn="l" defTabSz="711200">
             <a:lnSpc>
               <a:spcPct val="90000"/>
             </a:lnSpc>
@@ -5815,6 +5588,7 @@
             <a:spcAft>
               <a:spcPct val="35000"/>
             </a:spcAft>
+            <a:buNone/>
           </a:pPr>
           <a:r>
             <a:rPr lang="es-ES" sz="1600" kern="1200" dirty="0"/>
@@ -5943,7 +5717,7 @@
         </a:bodyPr>
         <a:lstStyle/>
         <a:p>
-          <a:pPr lvl="0" algn="l" defTabSz="711200">
+          <a:pPr marL="0" lvl="0" indent="0" algn="l" defTabSz="711200">
             <a:lnSpc>
               <a:spcPct val="90000"/>
             </a:lnSpc>
@@ -5953,6 +5727,7 @@
             <a:spcAft>
               <a:spcPct val="35000"/>
             </a:spcAft>
+            <a:buNone/>
           </a:pPr>
           <a:r>
             <a:rPr lang="es-ES" sz="1600" kern="1200" dirty="0"/>
@@ -6081,7 +5856,7 @@
         </a:bodyPr>
         <a:lstStyle/>
         <a:p>
-          <a:pPr lvl="0" algn="l" defTabSz="711200">
+          <a:pPr marL="0" lvl="0" indent="0" algn="l" defTabSz="711200">
             <a:lnSpc>
               <a:spcPct val="90000"/>
             </a:lnSpc>
@@ -6091,6 +5866,7 @@
             <a:spcAft>
               <a:spcPct val="35000"/>
             </a:spcAft>
+            <a:buNone/>
           </a:pPr>
           <a:r>
             <a:rPr lang="es-ES" sz="1600" kern="1200" dirty="0"/>
@@ -6219,7 +5995,7 @@
         </a:bodyPr>
         <a:lstStyle/>
         <a:p>
-          <a:pPr lvl="0" algn="l" defTabSz="711200">
+          <a:pPr marL="0" lvl="0" indent="0" algn="l" defTabSz="711200">
             <a:lnSpc>
               <a:spcPct val="90000"/>
             </a:lnSpc>
@@ -6229,6 +6005,7 @@
             <a:spcAft>
               <a:spcPct val="35000"/>
             </a:spcAft>
+            <a:buNone/>
           </a:pPr>
           <a:r>
             <a:rPr lang="es-ES" sz="1600" kern="1200" dirty="0"/>
@@ -6437,7 +6214,7 @@
         </a:bodyPr>
         <a:lstStyle/>
         <a:p>
-          <a:pPr lvl="0" algn="l" defTabSz="1022350">
+          <a:pPr marL="0" lvl="0" indent="0" algn="l" defTabSz="1022350">
             <a:lnSpc>
               <a:spcPct val="90000"/>
             </a:lnSpc>
@@ -6447,6 +6224,7 @@
             <a:spcAft>
               <a:spcPct val="35000"/>
             </a:spcAft>
+            <a:buNone/>
           </a:pPr>
           <a:r>
             <a:rPr lang="es-ES" sz="2300" kern="1200" dirty="0"/>
@@ -6588,7 +6366,7 @@
         </a:bodyPr>
         <a:lstStyle/>
         <a:p>
-          <a:pPr lvl="0" algn="l" defTabSz="1022350">
+          <a:pPr marL="0" lvl="0" indent="0" algn="l" defTabSz="1022350">
             <a:lnSpc>
               <a:spcPct val="90000"/>
             </a:lnSpc>
@@ -6598,6 +6376,7 @@
             <a:spcAft>
               <a:spcPct val="35000"/>
             </a:spcAft>
+            <a:buNone/>
           </a:pPr>
           <a:r>
             <a:rPr lang="es-ES" sz="2300" kern="1200" dirty="0"/>
@@ -6647,7 +6426,7 @@
         </a:bodyPr>
         <a:lstStyle/>
         <a:p>
-          <a:pPr lvl="0" algn="l" defTabSz="711200">
+          <a:pPr marL="0" lvl="0" indent="0" algn="l" defTabSz="711200">
             <a:lnSpc>
               <a:spcPct val="90000"/>
             </a:lnSpc>
@@ -6657,6 +6436,7 @@
             <a:spcAft>
               <a:spcPct val="35000"/>
             </a:spcAft>
+            <a:buNone/>
           </a:pPr>
           <a:r>
             <a:rPr lang="es-ES" sz="1600" kern="1200" dirty="0"/>
@@ -6785,7 +6565,7 @@
         </a:bodyPr>
         <a:lstStyle/>
         <a:p>
-          <a:pPr lvl="0" algn="l" defTabSz="711200">
+          <a:pPr marL="0" lvl="0" indent="0" algn="l" defTabSz="711200">
             <a:lnSpc>
               <a:spcPct val="90000"/>
             </a:lnSpc>
@@ -6795,6 +6575,7 @@
             <a:spcAft>
               <a:spcPct val="35000"/>
             </a:spcAft>
+            <a:buNone/>
           </a:pPr>
           <a:r>
             <a:rPr lang="es-ES" sz="1600" kern="1200" dirty="0"/>
@@ -6890,7 +6671,7 @@
         </a:bodyPr>
         <a:lstStyle/>
         <a:p>
-          <a:pPr lvl="0" algn="l" defTabSz="711200">
+          <a:pPr marL="0" lvl="0" indent="0" algn="l" defTabSz="711200">
             <a:lnSpc>
               <a:spcPct val="90000"/>
             </a:lnSpc>
@@ -6900,6 +6681,7 @@
             <a:spcAft>
               <a:spcPct val="35000"/>
             </a:spcAft>
+            <a:buNone/>
           </a:pPr>
           <a:r>
             <a:rPr lang="es-ES" sz="1600" kern="1200" dirty="0"/>
@@ -7108,7 +6890,7 @@
         </a:bodyPr>
         <a:lstStyle/>
         <a:p>
-          <a:pPr lvl="0" algn="l" defTabSz="1022350">
+          <a:pPr marL="0" lvl="0" indent="0" algn="l" defTabSz="1022350">
             <a:lnSpc>
               <a:spcPct val="90000"/>
             </a:lnSpc>
@@ -7118,6 +6900,7 @@
             <a:spcAft>
               <a:spcPct val="35000"/>
             </a:spcAft>
+            <a:buNone/>
           </a:pPr>
           <a:r>
             <a:rPr lang="es-ES" sz="2300" kern="1200" dirty="0"/>
@@ -7167,7 +6950,7 @@
         </a:bodyPr>
         <a:lstStyle/>
         <a:p>
-          <a:pPr lvl="0" algn="l" defTabSz="711200">
+          <a:pPr marL="0" lvl="0" indent="0" algn="l" defTabSz="711200">
             <a:lnSpc>
               <a:spcPct val="90000"/>
             </a:lnSpc>
@@ -7177,6 +6960,7 @@
             <a:spcAft>
               <a:spcPct val="35000"/>
             </a:spcAft>
+            <a:buNone/>
           </a:pPr>
           <a:r>
             <a:rPr lang="es-ES" sz="1600" kern="1200" dirty="0"/>
@@ -7305,7 +7089,7 @@
         </a:bodyPr>
         <a:lstStyle/>
         <a:p>
-          <a:pPr lvl="0" algn="l" defTabSz="711200">
+          <a:pPr marL="0" lvl="0" indent="0" algn="l" defTabSz="711200">
             <a:lnSpc>
               <a:spcPct val="90000"/>
             </a:lnSpc>
@@ -7315,6 +7099,7 @@
             <a:spcAft>
               <a:spcPct val="35000"/>
             </a:spcAft>
+            <a:buNone/>
           </a:pPr>
           <a:r>
             <a:rPr lang="es-ES" sz="1600" kern="1200" dirty="0"/>
@@ -7443,7 +7228,7 @@
         </a:bodyPr>
         <a:lstStyle/>
         <a:p>
-          <a:pPr lvl="0" algn="l" defTabSz="711200">
+          <a:pPr marL="0" lvl="0" indent="0" algn="l" defTabSz="711200">
             <a:lnSpc>
               <a:spcPct val="90000"/>
             </a:lnSpc>
@@ -7453,6 +7238,7 @@
             <a:spcAft>
               <a:spcPct val="35000"/>
             </a:spcAft>
+            <a:buNone/>
           </a:pPr>
           <a:r>
             <a:rPr lang="es-ES" sz="1600" kern="1200" dirty="0"/>
@@ -7581,7 +7367,7 @@
         </a:bodyPr>
         <a:lstStyle/>
         <a:p>
-          <a:pPr lvl="0" algn="l" defTabSz="711200">
+          <a:pPr marL="0" lvl="0" indent="0" algn="l" defTabSz="711200">
             <a:lnSpc>
               <a:spcPct val="90000"/>
             </a:lnSpc>
@@ -7591,6 +7377,7 @@
             <a:spcAft>
               <a:spcPct val="35000"/>
             </a:spcAft>
+            <a:buNone/>
           </a:pPr>
           <a:r>
             <a:rPr lang="es-ES" sz="1600" kern="1200" dirty="0"/>
@@ -7799,7 +7586,7 @@
         </a:bodyPr>
         <a:lstStyle/>
         <a:p>
-          <a:pPr lvl="0" algn="l" defTabSz="1022350">
+          <a:pPr marL="0" lvl="0" indent="0" algn="l" defTabSz="1022350">
             <a:lnSpc>
               <a:spcPct val="90000"/>
             </a:lnSpc>
@@ -7809,6 +7596,7 @@
             <a:spcAft>
               <a:spcPct val="35000"/>
             </a:spcAft>
+            <a:buNone/>
           </a:pPr>
           <a:r>
             <a:rPr lang="es-ES" sz="2300" kern="1200" dirty="0"/>
@@ -7950,7 +7738,7 @@
         </a:bodyPr>
         <a:lstStyle/>
         <a:p>
-          <a:pPr lvl="0" algn="l" defTabSz="1022350">
+          <a:pPr marL="0" lvl="0" indent="0" algn="l" defTabSz="1022350">
             <a:lnSpc>
               <a:spcPct val="90000"/>
             </a:lnSpc>
@@ -7960,6 +7748,7 @@
             <a:spcAft>
               <a:spcPct val="35000"/>
             </a:spcAft>
+            <a:buNone/>
           </a:pPr>
           <a:r>
             <a:rPr lang="es-ES" sz="2300" kern="1200" dirty="0"/>
@@ -8009,7 +7798,7 @@
         </a:bodyPr>
         <a:lstStyle/>
         <a:p>
-          <a:pPr lvl="0" algn="l" defTabSz="711200">
+          <a:pPr marL="0" lvl="0" indent="0" algn="l" defTabSz="711200">
             <a:lnSpc>
               <a:spcPct val="90000"/>
             </a:lnSpc>
@@ -8019,6 +7808,7 @@
             <a:spcAft>
               <a:spcPct val="35000"/>
             </a:spcAft>
+            <a:buNone/>
           </a:pPr>
           <a:r>
             <a:rPr lang="es-ES" sz="1600" kern="1200" dirty="0"/>
@@ -8147,7 +7937,7 @@
         </a:bodyPr>
         <a:lstStyle/>
         <a:p>
-          <a:pPr lvl="0" algn="l" defTabSz="711200">
+          <a:pPr marL="0" lvl="0" indent="0" algn="l" defTabSz="711200">
             <a:lnSpc>
               <a:spcPct val="90000"/>
             </a:lnSpc>
@@ -8157,6 +7947,7 @@
             <a:spcAft>
               <a:spcPct val="35000"/>
             </a:spcAft>
+            <a:buNone/>
           </a:pPr>
           <a:r>
             <a:rPr lang="es-ES" sz="1600" kern="1200" dirty="0"/>
@@ -8252,7 +8043,7 @@
         </a:bodyPr>
         <a:lstStyle/>
         <a:p>
-          <a:pPr lvl="0" algn="l" defTabSz="711200">
+          <a:pPr marL="0" lvl="0" indent="0" algn="l" defTabSz="711200">
             <a:lnSpc>
               <a:spcPct val="90000"/>
             </a:lnSpc>
@@ -8262,6 +8053,7 @@
             <a:spcAft>
               <a:spcPct val="35000"/>
             </a:spcAft>
+            <a:buNone/>
           </a:pPr>
           <a:r>
             <a:rPr lang="es-ES" sz="1600" kern="1200" dirty="0"/>
@@ -8470,7 +8262,7 @@
         </a:bodyPr>
         <a:lstStyle/>
         <a:p>
-          <a:pPr lvl="0" algn="l" defTabSz="1022350">
+          <a:pPr marL="0" lvl="0" indent="0" algn="l" defTabSz="1022350">
             <a:lnSpc>
               <a:spcPct val="90000"/>
             </a:lnSpc>
@@ -8480,6 +8272,7 @@
             <a:spcAft>
               <a:spcPct val="35000"/>
             </a:spcAft>
+            <a:buNone/>
           </a:pPr>
           <a:r>
             <a:rPr lang="es-ES" sz="2300" kern="1200" dirty="0"/>
@@ -8529,7 +8322,7 @@
         </a:bodyPr>
         <a:lstStyle/>
         <a:p>
-          <a:pPr lvl="0" algn="l" defTabSz="711200">
+          <a:pPr marL="0" lvl="0" indent="0" algn="l" defTabSz="711200">
             <a:lnSpc>
               <a:spcPct val="90000"/>
             </a:lnSpc>
@@ -8539,6 +8332,7 @@
             <a:spcAft>
               <a:spcPct val="35000"/>
             </a:spcAft>
+            <a:buNone/>
           </a:pPr>
           <a:r>
             <a:rPr lang="es-ES" sz="1600" kern="1200" dirty="0"/>
@@ -8667,7 +8461,7 @@
         </a:bodyPr>
         <a:lstStyle/>
         <a:p>
-          <a:pPr lvl="0" algn="l" defTabSz="711200">
+          <a:pPr marL="0" lvl="0" indent="0" algn="l" defTabSz="711200">
             <a:lnSpc>
               <a:spcPct val="90000"/>
             </a:lnSpc>
@@ -8677,6 +8471,7 @@
             <a:spcAft>
               <a:spcPct val="35000"/>
             </a:spcAft>
+            <a:buNone/>
           </a:pPr>
           <a:r>
             <a:rPr lang="es-ES" sz="1600" kern="1200" dirty="0"/>
@@ -8805,7 +8600,7 @@
         </a:bodyPr>
         <a:lstStyle/>
         <a:p>
-          <a:pPr lvl="0" algn="l" defTabSz="711200">
+          <a:pPr marL="0" lvl="0" indent="0" algn="l" defTabSz="711200">
             <a:lnSpc>
               <a:spcPct val="90000"/>
             </a:lnSpc>
@@ -8815,6 +8610,7 @@
             <a:spcAft>
               <a:spcPct val="35000"/>
             </a:spcAft>
+            <a:buNone/>
           </a:pPr>
           <a:r>
             <a:rPr lang="es-ES" sz="1600" kern="1200" dirty="0"/>
@@ -8943,7 +8739,7 @@
         </a:bodyPr>
         <a:lstStyle/>
         <a:p>
-          <a:pPr lvl="0" algn="l" defTabSz="711200">
+          <a:pPr marL="0" lvl="0" indent="0" algn="l" defTabSz="711200">
             <a:lnSpc>
               <a:spcPct val="90000"/>
             </a:lnSpc>
@@ -8953,6 +8749,7 @@
             <a:spcAft>
               <a:spcPct val="35000"/>
             </a:spcAft>
+            <a:buNone/>
           </a:pPr>
           <a:r>
             <a:rPr lang="es-ES" sz="1600" kern="1200" dirty="0"/>
@@ -9161,7 +8958,7 @@
         </a:bodyPr>
         <a:lstStyle/>
         <a:p>
-          <a:pPr lvl="0" algn="l" defTabSz="1022350">
+          <a:pPr marL="0" lvl="0" indent="0" algn="l" defTabSz="1022350">
             <a:lnSpc>
               <a:spcPct val="90000"/>
             </a:lnSpc>
@@ -9171,6 +8968,7 @@
             <a:spcAft>
               <a:spcPct val="35000"/>
             </a:spcAft>
+            <a:buNone/>
           </a:pPr>
           <a:r>
             <a:rPr lang="es-ES" sz="2300" kern="1200" dirty="0"/>
@@ -13792,7 +13590,7 @@
           <p:cNvPr id="2" name="Marcador de encabezado 1">
             <a:extLst>
               <a:ext uri="{FF2B5EF4-FFF2-40B4-BE49-F238E27FC236}">
-                <a16:creationId xmlns:a16="http://schemas.microsoft.com/office/drawing/2014/main" xmlns="" id="{F4AE34A5-FED9-664C-9CA9-61368CA3A720}"/>
+                <a16:creationId xmlns:a16="http://schemas.microsoft.com/office/drawing/2014/main" id="{F4AE34A5-FED9-664C-9CA9-61368CA3A720}"/>
               </a:ext>
             </a:extLst>
           </p:cNvPr>
@@ -13829,7 +13627,7 @@
           <p:cNvPr id="3" name="Marcador de fecha 2">
             <a:extLst>
               <a:ext uri="{FF2B5EF4-FFF2-40B4-BE49-F238E27FC236}">
-                <a16:creationId xmlns:a16="http://schemas.microsoft.com/office/drawing/2014/main" xmlns="" id="{EED74FDE-7D61-0448-99C3-1C2510A4DC28}"/>
+                <a16:creationId xmlns:a16="http://schemas.microsoft.com/office/drawing/2014/main" id="{EED74FDE-7D61-0448-99C3-1C2510A4DC28}"/>
               </a:ext>
             </a:extLst>
           </p:cNvPr>
@@ -13870,7 +13668,7 @@
           <p:cNvPr id="4" name="Marcador de pie de página 3">
             <a:extLst>
               <a:ext uri="{FF2B5EF4-FFF2-40B4-BE49-F238E27FC236}">
-                <a16:creationId xmlns:a16="http://schemas.microsoft.com/office/drawing/2014/main" xmlns="" id="{1B538993-078D-4446-97A5-F286C787E060}"/>
+                <a16:creationId xmlns:a16="http://schemas.microsoft.com/office/drawing/2014/main" id="{1B538993-078D-4446-97A5-F286C787E060}"/>
               </a:ext>
             </a:extLst>
           </p:cNvPr>
@@ -13907,7 +13705,7 @@
           <p:cNvPr id="5" name="Marcador de número de diapositiva 4">
             <a:extLst>
               <a:ext uri="{FF2B5EF4-FFF2-40B4-BE49-F238E27FC236}">
-                <a16:creationId xmlns:a16="http://schemas.microsoft.com/office/drawing/2014/main" xmlns="" id="{811C8AC5-611A-DB4D-AF97-9339B8C3E1BC}"/>
+                <a16:creationId xmlns:a16="http://schemas.microsoft.com/office/drawing/2014/main" id="{811C8AC5-611A-DB4D-AF97-9339B8C3E1BC}"/>
               </a:ext>
             </a:extLst>
           </p:cNvPr>
@@ -20073,7 +19871,7 @@
           <p:cNvPr id="2" name="Título 1">
             <a:extLst>
               <a:ext uri="{FF2B5EF4-FFF2-40B4-BE49-F238E27FC236}">
-                <a16:creationId xmlns:a16="http://schemas.microsoft.com/office/drawing/2014/main" xmlns="" id="{8C781D2D-F690-3E49-8B9D-858086DD50BF}"/>
+                <a16:creationId xmlns:a16="http://schemas.microsoft.com/office/drawing/2014/main" id="{8C781D2D-F690-3E49-8B9D-858086DD50BF}"/>
               </a:ext>
             </a:extLst>
           </p:cNvPr>
@@ -20113,7 +19911,7 @@
           <p:cNvPr id="3" name="Subtítulo 2">
             <a:extLst>
               <a:ext uri="{FF2B5EF4-FFF2-40B4-BE49-F238E27FC236}">
-                <a16:creationId xmlns:a16="http://schemas.microsoft.com/office/drawing/2014/main" xmlns="" id="{55C73646-C78E-504E-9BE0-410E35A3DD47}"/>
+                <a16:creationId xmlns:a16="http://schemas.microsoft.com/office/drawing/2014/main" id="{55C73646-C78E-504E-9BE0-410E35A3DD47}"/>
               </a:ext>
             </a:extLst>
           </p:cNvPr>
@@ -20148,7 +19946,7 @@
           <p:cNvPr id="4" name="Imagen 3">
             <a:extLst>
               <a:ext uri="{FF2B5EF4-FFF2-40B4-BE49-F238E27FC236}">
-                <a16:creationId xmlns:a16="http://schemas.microsoft.com/office/drawing/2014/main" xmlns="" id="{8F19F3D8-20CA-FB40-94B1-52940FAC9A31}"/>
+                <a16:creationId xmlns:a16="http://schemas.microsoft.com/office/drawing/2014/main" id="{8F19F3D8-20CA-FB40-94B1-52940FAC9A31}"/>
               </a:ext>
             </a:extLst>
           </p:cNvPr>
@@ -20208,7 +20006,7 @@
           <p:cNvPr id="7" name="Imagen 6">
             <a:extLst>
               <a:ext uri="{FF2B5EF4-FFF2-40B4-BE49-F238E27FC236}">
-                <a16:creationId xmlns:a16="http://schemas.microsoft.com/office/drawing/2014/main" xmlns="" id="{5064E33B-1BBF-4006-A3AB-7FE774AF189C}"/>
+                <a16:creationId xmlns:a16="http://schemas.microsoft.com/office/drawing/2014/main" id="{5064E33B-1BBF-4006-A3AB-7FE774AF189C}"/>
               </a:ext>
             </a:extLst>
           </p:cNvPr>
@@ -20238,7 +20036,7 @@
           <p:cNvPr id="5" name="Marcador de número de diapositiva 4">
             <a:extLst>
               <a:ext uri="{FF2B5EF4-FFF2-40B4-BE49-F238E27FC236}">
-                <a16:creationId xmlns:a16="http://schemas.microsoft.com/office/drawing/2014/main" xmlns="" id="{C8FB015C-95FD-4710-9F93-3012CE4B2032}"/>
+                <a16:creationId xmlns:a16="http://schemas.microsoft.com/office/drawing/2014/main" id="{C8FB015C-95FD-4710-9F93-3012CE4B2032}"/>
               </a:ext>
             </a:extLst>
           </p:cNvPr>
@@ -20265,7 +20063,7 @@
             </a:fld>
             <a:r>
               <a:rPr lang="es-ES" sz="2000" dirty="0"/>
-              <a:t>/22</a:t>
+              <a:t>/20</a:t>
             </a:r>
           </a:p>
         </p:txBody>
@@ -20275,7 +20073,7 @@
           <p:cNvPr id="8" name="Título 1">
             <a:extLst>
               <a:ext uri="{FF2B5EF4-FFF2-40B4-BE49-F238E27FC236}">
-                <a16:creationId xmlns:a16="http://schemas.microsoft.com/office/drawing/2014/main" xmlns="" id="{CE4B125E-AFB5-4365-AB59-78D81A734082}"/>
+                <a16:creationId xmlns:a16="http://schemas.microsoft.com/office/drawing/2014/main" id="{CE4B125E-AFB5-4365-AB59-78D81A734082}"/>
               </a:ext>
             </a:extLst>
           </p:cNvPr>
@@ -20308,7 +20106,7 @@
           <p:cNvPr id="9" name="CuadroTexto 8">
             <a:extLst>
               <a:ext uri="{FF2B5EF4-FFF2-40B4-BE49-F238E27FC236}">
-                <a16:creationId xmlns:a16="http://schemas.microsoft.com/office/drawing/2014/main" xmlns="" id="{ADAEC259-2108-468D-8C3F-28134EAB5E86}"/>
+                <a16:creationId xmlns:a16="http://schemas.microsoft.com/office/drawing/2014/main" id="{ADAEC259-2108-468D-8C3F-28134EAB5E86}"/>
               </a:ext>
             </a:extLst>
           </p:cNvPr>
@@ -20497,7 +20295,7 @@
           <p:cNvPr id="7" name="Imagen 6">
             <a:extLst>
               <a:ext uri="{FF2B5EF4-FFF2-40B4-BE49-F238E27FC236}">
-                <a16:creationId xmlns:a16="http://schemas.microsoft.com/office/drawing/2014/main" xmlns="" id="{5064E33B-1BBF-4006-A3AB-7FE774AF189C}"/>
+                <a16:creationId xmlns:a16="http://schemas.microsoft.com/office/drawing/2014/main" id="{5064E33B-1BBF-4006-A3AB-7FE774AF189C}"/>
               </a:ext>
             </a:extLst>
           </p:cNvPr>
@@ -20527,7 +20325,7 @@
           <p:cNvPr id="5" name="Marcador de número de diapositiva 4">
             <a:extLst>
               <a:ext uri="{FF2B5EF4-FFF2-40B4-BE49-F238E27FC236}">
-                <a16:creationId xmlns:a16="http://schemas.microsoft.com/office/drawing/2014/main" xmlns="" id="{C8FB015C-95FD-4710-9F93-3012CE4B2032}"/>
+                <a16:creationId xmlns:a16="http://schemas.microsoft.com/office/drawing/2014/main" id="{C8FB015C-95FD-4710-9F93-3012CE4B2032}"/>
               </a:ext>
             </a:extLst>
           </p:cNvPr>
@@ -20554,7 +20352,7 @@
             </a:fld>
             <a:r>
               <a:rPr lang="es-ES" sz="2000" dirty="0"/>
-              <a:t>/22</a:t>
+              <a:t>/20</a:t>
             </a:r>
           </a:p>
         </p:txBody>
@@ -20564,7 +20362,7 @@
           <p:cNvPr id="8" name="Título 1">
             <a:extLst>
               <a:ext uri="{FF2B5EF4-FFF2-40B4-BE49-F238E27FC236}">
-                <a16:creationId xmlns:a16="http://schemas.microsoft.com/office/drawing/2014/main" xmlns="" id="{CE4B125E-AFB5-4365-AB59-78D81A734082}"/>
+                <a16:creationId xmlns:a16="http://schemas.microsoft.com/office/drawing/2014/main" id="{CE4B125E-AFB5-4365-AB59-78D81A734082}"/>
               </a:ext>
             </a:extLst>
           </p:cNvPr>
@@ -20597,7 +20395,7 @@
           <p:cNvPr id="9" name="CuadroTexto 8">
             <a:extLst>
               <a:ext uri="{FF2B5EF4-FFF2-40B4-BE49-F238E27FC236}">
-                <a16:creationId xmlns:a16="http://schemas.microsoft.com/office/drawing/2014/main" xmlns="" id="{ADAEC259-2108-468D-8C3F-28134EAB5E86}"/>
+                <a16:creationId xmlns:a16="http://schemas.microsoft.com/office/drawing/2014/main" id="{ADAEC259-2108-468D-8C3F-28134EAB5E86}"/>
               </a:ext>
             </a:extLst>
           </p:cNvPr>
@@ -20681,7 +20479,7 @@
           <p:cNvPr id="6" name="Imagen 5">
             <a:extLst>
               <a:ext uri="{FF2B5EF4-FFF2-40B4-BE49-F238E27FC236}">
-                <a16:creationId xmlns:a16="http://schemas.microsoft.com/office/drawing/2014/main" xmlns="" id="{275EA8F7-80AB-40D5-A26C-358AA24AD53D}"/>
+                <a16:creationId xmlns:a16="http://schemas.microsoft.com/office/drawing/2014/main" id="{275EA8F7-80AB-40D5-A26C-358AA24AD53D}"/>
               </a:ext>
             </a:extLst>
           </p:cNvPr>
@@ -20711,7 +20509,7 @@
           <p:cNvPr id="10" name="Imagen 9">
             <a:extLst>
               <a:ext uri="{FF2B5EF4-FFF2-40B4-BE49-F238E27FC236}">
-                <a16:creationId xmlns:a16="http://schemas.microsoft.com/office/drawing/2014/main" xmlns="" id="{A088D5C9-9AB1-4377-A22E-673E898FBC4E}"/>
+                <a16:creationId xmlns:a16="http://schemas.microsoft.com/office/drawing/2014/main" id="{A088D5C9-9AB1-4377-A22E-673E898FBC4E}"/>
               </a:ext>
             </a:extLst>
           </p:cNvPr>
@@ -20741,7 +20539,7 @@
           <p:cNvPr id="11" name="Imagen 10">
             <a:extLst>
               <a:ext uri="{FF2B5EF4-FFF2-40B4-BE49-F238E27FC236}">
-                <a16:creationId xmlns:a16="http://schemas.microsoft.com/office/drawing/2014/main" xmlns="" id="{FD9DED93-102C-4A21-84FE-28563206D22F}"/>
+                <a16:creationId xmlns:a16="http://schemas.microsoft.com/office/drawing/2014/main" id="{FD9DED93-102C-4A21-84FE-28563206D22F}"/>
               </a:ext>
             </a:extLst>
           </p:cNvPr>
@@ -20771,7 +20569,7 @@
           <p:cNvPr id="12" name="Picture 2" descr="Resultado de imagen de Omron 708-BT">
             <a:extLst>
               <a:ext uri="{FF2B5EF4-FFF2-40B4-BE49-F238E27FC236}">
-                <a16:creationId xmlns:a16="http://schemas.microsoft.com/office/drawing/2014/main" xmlns="" id="{F37E709E-C462-4D01-A442-F2CAF25DF73A}"/>
+                <a16:creationId xmlns:a16="http://schemas.microsoft.com/office/drawing/2014/main" id="{F37E709E-C462-4D01-A442-F2CAF25DF73A}"/>
               </a:ext>
             </a:extLst>
           </p:cNvPr>
@@ -20818,7 +20616,7 @@
           <p:cNvPr id="13" name="Imagen 12">
             <a:extLst>
               <a:ext uri="{FF2B5EF4-FFF2-40B4-BE49-F238E27FC236}">
-                <a16:creationId xmlns:a16="http://schemas.microsoft.com/office/drawing/2014/main" xmlns="" id="{2F5AA041-60F7-4769-87DF-DA0CF1F36D53}"/>
+                <a16:creationId xmlns:a16="http://schemas.microsoft.com/office/drawing/2014/main" id="{2F5AA041-60F7-4769-87DF-DA0CF1F36D53}"/>
               </a:ext>
             </a:extLst>
           </p:cNvPr>
@@ -20848,7 +20646,7 @@
           <p:cNvPr id="14" name="Picture 4" descr="Icono De Bluetooth, Logotipo De Bluetooth, Bluetooth">
             <a:extLst>
               <a:ext uri="{FF2B5EF4-FFF2-40B4-BE49-F238E27FC236}">
-                <a16:creationId xmlns:a16="http://schemas.microsoft.com/office/drawing/2014/main" xmlns="" id="{6678D8DE-35C8-4DC4-9CF6-B00208587FAC}"/>
+                <a16:creationId xmlns:a16="http://schemas.microsoft.com/office/drawing/2014/main" id="{6678D8DE-35C8-4DC4-9CF6-B00208587FAC}"/>
               </a:ext>
             </a:extLst>
           </p:cNvPr>
@@ -20895,7 +20693,7 @@
           <p:cNvPr id="15" name="TextBox 13">
             <a:extLst>
               <a:ext uri="{FF2B5EF4-FFF2-40B4-BE49-F238E27FC236}">
-                <a16:creationId xmlns:a16="http://schemas.microsoft.com/office/drawing/2014/main" xmlns="" id="{190ED0CC-E462-466B-B5D5-89131F2565CB}"/>
+                <a16:creationId xmlns:a16="http://schemas.microsoft.com/office/drawing/2014/main" id="{190ED0CC-E462-466B-B5D5-89131F2565CB}"/>
               </a:ext>
             </a:extLst>
           </p:cNvPr>
@@ -20943,7 +20741,7 @@
           <p:cNvPr id="16" name="TextBox 13">
             <a:extLst>
               <a:ext uri="{FF2B5EF4-FFF2-40B4-BE49-F238E27FC236}">
-                <a16:creationId xmlns:a16="http://schemas.microsoft.com/office/drawing/2014/main" xmlns="" id="{5E1D2C82-83D5-45CD-B536-3C867BB7E8E0}"/>
+                <a16:creationId xmlns:a16="http://schemas.microsoft.com/office/drawing/2014/main" id="{5E1D2C82-83D5-45CD-B536-3C867BB7E8E0}"/>
               </a:ext>
             </a:extLst>
           </p:cNvPr>
@@ -20986,7 +20784,7 @@
           <p:cNvPr id="17" name="TextBox 13">
             <a:extLst>
               <a:ext uri="{FF2B5EF4-FFF2-40B4-BE49-F238E27FC236}">
-                <a16:creationId xmlns:a16="http://schemas.microsoft.com/office/drawing/2014/main" xmlns="" id="{74FFEB07-7CFC-4665-840E-5709CB586EBD}"/>
+                <a16:creationId xmlns:a16="http://schemas.microsoft.com/office/drawing/2014/main" id="{74FFEB07-7CFC-4665-840E-5709CB586EBD}"/>
               </a:ext>
             </a:extLst>
           </p:cNvPr>
@@ -21021,7 +20819,7 @@
           <p:cNvPr id="18" name="TextBox 13">
             <a:extLst>
               <a:ext uri="{FF2B5EF4-FFF2-40B4-BE49-F238E27FC236}">
-                <a16:creationId xmlns:a16="http://schemas.microsoft.com/office/drawing/2014/main" xmlns="" id="{E28349DA-7035-4F30-BBC3-60C885FD8B1E}"/>
+                <a16:creationId xmlns:a16="http://schemas.microsoft.com/office/drawing/2014/main" id="{E28349DA-7035-4F30-BBC3-60C885FD8B1E}"/>
               </a:ext>
             </a:extLst>
           </p:cNvPr>
@@ -21057,7 +20855,7 @@
           <p:cNvPr id="19" name="TextBox 13">
             <a:extLst>
               <a:ext uri="{FF2B5EF4-FFF2-40B4-BE49-F238E27FC236}">
-                <a16:creationId xmlns:a16="http://schemas.microsoft.com/office/drawing/2014/main" xmlns="" id="{7D6B8AD4-B738-4A99-BE9C-58A20169D515}"/>
+                <a16:creationId xmlns:a16="http://schemas.microsoft.com/office/drawing/2014/main" id="{7D6B8AD4-B738-4A99-BE9C-58A20169D515}"/>
               </a:ext>
             </a:extLst>
           </p:cNvPr>
@@ -21092,7 +20890,7 @@
           <p:cNvPr id="1026" name="Picture 2" descr="Resultado de imagen de 3g 4g">
             <a:extLst>
               <a:ext uri="{FF2B5EF4-FFF2-40B4-BE49-F238E27FC236}">
-                <a16:creationId xmlns:a16="http://schemas.microsoft.com/office/drawing/2014/main" xmlns="" id="{E8296D46-0998-42FD-BB5C-8C0967E1B1C0}"/>
+                <a16:creationId xmlns:a16="http://schemas.microsoft.com/office/drawing/2014/main" id="{E8296D46-0998-42FD-BB5C-8C0967E1B1C0}"/>
               </a:ext>
             </a:extLst>
           </p:cNvPr>
@@ -21139,7 +20937,7 @@
           <p:cNvPr id="1028" name="Picture 4" descr="Resultado de imagen de telefonica">
             <a:extLst>
               <a:ext uri="{FF2B5EF4-FFF2-40B4-BE49-F238E27FC236}">
-                <a16:creationId xmlns:a16="http://schemas.microsoft.com/office/drawing/2014/main" xmlns="" id="{9052F87F-E1EA-4F92-AB58-9C86266B5EC2}"/>
+                <a16:creationId xmlns:a16="http://schemas.microsoft.com/office/drawing/2014/main" id="{9052F87F-E1EA-4F92-AB58-9C86266B5EC2}"/>
               </a:ext>
             </a:extLst>
           </p:cNvPr>
@@ -21216,7 +21014,7 @@
           <p:cNvPr id="7" name="Imagen 6">
             <a:extLst>
               <a:ext uri="{FF2B5EF4-FFF2-40B4-BE49-F238E27FC236}">
-                <a16:creationId xmlns:a16="http://schemas.microsoft.com/office/drawing/2014/main" xmlns="" id="{5064E33B-1BBF-4006-A3AB-7FE774AF189C}"/>
+                <a16:creationId xmlns:a16="http://schemas.microsoft.com/office/drawing/2014/main" id="{5064E33B-1BBF-4006-A3AB-7FE774AF189C}"/>
               </a:ext>
             </a:extLst>
           </p:cNvPr>
@@ -21246,7 +21044,7 @@
           <p:cNvPr id="5" name="Marcador de número de diapositiva 4">
             <a:extLst>
               <a:ext uri="{FF2B5EF4-FFF2-40B4-BE49-F238E27FC236}">
-                <a16:creationId xmlns:a16="http://schemas.microsoft.com/office/drawing/2014/main" xmlns="" id="{C8FB015C-95FD-4710-9F93-3012CE4B2032}"/>
+                <a16:creationId xmlns:a16="http://schemas.microsoft.com/office/drawing/2014/main" id="{C8FB015C-95FD-4710-9F93-3012CE4B2032}"/>
               </a:ext>
             </a:extLst>
           </p:cNvPr>
@@ -21273,7 +21071,7 @@
             </a:fld>
             <a:r>
               <a:rPr lang="es-ES" sz="2000" dirty="0"/>
-              <a:t>/22</a:t>
+              <a:t>/20</a:t>
             </a:r>
           </a:p>
         </p:txBody>
@@ -21283,7 +21081,7 @@
           <p:cNvPr id="8" name="Título 1">
             <a:extLst>
               <a:ext uri="{FF2B5EF4-FFF2-40B4-BE49-F238E27FC236}">
-                <a16:creationId xmlns:a16="http://schemas.microsoft.com/office/drawing/2014/main" xmlns="" id="{CE4B125E-AFB5-4365-AB59-78D81A734082}"/>
+                <a16:creationId xmlns:a16="http://schemas.microsoft.com/office/drawing/2014/main" id="{CE4B125E-AFB5-4365-AB59-78D81A734082}"/>
               </a:ext>
             </a:extLst>
           </p:cNvPr>
@@ -21316,7 +21114,7 @@
           <p:cNvPr id="9" name="CuadroTexto 8">
             <a:extLst>
               <a:ext uri="{FF2B5EF4-FFF2-40B4-BE49-F238E27FC236}">
-                <a16:creationId xmlns:a16="http://schemas.microsoft.com/office/drawing/2014/main" xmlns="" id="{ADAEC259-2108-468D-8C3F-28134EAB5E86}"/>
+                <a16:creationId xmlns:a16="http://schemas.microsoft.com/office/drawing/2014/main" id="{ADAEC259-2108-468D-8C3F-28134EAB5E86}"/>
               </a:ext>
             </a:extLst>
           </p:cNvPr>
@@ -21326,7 +21124,7 @@
         <p:spPr>
           <a:xfrm>
             <a:off x="338018" y="1565037"/>
-            <a:ext cx="11853982" cy="6370975"/>
+            <a:ext cx="11853982" cy="3046988"/>
           </a:xfrm>
           <a:prstGeom prst="rect">
             <a:avLst/>
@@ -21413,61 +21211,6 @@
               <a:buFont typeface="Arial" panose="020B0604020202020204" pitchFamily="34" charset="0"/>
               <a:buChar char="•"/>
             </a:pPr>
-            <a:endParaRPr lang="es-ES" sz="2400" dirty="0"/>
-          </a:p>
-          <a:p>
-            <a:endParaRPr lang="es-ES" sz="2400" dirty="0"/>
-          </a:p>
-          <a:p>
-            <a:pPr marL="342900" indent="-342900">
-              <a:buFont typeface="Arial" panose="020B0604020202020204" pitchFamily="34" charset="0"/>
-              <a:buChar char="•"/>
-            </a:pPr>
-            <a:endParaRPr lang="es-ES" sz="2400" dirty="0"/>
-          </a:p>
-          <a:p>
-            <a:pPr marL="342900" indent="-342900">
-              <a:buFont typeface="Arial" panose="020B0604020202020204" pitchFamily="34" charset="0"/>
-              <a:buChar char="•"/>
-            </a:pPr>
-            <a:endParaRPr lang="es-ES" sz="2400" dirty="0"/>
-          </a:p>
-          <a:p>
-            <a:pPr marL="342900" indent="-342900">
-              <a:buFont typeface="Arial" panose="020B0604020202020204" pitchFamily="34" charset="0"/>
-              <a:buChar char="•"/>
-            </a:pPr>
-            <a:endParaRPr lang="es-ES" sz="2400" dirty="0"/>
-          </a:p>
-          <a:p>
-            <a:pPr marL="342900" indent="-342900">
-              <a:buFont typeface="Arial" panose="020B0604020202020204" pitchFamily="34" charset="0"/>
-              <a:buChar char="•"/>
-            </a:pPr>
-            <a:endParaRPr lang="es-ES" sz="2400" dirty="0"/>
-          </a:p>
-          <a:p>
-            <a:pPr marL="342900" indent="-342900">
-              <a:buFont typeface="Arial" panose="020B0604020202020204" pitchFamily="34" charset="0"/>
-              <a:buChar char="•"/>
-            </a:pPr>
-            <a:endParaRPr lang="es-ES" sz="2400" dirty="0"/>
-          </a:p>
-          <a:p>
-            <a:pPr marL="800100" lvl="1" indent="-342900">
-              <a:buFont typeface="Arial" panose="020B0604020202020204" pitchFamily="34" charset="0"/>
-              <a:buChar char="•"/>
-            </a:pPr>
-            <a:endParaRPr lang="es-ES" sz="2400" dirty="0"/>
-          </a:p>
-          <a:p>
-            <a:pPr marL="342900" indent="-342900">
-              <a:buFont typeface="Arial" panose="020B0604020202020204" pitchFamily="34" charset="0"/>
-              <a:buChar char="•"/>
-            </a:pPr>
-            <a:endParaRPr lang="es-ES" sz="2400" dirty="0"/>
-          </a:p>
-          <a:p>
             <a:endParaRPr lang="es-ES" sz="2400" dirty="0"/>
           </a:p>
         </p:txBody>
@@ -21507,7 +21250,7 @@
           <p:cNvPr id="7" name="Imagen 6">
             <a:extLst>
               <a:ext uri="{FF2B5EF4-FFF2-40B4-BE49-F238E27FC236}">
-                <a16:creationId xmlns:a16="http://schemas.microsoft.com/office/drawing/2014/main" xmlns="" id="{5064E33B-1BBF-4006-A3AB-7FE774AF189C}"/>
+                <a16:creationId xmlns:a16="http://schemas.microsoft.com/office/drawing/2014/main" id="{5064E33B-1BBF-4006-A3AB-7FE774AF189C}"/>
               </a:ext>
             </a:extLst>
           </p:cNvPr>
@@ -21537,7 +21280,7 @@
           <p:cNvPr id="5" name="Marcador de número de diapositiva 4">
             <a:extLst>
               <a:ext uri="{FF2B5EF4-FFF2-40B4-BE49-F238E27FC236}">
-                <a16:creationId xmlns:a16="http://schemas.microsoft.com/office/drawing/2014/main" xmlns="" id="{C8FB015C-95FD-4710-9F93-3012CE4B2032}"/>
+                <a16:creationId xmlns:a16="http://schemas.microsoft.com/office/drawing/2014/main" id="{C8FB015C-95FD-4710-9F93-3012CE4B2032}"/>
               </a:ext>
             </a:extLst>
           </p:cNvPr>
@@ -21564,7 +21307,7 @@
             </a:fld>
             <a:r>
               <a:rPr lang="es-ES" sz="2000" dirty="0"/>
-              <a:t>/22</a:t>
+              <a:t>/20</a:t>
             </a:r>
           </a:p>
         </p:txBody>
@@ -21574,7 +21317,7 @@
           <p:cNvPr id="8" name="Título 1">
             <a:extLst>
               <a:ext uri="{FF2B5EF4-FFF2-40B4-BE49-F238E27FC236}">
-                <a16:creationId xmlns:a16="http://schemas.microsoft.com/office/drawing/2014/main" xmlns="" id="{5A46FAC7-B420-4369-99F1-0554E2203FE7}"/>
+                <a16:creationId xmlns:a16="http://schemas.microsoft.com/office/drawing/2014/main" id="{5A46FAC7-B420-4369-99F1-0554E2203FE7}"/>
               </a:ext>
             </a:extLst>
           </p:cNvPr>
@@ -21607,7 +21350,7 @@
           <p:cNvPr id="6" name="CuadroTexto 5">
             <a:extLst>
               <a:ext uri="{FF2B5EF4-FFF2-40B4-BE49-F238E27FC236}">
-                <a16:creationId xmlns:a16="http://schemas.microsoft.com/office/drawing/2014/main" xmlns="" id="{151D297C-B132-4192-B4C3-139BB440E058}"/>
+                <a16:creationId xmlns:a16="http://schemas.microsoft.com/office/drawing/2014/main" id="{151D297C-B132-4192-B4C3-139BB440E058}"/>
               </a:ext>
             </a:extLst>
           </p:cNvPr>
@@ -21617,7 +21360,7 @@
         <p:spPr>
           <a:xfrm>
             <a:off x="338018" y="1565037"/>
-            <a:ext cx="11853982" cy="4893647"/>
+            <a:ext cx="11853982" cy="4524315"/>
           </a:xfrm>
           <a:prstGeom prst="rect">
             <a:avLst/>
@@ -21655,10 +21398,9 @@
               <a:buChar char="•"/>
             </a:pPr>
             <a:r>
-              <a:rPr lang="es-ES" sz="2400" dirty="0" smtClean="0"/>
+              <a:rPr lang="es-ES" sz="2400" dirty="0"/>
               <a:t>Cronograma</a:t>
             </a:r>
-            <a:endParaRPr lang="es-ES" sz="2400" dirty="0"/>
           </a:p>
           <a:p>
             <a:pPr marL="800100" lvl="1" indent="-342900">
@@ -21717,9 +21459,6 @@
               <a:buFont typeface="Arial" panose="020B0604020202020204" pitchFamily="34" charset="0"/>
               <a:buChar char="•"/>
             </a:pPr>
-            <a:endParaRPr lang="es-ES" sz="2400" dirty="0"/>
-          </a:p>
-          <a:p>
             <a:endParaRPr lang="es-ES" sz="2400" dirty="0"/>
           </a:p>
         </p:txBody>
@@ -21813,7 +21552,7 @@
           <p:cNvPr id="7" name="Imagen 6">
             <a:extLst>
               <a:ext uri="{FF2B5EF4-FFF2-40B4-BE49-F238E27FC236}">
-                <a16:creationId xmlns:a16="http://schemas.microsoft.com/office/drawing/2014/main" xmlns="" id="{5064E33B-1BBF-4006-A3AB-7FE774AF189C}"/>
+                <a16:creationId xmlns:a16="http://schemas.microsoft.com/office/drawing/2014/main" id="{5064E33B-1BBF-4006-A3AB-7FE774AF189C}"/>
               </a:ext>
             </a:extLst>
           </p:cNvPr>
@@ -21843,7 +21582,7 @@
           <p:cNvPr id="5" name="Marcador de número de diapositiva 4">
             <a:extLst>
               <a:ext uri="{FF2B5EF4-FFF2-40B4-BE49-F238E27FC236}">
-                <a16:creationId xmlns:a16="http://schemas.microsoft.com/office/drawing/2014/main" xmlns="" id="{C8FB015C-95FD-4710-9F93-3012CE4B2032}"/>
+                <a16:creationId xmlns:a16="http://schemas.microsoft.com/office/drawing/2014/main" id="{C8FB015C-95FD-4710-9F93-3012CE4B2032}"/>
               </a:ext>
             </a:extLst>
           </p:cNvPr>
@@ -21870,7 +21609,7 @@
             </a:fld>
             <a:r>
               <a:rPr lang="es-ES" sz="2000" dirty="0"/>
-              <a:t>/22</a:t>
+              <a:t>/20</a:t>
             </a:r>
           </a:p>
         </p:txBody>
@@ -21880,7 +21619,7 @@
           <p:cNvPr id="3" name="Imagen 2">
             <a:extLst>
               <a:ext uri="{FF2B5EF4-FFF2-40B4-BE49-F238E27FC236}">
-                <a16:creationId xmlns:a16="http://schemas.microsoft.com/office/drawing/2014/main" xmlns="" id="{6B4BEE6E-E5EF-4F44-B226-C7A668E20D70}"/>
+                <a16:creationId xmlns:a16="http://schemas.microsoft.com/office/drawing/2014/main" id="{6B4BEE6E-E5EF-4F44-B226-C7A668E20D70}"/>
               </a:ext>
             </a:extLst>
           </p:cNvPr>
@@ -21910,7 +21649,7 @@
           <p:cNvPr id="11" name="Título 1">
             <a:extLst>
               <a:ext uri="{FF2B5EF4-FFF2-40B4-BE49-F238E27FC236}">
-                <a16:creationId xmlns:a16="http://schemas.microsoft.com/office/drawing/2014/main" xmlns="" id="{67271E57-A755-4D15-8F0C-6BEE847D5029}"/>
+                <a16:creationId xmlns:a16="http://schemas.microsoft.com/office/drawing/2014/main" id="{67271E57-A755-4D15-8F0C-6BEE847D5029}"/>
               </a:ext>
             </a:extLst>
           </p:cNvPr>
@@ -21943,7 +21682,7 @@
           <p:cNvPr id="16" name="Imagen 15">
             <a:extLst>
               <a:ext uri="{FF2B5EF4-FFF2-40B4-BE49-F238E27FC236}">
-                <a16:creationId xmlns:a16="http://schemas.microsoft.com/office/drawing/2014/main" xmlns="" id="{6B86E196-0EF3-465A-9ADF-1CAC3EEC009C}"/>
+                <a16:creationId xmlns:a16="http://schemas.microsoft.com/office/drawing/2014/main" id="{6B86E196-0EF3-465A-9ADF-1CAC3EEC009C}"/>
               </a:ext>
             </a:extLst>
           </p:cNvPr>
@@ -22003,7 +21742,7 @@
           <p:cNvPr id="6" name="Imagen 5">
             <a:extLst>
               <a:ext uri="{FF2B5EF4-FFF2-40B4-BE49-F238E27FC236}">
-                <a16:creationId xmlns:a16="http://schemas.microsoft.com/office/drawing/2014/main" xmlns="" id="{D0A1FEC7-D45B-494E-8A71-2D9082CF8FAD}"/>
+                <a16:creationId xmlns:a16="http://schemas.microsoft.com/office/drawing/2014/main" id="{D0A1FEC7-D45B-494E-8A71-2D9082CF8FAD}"/>
               </a:ext>
             </a:extLst>
           </p:cNvPr>
@@ -22033,7 +21772,7 @@
           <p:cNvPr id="7" name="Imagen 6">
             <a:extLst>
               <a:ext uri="{FF2B5EF4-FFF2-40B4-BE49-F238E27FC236}">
-                <a16:creationId xmlns:a16="http://schemas.microsoft.com/office/drawing/2014/main" xmlns="" id="{5064E33B-1BBF-4006-A3AB-7FE774AF189C}"/>
+                <a16:creationId xmlns:a16="http://schemas.microsoft.com/office/drawing/2014/main" id="{5064E33B-1BBF-4006-A3AB-7FE774AF189C}"/>
               </a:ext>
             </a:extLst>
           </p:cNvPr>
@@ -22063,7 +21802,7 @@
           <p:cNvPr id="5" name="Marcador de número de diapositiva 4">
             <a:extLst>
               <a:ext uri="{FF2B5EF4-FFF2-40B4-BE49-F238E27FC236}">
-                <a16:creationId xmlns:a16="http://schemas.microsoft.com/office/drawing/2014/main" xmlns="" id="{C8FB015C-95FD-4710-9F93-3012CE4B2032}"/>
+                <a16:creationId xmlns:a16="http://schemas.microsoft.com/office/drawing/2014/main" id="{C8FB015C-95FD-4710-9F93-3012CE4B2032}"/>
               </a:ext>
             </a:extLst>
           </p:cNvPr>
@@ -22090,7 +21829,7 @@
             </a:fld>
             <a:r>
               <a:rPr lang="es-ES" sz="2000" dirty="0"/>
-              <a:t>/22</a:t>
+              <a:t>/20</a:t>
             </a:r>
           </a:p>
         </p:txBody>
@@ -22100,7 +21839,7 @@
           <p:cNvPr id="10" name="Título 1">
             <a:extLst>
               <a:ext uri="{FF2B5EF4-FFF2-40B4-BE49-F238E27FC236}">
-                <a16:creationId xmlns:a16="http://schemas.microsoft.com/office/drawing/2014/main" xmlns="" id="{345D5F3B-A621-4163-8264-4F58656ECA94}"/>
+                <a16:creationId xmlns:a16="http://schemas.microsoft.com/office/drawing/2014/main" id="{345D5F3B-A621-4163-8264-4F58656ECA94}"/>
               </a:ext>
             </a:extLst>
           </p:cNvPr>
@@ -22133,7 +21872,7 @@
           <p:cNvPr id="15" name="Imagen 14">
             <a:extLst>
               <a:ext uri="{FF2B5EF4-FFF2-40B4-BE49-F238E27FC236}">
-                <a16:creationId xmlns:a16="http://schemas.microsoft.com/office/drawing/2014/main" xmlns="" id="{DD538F45-5580-49DC-8B2D-98951FD89806}"/>
+                <a16:creationId xmlns:a16="http://schemas.microsoft.com/office/drawing/2014/main" id="{DD538F45-5580-49DC-8B2D-98951FD89806}"/>
               </a:ext>
             </a:extLst>
           </p:cNvPr>
@@ -22193,7 +21932,7 @@
           <p:cNvPr id="11" name="Imagen 10">
             <a:extLst>
               <a:ext uri="{FF2B5EF4-FFF2-40B4-BE49-F238E27FC236}">
-                <a16:creationId xmlns:a16="http://schemas.microsoft.com/office/drawing/2014/main" xmlns="" id="{3FD14774-0F21-41E9-821D-D124BF6C261E}"/>
+                <a16:creationId xmlns:a16="http://schemas.microsoft.com/office/drawing/2014/main" id="{3FD14774-0F21-41E9-821D-D124BF6C261E}"/>
               </a:ext>
             </a:extLst>
           </p:cNvPr>
@@ -22223,7 +21962,7 @@
           <p:cNvPr id="7" name="Imagen 6">
             <a:extLst>
               <a:ext uri="{FF2B5EF4-FFF2-40B4-BE49-F238E27FC236}">
-                <a16:creationId xmlns:a16="http://schemas.microsoft.com/office/drawing/2014/main" xmlns="" id="{5064E33B-1BBF-4006-A3AB-7FE774AF189C}"/>
+                <a16:creationId xmlns:a16="http://schemas.microsoft.com/office/drawing/2014/main" id="{5064E33B-1BBF-4006-A3AB-7FE774AF189C}"/>
               </a:ext>
             </a:extLst>
           </p:cNvPr>
@@ -22253,7 +21992,7 @@
           <p:cNvPr id="5" name="Marcador de número de diapositiva 4">
             <a:extLst>
               <a:ext uri="{FF2B5EF4-FFF2-40B4-BE49-F238E27FC236}">
-                <a16:creationId xmlns:a16="http://schemas.microsoft.com/office/drawing/2014/main" xmlns="" id="{C8FB015C-95FD-4710-9F93-3012CE4B2032}"/>
+                <a16:creationId xmlns:a16="http://schemas.microsoft.com/office/drawing/2014/main" id="{C8FB015C-95FD-4710-9F93-3012CE4B2032}"/>
               </a:ext>
             </a:extLst>
           </p:cNvPr>
@@ -22280,7 +22019,7 @@
             </a:fld>
             <a:r>
               <a:rPr lang="es-ES" sz="2000" dirty="0"/>
-              <a:t>/22</a:t>
+              <a:t>/20</a:t>
             </a:r>
           </a:p>
         </p:txBody>
@@ -22290,7 +22029,7 @@
           <p:cNvPr id="10" name="Título 1">
             <a:extLst>
               <a:ext uri="{FF2B5EF4-FFF2-40B4-BE49-F238E27FC236}">
-                <a16:creationId xmlns:a16="http://schemas.microsoft.com/office/drawing/2014/main" xmlns="" id="{345D5F3B-A621-4163-8264-4F58656ECA94}"/>
+                <a16:creationId xmlns:a16="http://schemas.microsoft.com/office/drawing/2014/main" id="{345D5F3B-A621-4163-8264-4F58656ECA94}"/>
               </a:ext>
             </a:extLst>
           </p:cNvPr>
@@ -22323,7 +22062,7 @@
           <p:cNvPr id="2" name="Imagen 1">
             <a:extLst>
               <a:ext uri="{FF2B5EF4-FFF2-40B4-BE49-F238E27FC236}">
-                <a16:creationId xmlns:a16="http://schemas.microsoft.com/office/drawing/2014/main" xmlns="" id="{54AAFEA4-B242-4194-A802-451A943666CE}"/>
+                <a16:creationId xmlns:a16="http://schemas.microsoft.com/office/drawing/2014/main" id="{54AAFEA4-B242-4194-A802-451A943666CE}"/>
               </a:ext>
             </a:extLst>
           </p:cNvPr>
@@ -22383,7 +22122,7 @@
           <p:cNvPr id="7" name="Imagen 6">
             <a:extLst>
               <a:ext uri="{FF2B5EF4-FFF2-40B4-BE49-F238E27FC236}">
-                <a16:creationId xmlns:a16="http://schemas.microsoft.com/office/drawing/2014/main" xmlns="" id="{5064E33B-1BBF-4006-A3AB-7FE774AF189C}"/>
+                <a16:creationId xmlns:a16="http://schemas.microsoft.com/office/drawing/2014/main" id="{5064E33B-1BBF-4006-A3AB-7FE774AF189C}"/>
               </a:ext>
             </a:extLst>
           </p:cNvPr>
@@ -22413,7 +22152,7 @@
           <p:cNvPr id="5" name="Marcador de número de diapositiva 4">
             <a:extLst>
               <a:ext uri="{FF2B5EF4-FFF2-40B4-BE49-F238E27FC236}">
-                <a16:creationId xmlns:a16="http://schemas.microsoft.com/office/drawing/2014/main" xmlns="" id="{C8FB015C-95FD-4710-9F93-3012CE4B2032}"/>
+                <a16:creationId xmlns:a16="http://schemas.microsoft.com/office/drawing/2014/main" id="{C8FB015C-95FD-4710-9F93-3012CE4B2032}"/>
               </a:ext>
             </a:extLst>
           </p:cNvPr>
@@ -22440,7 +22179,7 @@
             </a:fld>
             <a:r>
               <a:rPr lang="es-ES" sz="2000" dirty="0"/>
-              <a:t>/22</a:t>
+              <a:t>/20</a:t>
             </a:r>
           </a:p>
         </p:txBody>
@@ -22450,7 +22189,7 @@
           <p:cNvPr id="10" name="Título 1">
             <a:extLst>
               <a:ext uri="{FF2B5EF4-FFF2-40B4-BE49-F238E27FC236}">
-                <a16:creationId xmlns:a16="http://schemas.microsoft.com/office/drawing/2014/main" xmlns="" id="{988CBAEE-F6AA-4803-B1B3-9B749514A7A4}"/>
+                <a16:creationId xmlns:a16="http://schemas.microsoft.com/office/drawing/2014/main" id="{988CBAEE-F6AA-4803-B1B3-9B749514A7A4}"/>
               </a:ext>
             </a:extLst>
           </p:cNvPr>
@@ -22483,7 +22222,7 @@
           <p:cNvPr id="11" name="CuadroTexto 10">
             <a:extLst>
               <a:ext uri="{FF2B5EF4-FFF2-40B4-BE49-F238E27FC236}">
-                <a16:creationId xmlns:a16="http://schemas.microsoft.com/office/drawing/2014/main" xmlns="" id="{DCC2A0E0-ED86-4512-945A-5C7F9572552B}"/>
+                <a16:creationId xmlns:a16="http://schemas.microsoft.com/office/drawing/2014/main" id="{DCC2A0E0-ED86-4512-945A-5C7F9572552B}"/>
               </a:ext>
             </a:extLst>
           </p:cNvPr>
@@ -22572,7 +22311,7 @@
           <p:cNvPr id="12" name="Imagen 11">
             <a:extLst>
               <a:ext uri="{FF2B5EF4-FFF2-40B4-BE49-F238E27FC236}">
-                <a16:creationId xmlns:a16="http://schemas.microsoft.com/office/drawing/2014/main" xmlns="" id="{F02A96F4-017D-4B67-9259-031E94F805F9}"/>
+                <a16:creationId xmlns:a16="http://schemas.microsoft.com/office/drawing/2014/main" id="{F02A96F4-017D-4B67-9259-031E94F805F9}"/>
               </a:ext>
             </a:extLst>
           </p:cNvPr>
@@ -22602,7 +22341,7 @@
           <p:cNvPr id="13" name="Imagen 12">
             <a:extLst>
               <a:ext uri="{FF2B5EF4-FFF2-40B4-BE49-F238E27FC236}">
-                <a16:creationId xmlns:a16="http://schemas.microsoft.com/office/drawing/2014/main" xmlns="" id="{94FEE7F5-8B47-4831-BE59-62FC2AE6FD06}"/>
+                <a16:creationId xmlns:a16="http://schemas.microsoft.com/office/drawing/2014/main" id="{94FEE7F5-8B47-4831-BE59-62FC2AE6FD06}"/>
               </a:ext>
             </a:extLst>
           </p:cNvPr>
@@ -22632,7 +22371,7 @@
           <p:cNvPr id="14" name="Imagen 13">
             <a:extLst>
               <a:ext uri="{FF2B5EF4-FFF2-40B4-BE49-F238E27FC236}">
-                <a16:creationId xmlns:a16="http://schemas.microsoft.com/office/drawing/2014/main" xmlns="" id="{DAA89F37-148B-4BF8-A9B6-2D5A947490A2}"/>
+                <a16:creationId xmlns:a16="http://schemas.microsoft.com/office/drawing/2014/main" id="{DAA89F37-148B-4BF8-A9B6-2D5A947490A2}"/>
               </a:ext>
             </a:extLst>
           </p:cNvPr>
@@ -22662,7 +22401,7 @@
           <p:cNvPr id="15" name="Imagen 14">
             <a:extLst>
               <a:ext uri="{FF2B5EF4-FFF2-40B4-BE49-F238E27FC236}">
-                <a16:creationId xmlns:a16="http://schemas.microsoft.com/office/drawing/2014/main" xmlns="" id="{71258840-B595-4B80-BC33-59EC4AA05FD1}"/>
+                <a16:creationId xmlns:a16="http://schemas.microsoft.com/office/drawing/2014/main" id="{71258840-B595-4B80-BC33-59EC4AA05FD1}"/>
               </a:ext>
             </a:extLst>
           </p:cNvPr>
@@ -22722,7 +22461,7 @@
           <p:cNvPr id="7" name="Imagen 6">
             <a:extLst>
               <a:ext uri="{FF2B5EF4-FFF2-40B4-BE49-F238E27FC236}">
-                <a16:creationId xmlns:a16="http://schemas.microsoft.com/office/drawing/2014/main" xmlns="" id="{5064E33B-1BBF-4006-A3AB-7FE774AF189C}"/>
+                <a16:creationId xmlns:a16="http://schemas.microsoft.com/office/drawing/2014/main" id="{5064E33B-1BBF-4006-A3AB-7FE774AF189C}"/>
               </a:ext>
             </a:extLst>
           </p:cNvPr>
@@ -22752,7 +22491,7 @@
           <p:cNvPr id="5" name="Marcador de número de diapositiva 4">
             <a:extLst>
               <a:ext uri="{FF2B5EF4-FFF2-40B4-BE49-F238E27FC236}">
-                <a16:creationId xmlns:a16="http://schemas.microsoft.com/office/drawing/2014/main" xmlns="" id="{C8FB015C-95FD-4710-9F93-3012CE4B2032}"/>
+                <a16:creationId xmlns:a16="http://schemas.microsoft.com/office/drawing/2014/main" id="{C8FB015C-95FD-4710-9F93-3012CE4B2032}"/>
               </a:ext>
             </a:extLst>
           </p:cNvPr>
@@ -22779,7 +22518,7 @@
             </a:fld>
             <a:r>
               <a:rPr lang="es-ES" sz="2000" dirty="0"/>
-              <a:t>/22</a:t>
+              <a:t>/20</a:t>
             </a:r>
           </a:p>
         </p:txBody>
@@ -22789,7 +22528,7 @@
           <p:cNvPr id="8" name="Título 1">
             <a:extLst>
               <a:ext uri="{FF2B5EF4-FFF2-40B4-BE49-F238E27FC236}">
-                <a16:creationId xmlns:a16="http://schemas.microsoft.com/office/drawing/2014/main" xmlns="" id="{C4D76957-1026-478C-AC57-D27832D55639}"/>
+                <a16:creationId xmlns:a16="http://schemas.microsoft.com/office/drawing/2014/main" id="{C4D76957-1026-478C-AC57-D27832D55639}"/>
               </a:ext>
             </a:extLst>
           </p:cNvPr>
@@ -22822,7 +22561,7 @@
           <p:cNvPr id="10" name="CuadroTexto 9">
             <a:extLst>
               <a:ext uri="{FF2B5EF4-FFF2-40B4-BE49-F238E27FC236}">
-                <a16:creationId xmlns:a16="http://schemas.microsoft.com/office/drawing/2014/main" xmlns="" id="{DF121DF3-A7F0-4A65-ADBD-8ACE646479F6}"/>
+                <a16:creationId xmlns:a16="http://schemas.microsoft.com/office/drawing/2014/main" id="{DF121DF3-A7F0-4A65-ADBD-8ACE646479F6}"/>
               </a:ext>
             </a:extLst>
           </p:cNvPr>
@@ -22870,68 +22609,8 @@
               <a:buChar char="•"/>
             </a:pPr>
             <a:r>
-              <a:rPr lang="es-ES" sz="2000" dirty="0" smtClean="0"/>
-              <a:t>Inicial 20</a:t>
-            </a:r>
-            <a:r>
               <a:rPr lang="es-ES" sz="2000" dirty="0"/>
-              <a:t>% | </a:t>
-            </a:r>
-            <a:r>
-              <a:rPr lang="es-ES" sz="2000" dirty="0" smtClean="0"/>
-              <a:t>Diciembre</a:t>
-            </a:r>
-            <a:r>
-              <a:rPr lang="es-ES" sz="2000" dirty="0" smtClean="0"/>
-              <a:t> 20</a:t>
-            </a:r>
-            <a:r>
-              <a:rPr lang="es-ES" sz="2000" dirty="0"/>
-              <a:t>% | </a:t>
-            </a:r>
-            <a:r>
-              <a:rPr lang="es-ES" sz="2000" dirty="0" smtClean="0"/>
-              <a:t>Marzo 10</a:t>
-            </a:r>
-            <a:r>
-              <a:rPr lang="es-ES" sz="2000" dirty="0"/>
-              <a:t>% | </a:t>
-            </a:r>
-            <a:r>
-              <a:rPr lang="es-ES" sz="2000" dirty="0" smtClean="0"/>
-              <a:t>Abril 10</a:t>
-            </a:r>
-            <a:r>
-              <a:rPr lang="es-ES" sz="2000" dirty="0"/>
-              <a:t>% </a:t>
-            </a:r>
-            <a:r>
-              <a:rPr lang="es-ES" sz="2000" dirty="0" smtClean="0"/>
-              <a:t>Junio </a:t>
-            </a:r>
-            <a:r>
-              <a:rPr lang="es-ES" sz="2000" dirty="0" smtClean="0"/>
-              <a:t>20</a:t>
-            </a:r>
-            <a:r>
-              <a:rPr lang="es-ES" sz="2000" dirty="0"/>
-              <a:t>% </a:t>
-            </a:r>
-            <a:r>
-              <a:rPr lang="es-ES" sz="2000" dirty="0" smtClean="0"/>
-              <a:t>| Agosto </a:t>
-            </a:r>
-            <a:r>
-              <a:rPr lang="es-ES" sz="2000" dirty="0"/>
-              <a:t>10% | </a:t>
-            </a:r>
-            <a:r>
-              <a:rPr lang="es-ES" sz="2000" dirty="0" smtClean="0"/>
-              <a:t>Septiembre 10</a:t>
-            </a:r>
-            <a:r>
-              <a:rPr lang="es-ES" sz="2000" dirty="0"/>
-              <a:t>%</a:t>
+              <a:t>Inicial 20% | Diciembre 20% | Marzo 10% | Abril 10% Junio 20% | Agosto 10% | Septiembre 10%</a:t>
             </a:r>
           </a:p>
           <a:p>
@@ -22944,7 +22623,7 @@
           <p:cNvPr id="9" name="1 Gráfico">
             <a:extLst>
               <a:ext uri="{FF2B5EF4-FFF2-40B4-BE49-F238E27FC236}">
-                <a16:creationId xmlns:a16="http://schemas.microsoft.com/office/drawing/2014/main" xmlns="" id="{00000000-0008-0000-0000-000002000000}"/>
+                <a16:creationId xmlns:a16="http://schemas.microsoft.com/office/drawing/2014/main" id="{00000000-0008-0000-0000-000002000000}"/>
               </a:ext>
             </a:extLst>
           </p:cNvPr>
@@ -23004,7 +22683,7 @@
           <p:cNvPr id="5" name="Imagen 4">
             <a:extLst>
               <a:ext uri="{FF2B5EF4-FFF2-40B4-BE49-F238E27FC236}">
-                <a16:creationId xmlns:a16="http://schemas.microsoft.com/office/drawing/2014/main" xmlns="" id="{5F32BD73-4768-2A49-98C4-124715923DBC}"/>
+                <a16:creationId xmlns:a16="http://schemas.microsoft.com/office/drawing/2014/main" id="{5F32BD73-4768-2A49-98C4-124715923DBC}"/>
               </a:ext>
             </a:extLst>
           </p:cNvPr>
@@ -23034,7 +22713,7 @@
           <p:cNvPr id="2" name="Título 1">
             <a:extLst>
               <a:ext uri="{FF2B5EF4-FFF2-40B4-BE49-F238E27FC236}">
-                <a16:creationId xmlns:a16="http://schemas.microsoft.com/office/drawing/2014/main" xmlns="" id="{B9B0D241-1721-BB42-8643-D80DD19A3280}"/>
+                <a16:creationId xmlns:a16="http://schemas.microsoft.com/office/drawing/2014/main" id="{B9B0D241-1721-BB42-8643-D80DD19A3280}"/>
               </a:ext>
             </a:extLst>
           </p:cNvPr>
@@ -23068,7 +22747,7 @@
           <p:cNvPr id="6" name="Marcador de número de diapositiva 5">
             <a:extLst>
               <a:ext uri="{FF2B5EF4-FFF2-40B4-BE49-F238E27FC236}">
-                <a16:creationId xmlns:a16="http://schemas.microsoft.com/office/drawing/2014/main" xmlns="" id="{EA72CA66-3062-4C85-AB3F-209F5F6EE309}"/>
+                <a16:creationId xmlns:a16="http://schemas.microsoft.com/office/drawing/2014/main" id="{EA72CA66-3062-4C85-AB3F-209F5F6EE309}"/>
               </a:ext>
             </a:extLst>
           </p:cNvPr>
@@ -23095,7 +22774,7 @@
             </a:fld>
             <a:r>
               <a:rPr lang="es-ES" sz="2000" dirty="0"/>
-              <a:t>/24</a:t>
+              <a:t>/20</a:t>
             </a:r>
           </a:p>
         </p:txBody>
@@ -23105,7 +22784,7 @@
           <p:cNvPr id="14" name="Diagrama 13">
             <a:extLst>
               <a:ext uri="{FF2B5EF4-FFF2-40B4-BE49-F238E27FC236}">
-                <a16:creationId xmlns:a16="http://schemas.microsoft.com/office/drawing/2014/main" xmlns="" id="{189F9F86-9971-334E-90DE-0CE47668FF4B}"/>
+                <a16:creationId xmlns:a16="http://schemas.microsoft.com/office/drawing/2014/main" id="{189F9F86-9971-334E-90DE-0CE47668FF4B}"/>
               </a:ext>
             </a:extLst>
           </p:cNvPr>
@@ -23133,7 +22812,7 @@
           <p:cNvPr id="15" name="Flecha derecha 14">
             <a:extLst>
               <a:ext uri="{FF2B5EF4-FFF2-40B4-BE49-F238E27FC236}">
-                <a16:creationId xmlns:a16="http://schemas.microsoft.com/office/drawing/2014/main" xmlns="" id="{8169F9E9-B02E-9C4F-AAE0-6695B9530A97}"/>
+                <a16:creationId xmlns:a16="http://schemas.microsoft.com/office/drawing/2014/main" id="{8169F9E9-B02E-9C4F-AAE0-6695B9530A97}"/>
               </a:ext>
             </a:extLst>
           </p:cNvPr>
@@ -23179,7 +22858,7 @@
           <p:cNvPr id="16" name="Anillo 15">
             <a:extLst>
               <a:ext uri="{FF2B5EF4-FFF2-40B4-BE49-F238E27FC236}">
-                <a16:creationId xmlns:a16="http://schemas.microsoft.com/office/drawing/2014/main" xmlns="" id="{E4847C0D-D5C0-034B-AC76-16A584EEFE3B}"/>
+                <a16:creationId xmlns:a16="http://schemas.microsoft.com/office/drawing/2014/main" id="{E4847C0D-D5C0-034B-AC76-16A584EEFE3B}"/>
               </a:ext>
             </a:extLst>
           </p:cNvPr>
@@ -23229,7 +22908,7 @@
           <p:cNvPr id="17" name="Anillo 16">
             <a:extLst>
               <a:ext uri="{FF2B5EF4-FFF2-40B4-BE49-F238E27FC236}">
-                <a16:creationId xmlns:a16="http://schemas.microsoft.com/office/drawing/2014/main" xmlns="" id="{7CF0BC9B-4F48-8E43-829F-3C4F973176D1}"/>
+                <a16:creationId xmlns:a16="http://schemas.microsoft.com/office/drawing/2014/main" id="{7CF0BC9B-4F48-8E43-829F-3C4F973176D1}"/>
               </a:ext>
             </a:extLst>
           </p:cNvPr>
@@ -23279,7 +22958,7 @@
           <p:cNvPr id="18" name="Anillo 17">
             <a:extLst>
               <a:ext uri="{FF2B5EF4-FFF2-40B4-BE49-F238E27FC236}">
-                <a16:creationId xmlns:a16="http://schemas.microsoft.com/office/drawing/2014/main" xmlns="" id="{C2ED0A51-FD41-CC45-98BC-792010113921}"/>
+                <a16:creationId xmlns:a16="http://schemas.microsoft.com/office/drawing/2014/main" id="{C2ED0A51-FD41-CC45-98BC-792010113921}"/>
               </a:ext>
             </a:extLst>
           </p:cNvPr>
@@ -23329,7 +23008,7 @@
           <p:cNvPr id="19" name="Anillo 18">
             <a:extLst>
               <a:ext uri="{FF2B5EF4-FFF2-40B4-BE49-F238E27FC236}">
-                <a16:creationId xmlns:a16="http://schemas.microsoft.com/office/drawing/2014/main" xmlns="" id="{5089576A-0BD8-3141-9700-67D806F10784}"/>
+                <a16:creationId xmlns:a16="http://schemas.microsoft.com/office/drawing/2014/main" id="{5089576A-0BD8-3141-9700-67D806F10784}"/>
               </a:ext>
             </a:extLst>
           </p:cNvPr>
@@ -23379,7 +23058,7 @@
           <p:cNvPr id="20" name="Anillo 19">
             <a:extLst>
               <a:ext uri="{FF2B5EF4-FFF2-40B4-BE49-F238E27FC236}">
-                <a16:creationId xmlns:a16="http://schemas.microsoft.com/office/drawing/2014/main" xmlns="" id="{41220052-AE07-DD4A-AFF9-7275564AB419}"/>
+                <a16:creationId xmlns:a16="http://schemas.microsoft.com/office/drawing/2014/main" id="{41220052-AE07-DD4A-AFF9-7275564AB419}"/>
               </a:ext>
             </a:extLst>
           </p:cNvPr>
@@ -23429,7 +23108,7 @@
           <p:cNvPr id="21" name="Anillo 20">
             <a:extLst>
               <a:ext uri="{FF2B5EF4-FFF2-40B4-BE49-F238E27FC236}">
-                <a16:creationId xmlns:a16="http://schemas.microsoft.com/office/drawing/2014/main" xmlns="" id="{84365D38-197A-8249-B2C3-92ECD11417AD}"/>
+                <a16:creationId xmlns:a16="http://schemas.microsoft.com/office/drawing/2014/main" id="{84365D38-197A-8249-B2C3-92ECD11417AD}"/>
               </a:ext>
             </a:extLst>
           </p:cNvPr>
@@ -23479,7 +23158,7 @@
           <p:cNvPr id="22" name="Anillo 21">
             <a:extLst>
               <a:ext uri="{FF2B5EF4-FFF2-40B4-BE49-F238E27FC236}">
-                <a16:creationId xmlns:a16="http://schemas.microsoft.com/office/drawing/2014/main" xmlns="" id="{84413EE8-8876-2A4D-9770-BB7D2C172F69}"/>
+                <a16:creationId xmlns:a16="http://schemas.microsoft.com/office/drawing/2014/main" id="{84413EE8-8876-2A4D-9770-BB7D2C172F69}"/>
               </a:ext>
             </a:extLst>
           </p:cNvPr>
@@ -23529,7 +23208,7 @@
           <p:cNvPr id="23" name="Anillo 22">
             <a:extLst>
               <a:ext uri="{FF2B5EF4-FFF2-40B4-BE49-F238E27FC236}">
-                <a16:creationId xmlns:a16="http://schemas.microsoft.com/office/drawing/2014/main" xmlns="" id="{A7F81AEC-66E8-AD48-8597-58DE4A8A2A80}"/>
+                <a16:creationId xmlns:a16="http://schemas.microsoft.com/office/drawing/2014/main" id="{A7F81AEC-66E8-AD48-8597-58DE4A8A2A80}"/>
               </a:ext>
             </a:extLst>
           </p:cNvPr>
@@ -23579,7 +23258,7 @@
           <p:cNvPr id="24" name="Anillo 23">
             <a:extLst>
               <a:ext uri="{FF2B5EF4-FFF2-40B4-BE49-F238E27FC236}">
-                <a16:creationId xmlns:a16="http://schemas.microsoft.com/office/drawing/2014/main" xmlns="" id="{282AAF2E-EBC2-2242-BE02-85C99593B576}"/>
+                <a16:creationId xmlns:a16="http://schemas.microsoft.com/office/drawing/2014/main" id="{282AAF2E-EBC2-2242-BE02-85C99593B576}"/>
               </a:ext>
             </a:extLst>
           </p:cNvPr>
@@ -23659,7 +23338,7 @@
           <p:cNvPr id="5" name="Imagen 4">
             <a:extLst>
               <a:ext uri="{FF2B5EF4-FFF2-40B4-BE49-F238E27FC236}">
-                <a16:creationId xmlns:a16="http://schemas.microsoft.com/office/drawing/2014/main" xmlns="" id="{5F32BD73-4768-2A49-98C4-124715923DBC}"/>
+                <a16:creationId xmlns:a16="http://schemas.microsoft.com/office/drawing/2014/main" id="{5F32BD73-4768-2A49-98C4-124715923DBC}"/>
               </a:ext>
             </a:extLst>
           </p:cNvPr>
@@ -23689,7 +23368,7 @@
           <p:cNvPr id="2" name="Título 1">
             <a:extLst>
               <a:ext uri="{FF2B5EF4-FFF2-40B4-BE49-F238E27FC236}">
-                <a16:creationId xmlns:a16="http://schemas.microsoft.com/office/drawing/2014/main" xmlns="" id="{B9B0D241-1721-BB42-8643-D80DD19A3280}"/>
+                <a16:creationId xmlns:a16="http://schemas.microsoft.com/office/drawing/2014/main" id="{B9B0D241-1721-BB42-8643-D80DD19A3280}"/>
               </a:ext>
             </a:extLst>
           </p:cNvPr>
@@ -23723,7 +23402,7 @@
           <p:cNvPr id="6" name="Marcador de número de diapositiva 5">
             <a:extLst>
               <a:ext uri="{FF2B5EF4-FFF2-40B4-BE49-F238E27FC236}">
-                <a16:creationId xmlns:a16="http://schemas.microsoft.com/office/drawing/2014/main" xmlns="" id="{EA72CA66-3062-4C85-AB3F-209F5F6EE309}"/>
+                <a16:creationId xmlns:a16="http://schemas.microsoft.com/office/drawing/2014/main" id="{EA72CA66-3062-4C85-AB3F-209F5F6EE309}"/>
               </a:ext>
             </a:extLst>
           </p:cNvPr>
@@ -23750,7 +23429,7 @@
             </a:fld>
             <a:r>
               <a:rPr lang="es-ES" sz="2000" dirty="0"/>
-              <a:t>/24</a:t>
+              <a:t>/20</a:t>
             </a:r>
           </a:p>
         </p:txBody>
@@ -23760,7 +23439,7 @@
           <p:cNvPr id="7" name="Diagrama 6">
             <a:extLst>
               <a:ext uri="{FF2B5EF4-FFF2-40B4-BE49-F238E27FC236}">
-                <a16:creationId xmlns:a16="http://schemas.microsoft.com/office/drawing/2014/main" xmlns="" id="{6618F1EC-7EE2-AE44-882A-6CDB04AB901A}"/>
+                <a16:creationId xmlns:a16="http://schemas.microsoft.com/office/drawing/2014/main" id="{6618F1EC-7EE2-AE44-882A-6CDB04AB901A}"/>
               </a:ext>
             </a:extLst>
           </p:cNvPr>
@@ -23818,7 +23497,7 @@
           <p:cNvPr id="1026" name="Picture 2" descr="https://www.novages.es/wp-content/uploads/2016/05/Grafica-ascendente1.jpg">
             <a:extLst>
               <a:ext uri="{FF2B5EF4-FFF2-40B4-BE49-F238E27FC236}">
-                <a16:creationId xmlns:a16="http://schemas.microsoft.com/office/drawing/2014/main" xmlns="" id="{3A06A4B5-01EC-438D-90C0-C3C1CBB075C7}"/>
+                <a16:creationId xmlns:a16="http://schemas.microsoft.com/office/drawing/2014/main" id="{3A06A4B5-01EC-438D-90C0-C3C1CBB075C7}"/>
               </a:ext>
             </a:extLst>
           </p:cNvPr>
@@ -23865,7 +23544,7 @@
           <p:cNvPr id="7" name="Imagen 6">
             <a:extLst>
               <a:ext uri="{FF2B5EF4-FFF2-40B4-BE49-F238E27FC236}">
-                <a16:creationId xmlns:a16="http://schemas.microsoft.com/office/drawing/2014/main" xmlns="" id="{5064E33B-1BBF-4006-A3AB-7FE774AF189C}"/>
+                <a16:creationId xmlns:a16="http://schemas.microsoft.com/office/drawing/2014/main" id="{5064E33B-1BBF-4006-A3AB-7FE774AF189C}"/>
               </a:ext>
             </a:extLst>
           </p:cNvPr>
@@ -23895,7 +23574,7 @@
           <p:cNvPr id="5" name="Marcador de número de diapositiva 4">
             <a:extLst>
               <a:ext uri="{FF2B5EF4-FFF2-40B4-BE49-F238E27FC236}">
-                <a16:creationId xmlns:a16="http://schemas.microsoft.com/office/drawing/2014/main" xmlns="" id="{C8FB015C-95FD-4710-9F93-3012CE4B2032}"/>
+                <a16:creationId xmlns:a16="http://schemas.microsoft.com/office/drawing/2014/main" id="{C8FB015C-95FD-4710-9F93-3012CE4B2032}"/>
               </a:ext>
             </a:extLst>
           </p:cNvPr>
@@ -23922,7 +23601,7 @@
             </a:fld>
             <a:r>
               <a:rPr lang="es-ES" sz="2000" dirty="0"/>
-              <a:t>/22</a:t>
+              <a:t>/20</a:t>
             </a:r>
           </a:p>
         </p:txBody>
@@ -23932,7 +23611,7 @@
           <p:cNvPr id="8" name="Título 1">
             <a:extLst>
               <a:ext uri="{FF2B5EF4-FFF2-40B4-BE49-F238E27FC236}">
-                <a16:creationId xmlns:a16="http://schemas.microsoft.com/office/drawing/2014/main" xmlns="" id="{3C7ABED4-F7D2-4DA5-AC79-471C4AA6D75B}"/>
+                <a16:creationId xmlns:a16="http://schemas.microsoft.com/office/drawing/2014/main" id="{3C7ABED4-F7D2-4DA5-AC79-471C4AA6D75B}"/>
               </a:ext>
             </a:extLst>
           </p:cNvPr>
@@ -23965,7 +23644,7 @@
           <p:cNvPr id="9" name="CuadroTexto 8">
             <a:extLst>
               <a:ext uri="{FF2B5EF4-FFF2-40B4-BE49-F238E27FC236}">
-                <a16:creationId xmlns:a16="http://schemas.microsoft.com/office/drawing/2014/main" xmlns="" id="{B0181D46-D805-4BB5-B119-EC502F6131A3}"/>
+                <a16:creationId xmlns:a16="http://schemas.microsoft.com/office/drawing/2014/main" id="{B0181D46-D805-4BB5-B119-EC502F6131A3}"/>
               </a:ext>
             </a:extLst>
           </p:cNvPr>
@@ -24014,11 +23693,7 @@
             </a:pPr>
             <a:r>
               <a:rPr lang="es-ES" sz="2400" dirty="0"/>
-              <a:t>Ampliación de enfermedades a </a:t>
-            </a:r>
-            <a:r>
-              <a:rPr lang="es-ES" sz="2400" dirty="0" smtClean="0"/>
-              <a:t>tratar</a:t>
+              <a:t>Ampliación de enfermedades a tratar</a:t>
             </a:r>
           </a:p>
           <a:p>
@@ -24027,7 +23702,7 @@
               <a:buChar char="•"/>
             </a:pPr>
             <a:r>
-              <a:rPr lang="es-ES" sz="2400" dirty="0" smtClean="0"/>
+              <a:rPr lang="es-ES" sz="2400" dirty="0"/>
               <a:t>Nuevas tecnologías</a:t>
             </a:r>
           </a:p>
@@ -24045,11 +23720,7 @@
             </a:pPr>
             <a:r>
               <a:rPr lang="es-ES" sz="2400" dirty="0"/>
-              <a:t>Ampliación del número de </a:t>
-            </a:r>
-            <a:r>
-              <a:rPr lang="es-ES" sz="2400" dirty="0" smtClean="0"/>
-              <a:t>hospitales</a:t>
+              <a:t>Ampliación del número de hospitales</a:t>
             </a:r>
           </a:p>
           <a:p>
@@ -24058,7 +23729,7 @@
               <a:buChar char="•"/>
             </a:pPr>
             <a:r>
-              <a:rPr lang="es-ES" sz="2400" dirty="0" smtClean="0"/>
+              <a:rPr lang="es-ES" sz="2400" dirty="0"/>
               <a:t>Mayor aceptación social</a:t>
             </a:r>
           </a:p>
@@ -24096,7 +23767,7 @@
           <p:cNvPr id="10" name="CuadroTexto 9">
             <a:extLst>
               <a:ext uri="{FF2B5EF4-FFF2-40B4-BE49-F238E27FC236}">
-                <a16:creationId xmlns:a16="http://schemas.microsoft.com/office/drawing/2014/main" xmlns="" id="{CA5E6FD3-D60C-4C2B-B8BD-710F0180ADA2}"/>
+                <a16:creationId xmlns:a16="http://schemas.microsoft.com/office/drawing/2014/main" id="{CA5E6FD3-D60C-4C2B-B8BD-710F0180ADA2}"/>
               </a:ext>
             </a:extLst>
           </p:cNvPr>
@@ -24165,7 +23836,7 @@
           <p:cNvPr id="6" name="Picture 5">
             <a:extLst>
               <a:ext uri="{FF2B5EF4-FFF2-40B4-BE49-F238E27FC236}">
-                <a16:creationId xmlns:a16="http://schemas.microsoft.com/office/drawing/2014/main" xmlns="" id="{FD2B775D-6E9C-4F60-892F-E88AEF7D9585}"/>
+                <a16:creationId xmlns:a16="http://schemas.microsoft.com/office/drawing/2014/main" id="{FD2B775D-6E9C-4F60-892F-E88AEF7D9585}"/>
               </a:ext>
             </a:extLst>
           </p:cNvPr>
@@ -24199,7 +23870,7 @@
           <p:cNvPr id="4" name="Imagen 4">
             <a:extLst>
               <a:ext uri="{FF2B5EF4-FFF2-40B4-BE49-F238E27FC236}">
-                <a16:creationId xmlns:a16="http://schemas.microsoft.com/office/drawing/2014/main" xmlns="" id="{282E0993-4F0D-4BD0-B5B2-2CDA92FE2ACE}"/>
+                <a16:creationId xmlns:a16="http://schemas.microsoft.com/office/drawing/2014/main" id="{282E0993-4F0D-4BD0-B5B2-2CDA92FE2ACE}"/>
               </a:ext>
             </a:extLst>
           </p:cNvPr>
@@ -24230,10 +23901,10 @@
       </p:pic>
       <p:sp>
         <p:nvSpPr>
-          <p:cNvPr id="2" name="Marcador de número de diapositiva 1">
+          <p:cNvPr id="5" name="Marcador de número de diapositiva 4">
             <a:extLst>
               <a:ext uri="{FF2B5EF4-FFF2-40B4-BE49-F238E27FC236}">
-                <a16:creationId xmlns:a16="http://schemas.microsoft.com/office/drawing/2014/main" xmlns="" id="{1476AA9E-7E7A-40C1-85F2-AFC09E3AEEF5}"/>
+                <a16:creationId xmlns:a16="http://schemas.microsoft.com/office/drawing/2014/main" id="{D479E687-3ADB-4141-A19B-32B242D8A1EF}"/>
               </a:ext>
             </a:extLst>
           </p:cNvPr>
@@ -24244,16 +23915,24 @@
             <p:ph type="sldNum" sz="quarter" idx="12"/>
           </p:nvPr>
         </p:nvSpPr>
-        <p:spPr/>
+        <p:spPr>
+          <a:xfrm>
+            <a:off x="8763000" y="6108867"/>
+            <a:ext cx="2743200" cy="365125"/>
+          </a:xfrm>
+        </p:spPr>
         <p:txBody>
           <a:bodyPr/>
           <a:lstStyle/>
           <a:p>
             <a:fld id="{D6010774-2920-F049-BD0B-9A28F2A984C5}" type="slidenum">
-              <a:rPr lang="es-ES" smtClean="0"/>
+              <a:rPr lang="es-ES" sz="2000" smtClean="0"/>
               <a:t>20</a:t>
             </a:fld>
-            <a:endParaRPr lang="es-ES"/>
+            <a:r>
+              <a:rPr lang="es-ES" sz="2000" dirty="0"/>
+              <a:t>/20</a:t>
+            </a:r>
           </a:p>
         </p:txBody>
       </p:sp>
@@ -24300,7 +23979,7 @@
           <p:cNvPr id="7" name="Imagen 6">
             <a:extLst>
               <a:ext uri="{FF2B5EF4-FFF2-40B4-BE49-F238E27FC236}">
-                <a16:creationId xmlns:a16="http://schemas.microsoft.com/office/drawing/2014/main" xmlns="" id="{5064E33B-1BBF-4006-A3AB-7FE774AF189C}"/>
+                <a16:creationId xmlns:a16="http://schemas.microsoft.com/office/drawing/2014/main" id="{5064E33B-1BBF-4006-A3AB-7FE774AF189C}"/>
               </a:ext>
             </a:extLst>
           </p:cNvPr>
@@ -24330,7 +24009,7 @@
           <p:cNvPr id="5" name="Marcador de número de diapositiva 4">
             <a:extLst>
               <a:ext uri="{FF2B5EF4-FFF2-40B4-BE49-F238E27FC236}">
-                <a16:creationId xmlns:a16="http://schemas.microsoft.com/office/drawing/2014/main" xmlns="" id="{C8FB015C-95FD-4710-9F93-3012CE4B2032}"/>
+                <a16:creationId xmlns:a16="http://schemas.microsoft.com/office/drawing/2014/main" id="{C8FB015C-95FD-4710-9F93-3012CE4B2032}"/>
               </a:ext>
             </a:extLst>
           </p:cNvPr>
@@ -24357,7 +24036,7 @@
             </a:fld>
             <a:r>
               <a:rPr lang="es-ES" sz="2000" dirty="0"/>
-              <a:t>/22</a:t>
+              <a:t>/20</a:t>
             </a:r>
           </a:p>
         </p:txBody>
@@ -24367,7 +24046,7 @@
           <p:cNvPr id="11" name="Imagen 10" descr="Imagen que contiene texto&#10;&#10;&#10;&#10;Descripción generada automáticamente">
             <a:extLst>
               <a:ext uri="{FF2B5EF4-FFF2-40B4-BE49-F238E27FC236}">
-                <a16:creationId xmlns:a16="http://schemas.microsoft.com/office/drawing/2014/main" xmlns="" id="{2C17273C-672A-6645-9F89-C0CF78BB564F}"/>
+                <a16:creationId xmlns:a16="http://schemas.microsoft.com/office/drawing/2014/main" id="{2C17273C-672A-6645-9F89-C0CF78BB564F}"/>
               </a:ext>
             </a:extLst>
           </p:cNvPr>
@@ -24405,7 +24084,7 @@
           <p:cNvPr id="13" name="Imagen 12">
             <a:extLst>
               <a:ext uri="{FF2B5EF4-FFF2-40B4-BE49-F238E27FC236}">
-                <a16:creationId xmlns:a16="http://schemas.microsoft.com/office/drawing/2014/main" xmlns="" id="{CD227A02-44BF-5645-AE81-26FA69C2F9B1}"/>
+                <a16:creationId xmlns:a16="http://schemas.microsoft.com/office/drawing/2014/main" id="{CD227A02-44BF-5645-AE81-26FA69C2F9B1}"/>
               </a:ext>
             </a:extLst>
           </p:cNvPr>
@@ -24454,7 +24133,7 @@
           <p:cNvPr id="14" name="CuadroTexto 13">
             <a:extLst>
               <a:ext uri="{FF2B5EF4-FFF2-40B4-BE49-F238E27FC236}">
-                <a16:creationId xmlns:a16="http://schemas.microsoft.com/office/drawing/2014/main" xmlns="" id="{BB37DB92-30F9-A748-A6C4-287664E2D814}"/>
+                <a16:creationId xmlns:a16="http://schemas.microsoft.com/office/drawing/2014/main" id="{BB37DB92-30F9-A748-A6C4-287664E2D814}"/>
               </a:ext>
             </a:extLst>
           </p:cNvPr>
@@ -24506,7 +24185,7 @@
           <p:cNvPr id="15" name="CuadroTexto 14">
             <a:extLst>
               <a:ext uri="{FF2B5EF4-FFF2-40B4-BE49-F238E27FC236}">
-                <a16:creationId xmlns:a16="http://schemas.microsoft.com/office/drawing/2014/main" xmlns="" id="{F4E4FF17-8718-6E4E-B635-D4E408E26B71}"/>
+                <a16:creationId xmlns:a16="http://schemas.microsoft.com/office/drawing/2014/main" id="{F4E4FF17-8718-6E4E-B635-D4E408E26B71}"/>
               </a:ext>
             </a:extLst>
           </p:cNvPr>
@@ -24558,7 +24237,7 @@
           <p:cNvPr id="12" name="Título 1">
             <a:extLst>
               <a:ext uri="{FF2B5EF4-FFF2-40B4-BE49-F238E27FC236}">
-                <a16:creationId xmlns:a16="http://schemas.microsoft.com/office/drawing/2014/main" xmlns="" id="{7E198E4E-8FF0-4F1E-8753-6F05BE69B899}"/>
+                <a16:creationId xmlns:a16="http://schemas.microsoft.com/office/drawing/2014/main" id="{7E198E4E-8FF0-4F1E-8753-6F05BE69B899}"/>
               </a:ext>
             </a:extLst>
           </p:cNvPr>
@@ -24621,7 +24300,7 @@
           <p:cNvPr id="2" name="Título 1">
             <a:extLst>
               <a:ext uri="{FF2B5EF4-FFF2-40B4-BE49-F238E27FC236}">
-                <a16:creationId xmlns:a16="http://schemas.microsoft.com/office/drawing/2014/main" xmlns="" id="{984EE94F-A38C-4B45-948E-9FF46419E5C0}"/>
+                <a16:creationId xmlns:a16="http://schemas.microsoft.com/office/drawing/2014/main" id="{984EE94F-A38C-4B45-948E-9FF46419E5C0}"/>
               </a:ext>
             </a:extLst>
           </p:cNvPr>
@@ -24654,7 +24333,7 @@
           <p:cNvPr id="7" name="Imagen 6">
             <a:extLst>
               <a:ext uri="{FF2B5EF4-FFF2-40B4-BE49-F238E27FC236}">
-                <a16:creationId xmlns:a16="http://schemas.microsoft.com/office/drawing/2014/main" xmlns="" id="{5064E33B-1BBF-4006-A3AB-7FE774AF189C}"/>
+                <a16:creationId xmlns:a16="http://schemas.microsoft.com/office/drawing/2014/main" id="{5064E33B-1BBF-4006-A3AB-7FE774AF189C}"/>
               </a:ext>
             </a:extLst>
           </p:cNvPr>
@@ -24684,7 +24363,7 @@
           <p:cNvPr id="5" name="Marcador de número de diapositiva 4">
             <a:extLst>
               <a:ext uri="{FF2B5EF4-FFF2-40B4-BE49-F238E27FC236}">
-                <a16:creationId xmlns:a16="http://schemas.microsoft.com/office/drawing/2014/main" xmlns="" id="{C8FB015C-95FD-4710-9F93-3012CE4B2032}"/>
+                <a16:creationId xmlns:a16="http://schemas.microsoft.com/office/drawing/2014/main" id="{C8FB015C-95FD-4710-9F93-3012CE4B2032}"/>
               </a:ext>
             </a:extLst>
           </p:cNvPr>
@@ -24711,7 +24390,7 @@
             </a:fld>
             <a:r>
               <a:rPr lang="es-ES" sz="2000" dirty="0"/>
-              <a:t>/22</a:t>
+              <a:t>/20</a:t>
             </a:r>
           </a:p>
         </p:txBody>
@@ -24721,7 +24400,7 @@
           <p:cNvPr id="6" name="Imagen 5" descr="Imagen que contiene captura de pantalla, texto, mapa&#10;&#10;&#10;&#10;Descripción generada automáticamente">
             <a:extLst>
               <a:ext uri="{FF2B5EF4-FFF2-40B4-BE49-F238E27FC236}">
-                <a16:creationId xmlns:a16="http://schemas.microsoft.com/office/drawing/2014/main" xmlns="" id="{46B37BF1-48E0-634F-B252-1241DFD531F2}"/>
+                <a16:creationId xmlns:a16="http://schemas.microsoft.com/office/drawing/2014/main" id="{46B37BF1-48E0-634F-B252-1241DFD531F2}"/>
               </a:ext>
             </a:extLst>
           </p:cNvPr>
@@ -24781,7 +24460,7 @@
           <p:cNvPr id="7" name="Imagen 6">
             <a:extLst>
               <a:ext uri="{FF2B5EF4-FFF2-40B4-BE49-F238E27FC236}">
-                <a16:creationId xmlns:a16="http://schemas.microsoft.com/office/drawing/2014/main" xmlns="" id="{5064E33B-1BBF-4006-A3AB-7FE774AF189C}"/>
+                <a16:creationId xmlns:a16="http://schemas.microsoft.com/office/drawing/2014/main" id="{5064E33B-1BBF-4006-A3AB-7FE774AF189C}"/>
               </a:ext>
             </a:extLst>
           </p:cNvPr>
@@ -24811,7 +24490,7 @@
           <p:cNvPr id="5" name="Marcador de número de diapositiva 4">
             <a:extLst>
               <a:ext uri="{FF2B5EF4-FFF2-40B4-BE49-F238E27FC236}">
-                <a16:creationId xmlns:a16="http://schemas.microsoft.com/office/drawing/2014/main" xmlns="" id="{C8FB015C-95FD-4710-9F93-3012CE4B2032}"/>
+                <a16:creationId xmlns:a16="http://schemas.microsoft.com/office/drawing/2014/main" id="{C8FB015C-95FD-4710-9F93-3012CE4B2032}"/>
               </a:ext>
             </a:extLst>
           </p:cNvPr>
@@ -24838,7 +24517,7 @@
             </a:fld>
             <a:r>
               <a:rPr lang="es-ES" sz="2000" dirty="0"/>
-              <a:t>/22</a:t>
+              <a:t>/20</a:t>
             </a:r>
           </a:p>
         </p:txBody>
@@ -24848,7 +24527,7 @@
           <p:cNvPr id="3" name="CuadroTexto 2">
             <a:extLst>
               <a:ext uri="{FF2B5EF4-FFF2-40B4-BE49-F238E27FC236}">
-                <a16:creationId xmlns:a16="http://schemas.microsoft.com/office/drawing/2014/main" xmlns="" id="{8E99FA11-5DBD-E64F-8E15-AE0C4528CB58}"/>
+                <a16:creationId xmlns:a16="http://schemas.microsoft.com/office/drawing/2014/main" id="{8E99FA11-5DBD-E64F-8E15-AE0C4528CB58}"/>
               </a:ext>
             </a:extLst>
           </p:cNvPr>
@@ -24937,7 +24616,7 @@
           <p:cNvPr id="6" name="CuadroTexto 5">
             <a:extLst>
               <a:ext uri="{FF2B5EF4-FFF2-40B4-BE49-F238E27FC236}">
-                <a16:creationId xmlns:a16="http://schemas.microsoft.com/office/drawing/2014/main" xmlns="" id="{3F905F14-76D1-024A-85FE-3AAD0957118B}"/>
+                <a16:creationId xmlns:a16="http://schemas.microsoft.com/office/drawing/2014/main" id="{3F905F14-76D1-024A-85FE-3AAD0957118B}"/>
               </a:ext>
             </a:extLst>
           </p:cNvPr>
@@ -25030,7 +24709,7 @@
           <p:cNvPr id="10" name="Imagen 9">
             <a:extLst>
               <a:ext uri="{FF2B5EF4-FFF2-40B4-BE49-F238E27FC236}">
-                <a16:creationId xmlns:a16="http://schemas.microsoft.com/office/drawing/2014/main" xmlns="" id="{B88CDF19-B70E-1848-A8F3-51FE017B0081}"/>
+                <a16:creationId xmlns:a16="http://schemas.microsoft.com/office/drawing/2014/main" id="{B88CDF19-B70E-1848-A8F3-51FE017B0081}"/>
               </a:ext>
             </a:extLst>
           </p:cNvPr>
@@ -25060,7 +24739,7 @@
           <p:cNvPr id="11" name="CuadroTexto 10">
             <a:extLst>
               <a:ext uri="{FF2B5EF4-FFF2-40B4-BE49-F238E27FC236}">
-                <a16:creationId xmlns:a16="http://schemas.microsoft.com/office/drawing/2014/main" xmlns="" id="{7A301C5F-35E4-F646-9F87-E0E8A6DD89D2}"/>
+                <a16:creationId xmlns:a16="http://schemas.microsoft.com/office/drawing/2014/main" id="{7A301C5F-35E4-F646-9F87-E0E8A6DD89D2}"/>
               </a:ext>
             </a:extLst>
           </p:cNvPr>
@@ -25100,7 +24779,7 @@
           <p:cNvPr id="12" name="Título 1">
             <a:extLst>
               <a:ext uri="{FF2B5EF4-FFF2-40B4-BE49-F238E27FC236}">
-                <a16:creationId xmlns:a16="http://schemas.microsoft.com/office/drawing/2014/main" xmlns="" id="{7C493191-012A-4BD1-87EF-4BCEFE2F6718}"/>
+                <a16:creationId xmlns:a16="http://schemas.microsoft.com/office/drawing/2014/main" id="{7C493191-012A-4BD1-87EF-4BCEFE2F6718}"/>
               </a:ext>
             </a:extLst>
           </p:cNvPr>
@@ -25163,7 +24842,7 @@
           <p:cNvPr id="7" name="Imagen 6">
             <a:extLst>
               <a:ext uri="{FF2B5EF4-FFF2-40B4-BE49-F238E27FC236}">
-                <a16:creationId xmlns:a16="http://schemas.microsoft.com/office/drawing/2014/main" xmlns="" id="{5064E33B-1BBF-4006-A3AB-7FE774AF189C}"/>
+                <a16:creationId xmlns:a16="http://schemas.microsoft.com/office/drawing/2014/main" id="{5064E33B-1BBF-4006-A3AB-7FE774AF189C}"/>
               </a:ext>
             </a:extLst>
           </p:cNvPr>
@@ -25193,7 +24872,7 @@
           <p:cNvPr id="5" name="Marcador de número de diapositiva 4">
             <a:extLst>
               <a:ext uri="{FF2B5EF4-FFF2-40B4-BE49-F238E27FC236}">
-                <a16:creationId xmlns:a16="http://schemas.microsoft.com/office/drawing/2014/main" xmlns="" id="{C8FB015C-95FD-4710-9F93-3012CE4B2032}"/>
+                <a16:creationId xmlns:a16="http://schemas.microsoft.com/office/drawing/2014/main" id="{C8FB015C-95FD-4710-9F93-3012CE4B2032}"/>
               </a:ext>
             </a:extLst>
           </p:cNvPr>
@@ -25220,7 +24899,7 @@
             </a:fld>
             <a:r>
               <a:rPr lang="es-ES" sz="2000" dirty="0"/>
-              <a:t>/22</a:t>
+              <a:t>/20</a:t>
             </a:r>
           </a:p>
         </p:txBody>
@@ -25230,7 +24909,7 @@
           <p:cNvPr id="6" name="Imagen 5">
             <a:extLst>
               <a:ext uri="{FF2B5EF4-FFF2-40B4-BE49-F238E27FC236}">
-                <a16:creationId xmlns:a16="http://schemas.microsoft.com/office/drawing/2014/main" xmlns="" id="{CFE661F0-F988-8A47-9147-34C44DD87939}"/>
+                <a16:creationId xmlns:a16="http://schemas.microsoft.com/office/drawing/2014/main" id="{CFE661F0-F988-8A47-9147-34C44DD87939}"/>
               </a:ext>
             </a:extLst>
           </p:cNvPr>
@@ -25260,7 +24939,7 @@
           <p:cNvPr id="8" name="Imagen 7">
             <a:extLst>
               <a:ext uri="{FF2B5EF4-FFF2-40B4-BE49-F238E27FC236}">
-                <a16:creationId xmlns:a16="http://schemas.microsoft.com/office/drawing/2014/main" xmlns="" id="{6ACF3EED-125E-DD41-8A71-0F4ED9804480}"/>
+                <a16:creationId xmlns:a16="http://schemas.microsoft.com/office/drawing/2014/main" id="{6ACF3EED-125E-DD41-8A71-0F4ED9804480}"/>
               </a:ext>
             </a:extLst>
           </p:cNvPr>
@@ -25290,7 +24969,7 @@
           <p:cNvPr id="9" name="Imagen 8" descr="Imagen que contiene señal, exterior, cielo, texto&#10;&#10;&#10;&#10;Descripción generada automáticamente">
             <a:extLst>
               <a:ext uri="{FF2B5EF4-FFF2-40B4-BE49-F238E27FC236}">
-                <a16:creationId xmlns:a16="http://schemas.microsoft.com/office/drawing/2014/main" xmlns="" id="{C5E74572-56C6-8D40-95B7-30C4C244D132}"/>
+                <a16:creationId xmlns:a16="http://schemas.microsoft.com/office/drawing/2014/main" id="{C5E74572-56C6-8D40-95B7-30C4C244D132}"/>
               </a:ext>
             </a:extLst>
           </p:cNvPr>
@@ -25320,7 +24999,7 @@
           <p:cNvPr id="10" name="Imagen 9">
             <a:extLst>
               <a:ext uri="{FF2B5EF4-FFF2-40B4-BE49-F238E27FC236}">
-                <a16:creationId xmlns:a16="http://schemas.microsoft.com/office/drawing/2014/main" xmlns="" id="{E00A3B97-065B-0E41-BF3C-221BF213969F}"/>
+                <a16:creationId xmlns:a16="http://schemas.microsoft.com/office/drawing/2014/main" id="{E00A3B97-065B-0E41-BF3C-221BF213969F}"/>
               </a:ext>
             </a:extLst>
           </p:cNvPr>
@@ -25350,7 +25029,7 @@
           <p:cNvPr id="11" name="Imagen 10" descr="Imagen que contiene imágenes prediseñadas&#10;&#10;&#10;&#10;Descripción generada automáticamente">
             <a:extLst>
               <a:ext uri="{FF2B5EF4-FFF2-40B4-BE49-F238E27FC236}">
-                <a16:creationId xmlns:a16="http://schemas.microsoft.com/office/drawing/2014/main" xmlns="" id="{2CD80353-91D2-B64F-BCD4-A0323A6F7892}"/>
+                <a16:creationId xmlns:a16="http://schemas.microsoft.com/office/drawing/2014/main" id="{2CD80353-91D2-B64F-BCD4-A0323A6F7892}"/>
               </a:ext>
             </a:extLst>
           </p:cNvPr>
@@ -25380,7 +25059,7 @@
           <p:cNvPr id="12" name="Imagen 11">
             <a:extLst>
               <a:ext uri="{FF2B5EF4-FFF2-40B4-BE49-F238E27FC236}">
-                <a16:creationId xmlns:a16="http://schemas.microsoft.com/office/drawing/2014/main" xmlns="" id="{25235F44-BFEA-3342-AAE4-68E956D43A7D}"/>
+                <a16:creationId xmlns:a16="http://schemas.microsoft.com/office/drawing/2014/main" id="{25235F44-BFEA-3342-AAE4-68E956D43A7D}"/>
               </a:ext>
             </a:extLst>
           </p:cNvPr>
@@ -25410,7 +25089,7 @@
           <p:cNvPr id="13" name="Título 1">
             <a:extLst>
               <a:ext uri="{FF2B5EF4-FFF2-40B4-BE49-F238E27FC236}">
-                <a16:creationId xmlns:a16="http://schemas.microsoft.com/office/drawing/2014/main" xmlns="" id="{F0881CA0-944C-453C-A42B-F49A48702637}"/>
+                <a16:creationId xmlns:a16="http://schemas.microsoft.com/office/drawing/2014/main" id="{F0881CA0-944C-453C-A42B-F49A48702637}"/>
               </a:ext>
             </a:extLst>
           </p:cNvPr>
@@ -25473,7 +25152,7 @@
           <p:cNvPr id="5" name="Imagen 4">
             <a:extLst>
               <a:ext uri="{FF2B5EF4-FFF2-40B4-BE49-F238E27FC236}">
-                <a16:creationId xmlns:a16="http://schemas.microsoft.com/office/drawing/2014/main" xmlns="" id="{5F32BD73-4768-2A49-98C4-124715923DBC}"/>
+                <a16:creationId xmlns:a16="http://schemas.microsoft.com/office/drawing/2014/main" id="{5F32BD73-4768-2A49-98C4-124715923DBC}"/>
               </a:ext>
             </a:extLst>
           </p:cNvPr>
@@ -25503,7 +25182,7 @@
           <p:cNvPr id="2" name="Título 1">
             <a:extLst>
               <a:ext uri="{FF2B5EF4-FFF2-40B4-BE49-F238E27FC236}">
-                <a16:creationId xmlns:a16="http://schemas.microsoft.com/office/drawing/2014/main" xmlns="" id="{B9B0D241-1721-BB42-8643-D80DD19A3280}"/>
+                <a16:creationId xmlns:a16="http://schemas.microsoft.com/office/drawing/2014/main" id="{B9B0D241-1721-BB42-8643-D80DD19A3280}"/>
               </a:ext>
             </a:extLst>
           </p:cNvPr>
@@ -25537,7 +25216,7 @@
           <p:cNvPr id="6" name="Marcador de número de diapositiva 5">
             <a:extLst>
               <a:ext uri="{FF2B5EF4-FFF2-40B4-BE49-F238E27FC236}">
-                <a16:creationId xmlns:a16="http://schemas.microsoft.com/office/drawing/2014/main" xmlns="" id="{EA72CA66-3062-4C85-AB3F-209F5F6EE309}"/>
+                <a16:creationId xmlns:a16="http://schemas.microsoft.com/office/drawing/2014/main" id="{EA72CA66-3062-4C85-AB3F-209F5F6EE309}"/>
               </a:ext>
             </a:extLst>
           </p:cNvPr>
@@ -25564,7 +25243,7 @@
             </a:fld>
             <a:r>
               <a:rPr lang="es-ES" sz="2000" dirty="0"/>
-              <a:t>/24</a:t>
+              <a:t>/20</a:t>
             </a:r>
           </a:p>
         </p:txBody>
@@ -25574,7 +25253,7 @@
           <p:cNvPr id="8" name="Diagrama 7">
             <a:extLst>
               <a:ext uri="{FF2B5EF4-FFF2-40B4-BE49-F238E27FC236}">
-                <a16:creationId xmlns:a16="http://schemas.microsoft.com/office/drawing/2014/main" xmlns="" id="{23C085A3-62C5-D541-9E6B-EEE3123573B2}"/>
+                <a16:creationId xmlns:a16="http://schemas.microsoft.com/office/drawing/2014/main" id="{23C085A3-62C5-D541-9E6B-EEE3123573B2}"/>
               </a:ext>
             </a:extLst>
           </p:cNvPr>
@@ -25602,7 +25281,7 @@
           <p:cNvPr id="9" name="Flecha derecha 8">
             <a:extLst>
               <a:ext uri="{FF2B5EF4-FFF2-40B4-BE49-F238E27FC236}">
-                <a16:creationId xmlns:a16="http://schemas.microsoft.com/office/drawing/2014/main" xmlns="" id="{409214D7-A261-884C-9FDF-B32C26A1993E}"/>
+                <a16:creationId xmlns:a16="http://schemas.microsoft.com/office/drawing/2014/main" id="{409214D7-A261-884C-9FDF-B32C26A1993E}"/>
               </a:ext>
             </a:extLst>
           </p:cNvPr>
@@ -25648,7 +25327,7 @@
           <p:cNvPr id="10" name="Anillo 9">
             <a:extLst>
               <a:ext uri="{FF2B5EF4-FFF2-40B4-BE49-F238E27FC236}">
-                <a16:creationId xmlns:a16="http://schemas.microsoft.com/office/drawing/2014/main" xmlns="" id="{E2B7A3A7-96DE-DD41-861F-AE407579C800}"/>
+                <a16:creationId xmlns:a16="http://schemas.microsoft.com/office/drawing/2014/main" id="{E2B7A3A7-96DE-DD41-861F-AE407579C800}"/>
               </a:ext>
             </a:extLst>
           </p:cNvPr>
@@ -25698,7 +25377,7 @@
           <p:cNvPr id="11" name="Anillo 10">
             <a:extLst>
               <a:ext uri="{FF2B5EF4-FFF2-40B4-BE49-F238E27FC236}">
-                <a16:creationId xmlns:a16="http://schemas.microsoft.com/office/drawing/2014/main" xmlns="" id="{8C8E2577-405A-B047-99C1-9FBF59709B3D}"/>
+                <a16:creationId xmlns:a16="http://schemas.microsoft.com/office/drawing/2014/main" id="{8C8E2577-405A-B047-99C1-9FBF59709B3D}"/>
               </a:ext>
             </a:extLst>
           </p:cNvPr>
@@ -25748,7 +25427,7 @@
           <p:cNvPr id="12" name="Anillo 11">
             <a:extLst>
               <a:ext uri="{FF2B5EF4-FFF2-40B4-BE49-F238E27FC236}">
-                <a16:creationId xmlns:a16="http://schemas.microsoft.com/office/drawing/2014/main" xmlns="" id="{362B8359-9A80-FC45-9EA0-C98D23F88271}"/>
+                <a16:creationId xmlns:a16="http://schemas.microsoft.com/office/drawing/2014/main" id="{362B8359-9A80-FC45-9EA0-C98D23F88271}"/>
               </a:ext>
             </a:extLst>
           </p:cNvPr>
@@ -25798,7 +25477,7 @@
           <p:cNvPr id="13" name="Anillo 12">
             <a:extLst>
               <a:ext uri="{FF2B5EF4-FFF2-40B4-BE49-F238E27FC236}">
-                <a16:creationId xmlns:a16="http://schemas.microsoft.com/office/drawing/2014/main" xmlns="" id="{048FD790-169C-264C-B015-7CF76A632F2B}"/>
+                <a16:creationId xmlns:a16="http://schemas.microsoft.com/office/drawing/2014/main" id="{048FD790-169C-264C-B015-7CF76A632F2B}"/>
               </a:ext>
             </a:extLst>
           </p:cNvPr>
@@ -25878,7 +25557,7 @@
           <p:cNvPr id="7" name="Imagen 6">
             <a:extLst>
               <a:ext uri="{FF2B5EF4-FFF2-40B4-BE49-F238E27FC236}">
-                <a16:creationId xmlns:a16="http://schemas.microsoft.com/office/drawing/2014/main" xmlns="" id="{5064E33B-1BBF-4006-A3AB-7FE774AF189C}"/>
+                <a16:creationId xmlns:a16="http://schemas.microsoft.com/office/drawing/2014/main" id="{5064E33B-1BBF-4006-A3AB-7FE774AF189C}"/>
               </a:ext>
             </a:extLst>
           </p:cNvPr>
@@ -25908,7 +25587,7 @@
           <p:cNvPr id="5" name="Marcador de número de diapositiva 4">
             <a:extLst>
               <a:ext uri="{FF2B5EF4-FFF2-40B4-BE49-F238E27FC236}">
-                <a16:creationId xmlns:a16="http://schemas.microsoft.com/office/drawing/2014/main" xmlns="" id="{C8FB015C-95FD-4710-9F93-3012CE4B2032}"/>
+                <a16:creationId xmlns:a16="http://schemas.microsoft.com/office/drawing/2014/main" id="{C8FB015C-95FD-4710-9F93-3012CE4B2032}"/>
               </a:ext>
             </a:extLst>
           </p:cNvPr>
@@ -25935,7 +25614,7 @@
             </a:fld>
             <a:r>
               <a:rPr lang="es-ES" sz="2000" dirty="0"/>
-              <a:t>/22</a:t>
+              <a:t>/20</a:t>
             </a:r>
           </a:p>
         </p:txBody>
@@ -25945,7 +25624,7 @@
           <p:cNvPr id="8" name="Título 1">
             <a:extLst>
               <a:ext uri="{FF2B5EF4-FFF2-40B4-BE49-F238E27FC236}">
-                <a16:creationId xmlns:a16="http://schemas.microsoft.com/office/drawing/2014/main" xmlns="" id="{CE4B125E-AFB5-4365-AB59-78D81A734082}"/>
+                <a16:creationId xmlns:a16="http://schemas.microsoft.com/office/drawing/2014/main" id="{CE4B125E-AFB5-4365-AB59-78D81A734082}"/>
               </a:ext>
             </a:extLst>
           </p:cNvPr>
@@ -25978,7 +25657,7 @@
           <p:cNvPr id="9" name="CuadroTexto 8">
             <a:extLst>
               <a:ext uri="{FF2B5EF4-FFF2-40B4-BE49-F238E27FC236}">
-                <a16:creationId xmlns:a16="http://schemas.microsoft.com/office/drawing/2014/main" xmlns="" id="{ADAEC259-2108-468D-8C3F-28134EAB5E86}"/>
+                <a16:creationId xmlns:a16="http://schemas.microsoft.com/office/drawing/2014/main" id="{ADAEC259-2108-468D-8C3F-28134EAB5E86}"/>
               </a:ext>
             </a:extLst>
           </p:cNvPr>
@@ -26163,7 +25842,7 @@
           <p:cNvPr id="7" name="Imagen 6">
             <a:extLst>
               <a:ext uri="{FF2B5EF4-FFF2-40B4-BE49-F238E27FC236}">
-                <a16:creationId xmlns:a16="http://schemas.microsoft.com/office/drawing/2014/main" xmlns="" id="{5064E33B-1BBF-4006-A3AB-7FE774AF189C}"/>
+                <a16:creationId xmlns:a16="http://schemas.microsoft.com/office/drawing/2014/main" id="{5064E33B-1BBF-4006-A3AB-7FE774AF189C}"/>
               </a:ext>
             </a:extLst>
           </p:cNvPr>
@@ -26193,7 +25872,7 @@
           <p:cNvPr id="5" name="Marcador de número de diapositiva 4">
             <a:extLst>
               <a:ext uri="{FF2B5EF4-FFF2-40B4-BE49-F238E27FC236}">
-                <a16:creationId xmlns:a16="http://schemas.microsoft.com/office/drawing/2014/main" xmlns="" id="{C8FB015C-95FD-4710-9F93-3012CE4B2032}"/>
+                <a16:creationId xmlns:a16="http://schemas.microsoft.com/office/drawing/2014/main" id="{C8FB015C-95FD-4710-9F93-3012CE4B2032}"/>
               </a:ext>
             </a:extLst>
           </p:cNvPr>
@@ -26220,7 +25899,7 @@
             </a:fld>
             <a:r>
               <a:rPr lang="es-ES" sz="2000" dirty="0"/>
-              <a:t>/22</a:t>
+              <a:t>/20</a:t>
             </a:r>
           </a:p>
         </p:txBody>
@@ -26230,7 +25909,7 @@
           <p:cNvPr id="8" name="Título 1">
             <a:extLst>
               <a:ext uri="{FF2B5EF4-FFF2-40B4-BE49-F238E27FC236}">
-                <a16:creationId xmlns:a16="http://schemas.microsoft.com/office/drawing/2014/main" xmlns="" id="{CE4B125E-AFB5-4365-AB59-78D81A734082}"/>
+                <a16:creationId xmlns:a16="http://schemas.microsoft.com/office/drawing/2014/main" id="{CE4B125E-AFB5-4365-AB59-78D81A734082}"/>
               </a:ext>
             </a:extLst>
           </p:cNvPr>
@@ -26263,7 +25942,7 @@
           <p:cNvPr id="9" name="CuadroTexto 8">
             <a:extLst>
               <a:ext uri="{FF2B5EF4-FFF2-40B4-BE49-F238E27FC236}">
-                <a16:creationId xmlns:a16="http://schemas.microsoft.com/office/drawing/2014/main" xmlns="" id="{ADAEC259-2108-468D-8C3F-28134EAB5E86}"/>
+                <a16:creationId xmlns:a16="http://schemas.microsoft.com/office/drawing/2014/main" id="{ADAEC259-2108-468D-8C3F-28134EAB5E86}"/>
               </a:ext>
             </a:extLst>
           </p:cNvPr>
@@ -26351,7 +26030,7 @@
           <p:cNvPr id="6" name="Picture 4">
             <a:extLst>
               <a:ext uri="{FF2B5EF4-FFF2-40B4-BE49-F238E27FC236}">
-                <a16:creationId xmlns:a16="http://schemas.microsoft.com/office/drawing/2014/main" xmlns="" id="{F7BC70C9-2726-4FC5-B918-EA8378508DE4}"/>
+                <a16:creationId xmlns:a16="http://schemas.microsoft.com/office/drawing/2014/main" id="{F7BC70C9-2726-4FC5-B918-EA8378508DE4}"/>
               </a:ext>
             </a:extLst>
           </p:cNvPr>
@@ -26411,7 +26090,7 @@
           <p:cNvPr id="10" name="4 Conector recto de flecha">
             <a:extLst>
               <a:ext uri="{FF2B5EF4-FFF2-40B4-BE49-F238E27FC236}">
-                <a16:creationId xmlns:a16="http://schemas.microsoft.com/office/drawing/2014/main" xmlns="" id="{D5E94DC6-E1FA-49EF-B12E-16A868BF6D04}"/>
+                <a16:creationId xmlns:a16="http://schemas.microsoft.com/office/drawing/2014/main" id="{D5E94DC6-E1FA-49EF-B12E-16A868BF6D04}"/>
               </a:ext>
             </a:extLst>
           </p:cNvPr>
@@ -26450,7 +26129,7 @@
           <p:cNvPr id="11" name="14 Conector recto de flecha">
             <a:extLst>
               <a:ext uri="{FF2B5EF4-FFF2-40B4-BE49-F238E27FC236}">
-                <a16:creationId xmlns:a16="http://schemas.microsoft.com/office/drawing/2014/main" xmlns="" id="{12E75257-809A-46D5-9E66-2860F2A5DBD2}"/>
+                <a16:creationId xmlns:a16="http://schemas.microsoft.com/office/drawing/2014/main" id="{12E75257-809A-46D5-9E66-2860F2A5DBD2}"/>
               </a:ext>
             </a:extLst>
           </p:cNvPr>
@@ -26489,7 +26168,7 @@
           <p:cNvPr id="12" name="15 Conector recto de flecha">
             <a:extLst>
               <a:ext uri="{FF2B5EF4-FFF2-40B4-BE49-F238E27FC236}">
-                <a16:creationId xmlns:a16="http://schemas.microsoft.com/office/drawing/2014/main" xmlns="" id="{BA62D5EC-8008-4BB4-B398-624B3E0F4264}"/>
+                <a16:creationId xmlns:a16="http://schemas.microsoft.com/office/drawing/2014/main" id="{BA62D5EC-8008-4BB4-B398-624B3E0F4264}"/>
               </a:ext>
             </a:extLst>
           </p:cNvPr>
@@ -26528,7 +26207,7 @@
           <p:cNvPr id="13" name="16 Conector recto de flecha">
             <a:extLst>
               <a:ext uri="{FF2B5EF4-FFF2-40B4-BE49-F238E27FC236}">
-                <a16:creationId xmlns:a16="http://schemas.microsoft.com/office/drawing/2014/main" xmlns="" id="{4A89E665-8FB2-4B75-A9B2-8ADE77BF90C0}"/>
+                <a16:creationId xmlns:a16="http://schemas.microsoft.com/office/drawing/2014/main" id="{4A89E665-8FB2-4B75-A9B2-8ADE77BF90C0}"/>
               </a:ext>
             </a:extLst>
           </p:cNvPr>
@@ -26567,7 +26246,7 @@
           <p:cNvPr id="14" name="17 Conector recto de flecha">
             <a:extLst>
               <a:ext uri="{FF2B5EF4-FFF2-40B4-BE49-F238E27FC236}">
-                <a16:creationId xmlns:a16="http://schemas.microsoft.com/office/drawing/2014/main" xmlns="" id="{E7920C57-7517-4FB0-8ADE-FD647E8E63BF}"/>
+                <a16:creationId xmlns:a16="http://schemas.microsoft.com/office/drawing/2014/main" id="{E7920C57-7517-4FB0-8ADE-FD647E8E63BF}"/>
               </a:ext>
             </a:extLst>
           </p:cNvPr>
@@ -26606,7 +26285,7 @@
           <p:cNvPr id="15" name="8 CuadroTexto">
             <a:extLst>
               <a:ext uri="{FF2B5EF4-FFF2-40B4-BE49-F238E27FC236}">
-                <a16:creationId xmlns:a16="http://schemas.microsoft.com/office/drawing/2014/main" xmlns="" id="{97D5678F-812E-4F71-90DE-5AAACC59145E}"/>
+                <a16:creationId xmlns:a16="http://schemas.microsoft.com/office/drawing/2014/main" id="{97D5678F-812E-4F71-90DE-5AAACC59145E}"/>
               </a:ext>
             </a:extLst>
           </p:cNvPr>
@@ -26664,7 +26343,7 @@
           <p:cNvPr id="16" name="19 CuadroTexto">
             <a:extLst>
               <a:ext uri="{FF2B5EF4-FFF2-40B4-BE49-F238E27FC236}">
-                <a16:creationId xmlns:a16="http://schemas.microsoft.com/office/drawing/2014/main" xmlns="" id="{29CA4401-C356-4FAD-819B-FF25BE9171E5}"/>
+                <a16:creationId xmlns:a16="http://schemas.microsoft.com/office/drawing/2014/main" id="{29CA4401-C356-4FAD-819B-FF25BE9171E5}"/>
               </a:ext>
             </a:extLst>
           </p:cNvPr>
@@ -26722,7 +26401,7 @@
           <p:cNvPr id="17" name="20 CuadroTexto">
             <a:extLst>
               <a:ext uri="{FF2B5EF4-FFF2-40B4-BE49-F238E27FC236}">
-                <a16:creationId xmlns:a16="http://schemas.microsoft.com/office/drawing/2014/main" xmlns="" id="{C4D04E6F-146E-4AE7-9C8B-E11B07F10123}"/>
+                <a16:creationId xmlns:a16="http://schemas.microsoft.com/office/drawing/2014/main" id="{C4D04E6F-146E-4AE7-9C8B-E11B07F10123}"/>
               </a:ext>
             </a:extLst>
           </p:cNvPr>
@@ -26780,7 +26459,7 @@
           <p:cNvPr id="18" name="23 CuadroTexto">
             <a:extLst>
               <a:ext uri="{FF2B5EF4-FFF2-40B4-BE49-F238E27FC236}">
-                <a16:creationId xmlns:a16="http://schemas.microsoft.com/office/drawing/2014/main" xmlns="" id="{65D983F8-A3CA-43F1-8622-ECDEFBFBFCB4}"/>
+                <a16:creationId xmlns:a16="http://schemas.microsoft.com/office/drawing/2014/main" id="{65D983F8-A3CA-43F1-8622-ECDEFBFBFCB4}"/>
               </a:ext>
             </a:extLst>
           </p:cNvPr>
@@ -26838,7 +26517,7 @@
           <p:cNvPr id="19" name="22 CuadroTexto">
             <a:extLst>
               <a:ext uri="{FF2B5EF4-FFF2-40B4-BE49-F238E27FC236}">
-                <a16:creationId xmlns:a16="http://schemas.microsoft.com/office/drawing/2014/main" xmlns="" id="{8D896A4D-1575-4E49-8018-E9B7456383C3}"/>
+                <a16:creationId xmlns:a16="http://schemas.microsoft.com/office/drawing/2014/main" id="{8D896A4D-1575-4E49-8018-E9B7456383C3}"/>
               </a:ext>
             </a:extLst>
           </p:cNvPr>
@@ -27168,7 +26847,7 @@
   <a:extraClrSchemeLst/>
   <a:extLst>
     <a:ext uri="{05A4C25C-085E-4340-85A3-A5531E510DB2}">
-      <thm15:themeFamily xmlns:thm15="http://schemas.microsoft.com/office/thememl/2012/main" xmlns="" name="Vapor Trail" id="{4FDF2955-7D9C-493C-B9F9-C205151B46CD}" vid="{FE1EB5C7-81A8-4CBA-AE6E-B3BF73DC3895}"/>
+      <thm15:themeFamily xmlns:thm15="http://schemas.microsoft.com/office/thememl/2012/main" name="Vapor Trail" id="{4FDF2955-7D9C-493C-B9F9-C205151B46CD}" vid="{FE1EB5C7-81A8-4CBA-AE6E-B3BF73DC3895}"/>
     </a:ext>
   </a:extLst>
 </a:theme>
@@ -27463,7 +27142,7 @@
   <a:extraClrSchemeLst/>
   <a:extLst>
     <a:ext uri="{05A4C25C-085E-4340-85A3-A5531E510DB2}">
-      <thm15:themeFamily xmlns:thm15="http://schemas.microsoft.com/office/thememl/2012/main" xmlns="" name="Office Theme" id="{62F939B6-93AF-4DB8-9C6B-D6C7DFDC589F}" vid="{4A3C46E8-61CC-4603-A589-7422A47A8E4A}"/>
+      <thm15:themeFamily xmlns:thm15="http://schemas.microsoft.com/office/thememl/2012/main" name="Office Theme" id="{62F939B6-93AF-4DB8-9C6B-D6C7DFDC589F}" vid="{4A3C46E8-61CC-4603-A589-7422A47A8E4A}"/>
     </a:ext>
   </a:extLst>
 </a:theme>
@@ -27758,7 +27437,7 @@
   <a:extraClrSchemeLst/>
   <a:extLst>
     <a:ext uri="{05A4C25C-085E-4340-85A3-A5531E510DB2}">
-      <thm15:themeFamily xmlns:thm15="http://schemas.microsoft.com/office/thememl/2012/main" xmlns="" name="Office Theme" id="{62F939B6-93AF-4DB8-9C6B-D6C7DFDC589F}" vid="{4A3C46E8-61CC-4603-A589-7422A47A8E4A}"/>
+      <thm15:themeFamily xmlns:thm15="http://schemas.microsoft.com/office/thememl/2012/main" name="Office Theme" id="{62F939B6-93AF-4DB8-9C6B-D6C7DFDC589F}" vid="{4A3C46E8-61CC-4603-A589-7422A47A8E4A}"/>
     </a:ext>
   </a:extLst>
 </a:theme>

</xml_diff>